<commit_message>
Added additional logos to avatar.pptx
</commit_message>
<xml_diff>
--- a/unpublished/avatar.pptx
+++ b/unpublished/avatar.pptx
@@ -6,6 +6,8 @@
   </p:sldMasterIdLst>
   <p:sldIdLst>
     <p:sldId id="256" r:id="rId2"/>
+    <p:sldId id="257" r:id="rId3"/>
+    <p:sldId id="258" r:id="rId4"/>
   </p:sldIdLst>
   <p:sldSz cx="9144000" cy="9144000"/>
   <p:notesSz cx="6858000" cy="9144000"/>
@@ -243,7 +245,7 @@
           <a:p>
             <a:fld id="{76515867-63A8-0E4C-94B1-A995DCB441AF}" type="datetimeFigureOut">
               <a:rPr lang="en-US" smtClean="0"/>
-              <a:t>8/18/17</a:t>
+              <a:t>9/18/17</a:t>
             </a:fld>
             <a:endParaRPr lang="en-US"/>
           </a:p>
@@ -413,7 +415,7 @@
           <a:p>
             <a:fld id="{76515867-63A8-0E4C-94B1-A995DCB441AF}" type="datetimeFigureOut">
               <a:rPr lang="en-US" smtClean="0"/>
-              <a:t>8/18/17</a:t>
+              <a:t>9/18/17</a:t>
             </a:fld>
             <a:endParaRPr lang="en-US"/>
           </a:p>
@@ -593,7 +595,7 @@
           <a:p>
             <a:fld id="{76515867-63A8-0E4C-94B1-A995DCB441AF}" type="datetimeFigureOut">
               <a:rPr lang="en-US" smtClean="0"/>
-              <a:t>8/18/17</a:t>
+              <a:t>9/18/17</a:t>
             </a:fld>
             <a:endParaRPr lang="en-US"/>
           </a:p>
@@ -763,7 +765,7 @@
           <a:p>
             <a:fld id="{76515867-63A8-0E4C-94B1-A995DCB441AF}" type="datetimeFigureOut">
               <a:rPr lang="en-US" smtClean="0"/>
-              <a:t>8/18/17</a:t>
+              <a:t>9/18/17</a:t>
             </a:fld>
             <a:endParaRPr lang="en-US"/>
           </a:p>
@@ -1007,7 +1009,7 @@
           <a:p>
             <a:fld id="{76515867-63A8-0E4C-94B1-A995DCB441AF}" type="datetimeFigureOut">
               <a:rPr lang="en-US" smtClean="0"/>
-              <a:t>8/18/17</a:t>
+              <a:t>9/18/17</a:t>
             </a:fld>
             <a:endParaRPr lang="en-US"/>
           </a:p>
@@ -1239,7 +1241,7 @@
           <a:p>
             <a:fld id="{76515867-63A8-0E4C-94B1-A995DCB441AF}" type="datetimeFigureOut">
               <a:rPr lang="en-US" smtClean="0"/>
-              <a:t>8/18/17</a:t>
+              <a:t>9/18/17</a:t>
             </a:fld>
             <a:endParaRPr lang="en-US"/>
           </a:p>
@@ -1606,7 +1608,7 @@
           <a:p>
             <a:fld id="{76515867-63A8-0E4C-94B1-A995DCB441AF}" type="datetimeFigureOut">
               <a:rPr lang="en-US" smtClean="0"/>
-              <a:t>8/18/17</a:t>
+              <a:t>9/18/17</a:t>
             </a:fld>
             <a:endParaRPr lang="en-US"/>
           </a:p>
@@ -1724,7 +1726,7 @@
           <a:p>
             <a:fld id="{76515867-63A8-0E4C-94B1-A995DCB441AF}" type="datetimeFigureOut">
               <a:rPr lang="en-US" smtClean="0"/>
-              <a:t>8/18/17</a:t>
+              <a:t>9/18/17</a:t>
             </a:fld>
             <a:endParaRPr lang="en-US"/>
           </a:p>
@@ -1819,7 +1821,7 @@
           <a:p>
             <a:fld id="{76515867-63A8-0E4C-94B1-A995DCB441AF}" type="datetimeFigureOut">
               <a:rPr lang="en-US" smtClean="0"/>
-              <a:t>8/18/17</a:t>
+              <a:t>9/18/17</a:t>
             </a:fld>
             <a:endParaRPr lang="en-US"/>
           </a:p>
@@ -2096,7 +2098,7 @@
           <a:p>
             <a:fld id="{76515867-63A8-0E4C-94B1-A995DCB441AF}" type="datetimeFigureOut">
               <a:rPr lang="en-US" smtClean="0"/>
-              <a:t>8/18/17</a:t>
+              <a:t>9/18/17</a:t>
             </a:fld>
             <a:endParaRPr lang="en-US"/>
           </a:p>
@@ -2353,7 +2355,7 @@
           <a:p>
             <a:fld id="{76515867-63A8-0E4C-94B1-A995DCB441AF}" type="datetimeFigureOut">
               <a:rPr lang="en-US" smtClean="0"/>
-              <a:t>8/18/17</a:t>
+              <a:t>9/18/17</a:t>
             </a:fld>
             <a:endParaRPr lang="en-US"/>
           </a:p>
@@ -2566,7 +2568,7 @@
           <a:p>
             <a:fld id="{76515867-63A8-0E4C-94B1-A995DCB441AF}" type="datetimeFigureOut">
               <a:rPr lang="en-US" smtClean="0"/>
-              <a:t>8/18/17</a:t>
+              <a:t>9/18/17</a:t>
             </a:fld>
             <a:endParaRPr lang="en-US"/>
           </a:p>
@@ -4512,6 +4514,3032 @@
 </p:sld>
 </file>
 
+<file path=ppt/slides/slide2.xml><?xml version="1.0" encoding="utf-8"?>
+<p:sld xmlns:a="http://schemas.openxmlformats.org/drawingml/2006/main" xmlns:r="http://schemas.openxmlformats.org/officeDocument/2006/relationships" xmlns:p="http://schemas.openxmlformats.org/presentationml/2006/main">
+  <p:cSld>
+    <p:spTree>
+      <p:nvGrpSpPr>
+        <p:cNvPr id="1" name=""/>
+        <p:cNvGrpSpPr/>
+        <p:nvPr/>
+      </p:nvGrpSpPr>
+      <p:grpSpPr>
+        <a:xfrm>
+          <a:off x="0" y="0"/>
+          <a:ext cx="0" cy="0"/>
+          <a:chOff x="0" y="0"/>
+          <a:chExt cx="0" cy="0"/>
+        </a:xfrm>
+      </p:grpSpPr>
+      <p:sp>
+        <p:nvSpPr>
+          <p:cNvPr id="5" name="Freeform 4"/>
+          <p:cNvSpPr/>
+          <p:nvPr/>
+        </p:nvSpPr>
+        <p:spPr>
+          <a:xfrm>
+            <a:off x="3200400" y="1343688"/>
+            <a:ext cx="2743200" cy="4318334"/>
+          </a:xfrm>
+          <a:custGeom>
+            <a:avLst/>
+            <a:gdLst>
+              <a:gd name="connsiteX0" fmla="*/ 652421 w 4261902"/>
+              <a:gd name="connsiteY0" fmla="*/ 6330902 h 6719567"/>
+              <a:gd name="connsiteX1" fmla="*/ 494160 w 4261902"/>
+              <a:gd name="connsiteY1" fmla="*/ 5434087 h 6719567"/>
+              <a:gd name="connsiteX2" fmla="*/ 388652 w 4261902"/>
+              <a:gd name="connsiteY2" fmla="*/ 4115241 h 6719567"/>
+              <a:gd name="connsiteX3" fmla="*/ 423821 w 4261902"/>
+              <a:gd name="connsiteY3" fmla="*/ 3130502 h 6719567"/>
+              <a:gd name="connsiteX4" fmla="*/ 177637 w 4261902"/>
+              <a:gd name="connsiteY4" fmla="*/ 2356779 h 6719567"/>
+              <a:gd name="connsiteX5" fmla="*/ 1791 w 4261902"/>
+              <a:gd name="connsiteY5" fmla="*/ 1248949 h 6719567"/>
+              <a:gd name="connsiteX6" fmla="*/ 142468 w 4261902"/>
+              <a:gd name="connsiteY6" fmla="*/ 299379 h 6719567"/>
+              <a:gd name="connsiteX7" fmla="*/ 881021 w 4261902"/>
+              <a:gd name="connsiteY7" fmla="*/ 441 h 6719567"/>
+              <a:gd name="connsiteX8" fmla="*/ 2147114 w 4261902"/>
+              <a:gd name="connsiteY8" fmla="*/ 229041 h 6719567"/>
+              <a:gd name="connsiteX9" fmla="*/ 2850498 w 4261902"/>
+              <a:gd name="connsiteY9" fmla="*/ 88364 h 6719567"/>
+              <a:gd name="connsiteX10" fmla="*/ 3465960 w 4261902"/>
+              <a:gd name="connsiteY10" fmla="*/ 18025 h 6719567"/>
+              <a:gd name="connsiteX11" fmla="*/ 4028668 w 4261902"/>
+              <a:gd name="connsiteY11" fmla="*/ 158702 h 6719567"/>
+              <a:gd name="connsiteX12" fmla="*/ 4257268 w 4261902"/>
+              <a:gd name="connsiteY12" fmla="*/ 967595 h 6719567"/>
+              <a:gd name="connsiteX13" fmla="*/ 4151760 w 4261902"/>
+              <a:gd name="connsiteY13" fmla="*/ 2128179 h 6719567"/>
+              <a:gd name="connsiteX14" fmla="*/ 3800068 w 4261902"/>
+              <a:gd name="connsiteY14" fmla="*/ 3060164 h 6719567"/>
+              <a:gd name="connsiteX15" fmla="*/ 3800068 w 4261902"/>
+              <a:gd name="connsiteY15" fmla="*/ 3886641 h 6719567"/>
+              <a:gd name="connsiteX16" fmla="*/ 3712144 w 4261902"/>
+              <a:gd name="connsiteY16" fmla="*/ 5187902 h 6719567"/>
+              <a:gd name="connsiteX17" fmla="*/ 3413206 w 4261902"/>
+              <a:gd name="connsiteY17" fmla="*/ 6717764 h 6719567"/>
+              <a:gd name="connsiteX18" fmla="*/ 2780160 w 4261902"/>
+              <a:gd name="connsiteY18" fmla="*/ 5469256 h 6719567"/>
+              <a:gd name="connsiteX19" fmla="*/ 2569144 w 4261902"/>
+              <a:gd name="connsiteY19" fmla="*/ 4220749 h 6719567"/>
+              <a:gd name="connsiteX20" fmla="*/ 2182283 w 4261902"/>
+              <a:gd name="connsiteY20" fmla="*/ 3904225 h 6719567"/>
+              <a:gd name="connsiteX21" fmla="*/ 1689914 w 4261902"/>
+              <a:gd name="connsiteY21" fmla="*/ 3974564 h 6719567"/>
+              <a:gd name="connsiteX22" fmla="*/ 1461314 w 4261902"/>
+              <a:gd name="connsiteY22" fmla="*/ 4185579 h 6719567"/>
+              <a:gd name="connsiteX23" fmla="*/ 1338221 w 4261902"/>
+              <a:gd name="connsiteY23" fmla="*/ 5135149 h 6719567"/>
+              <a:gd name="connsiteX24" fmla="*/ 1127206 w 4261902"/>
+              <a:gd name="connsiteY24" fmla="*/ 6137472 h 6719567"/>
+              <a:gd name="connsiteX25" fmla="*/ 845852 w 4261902"/>
+              <a:gd name="connsiteY25" fmla="*/ 6700179 h 6719567"/>
+              <a:gd name="connsiteX26" fmla="*/ 652421 w 4261902"/>
+              <a:gd name="connsiteY26" fmla="*/ 6330902 h 6719567"/>
+              <a:gd name="connsiteX0" fmla="*/ 652421 w 4261902"/>
+              <a:gd name="connsiteY0" fmla="*/ 6330902 h 6719567"/>
+              <a:gd name="connsiteX1" fmla="*/ 494160 w 4261902"/>
+              <a:gd name="connsiteY1" fmla="*/ 5434087 h 6719567"/>
+              <a:gd name="connsiteX2" fmla="*/ 388652 w 4261902"/>
+              <a:gd name="connsiteY2" fmla="*/ 4115241 h 6719567"/>
+              <a:gd name="connsiteX3" fmla="*/ 398063 w 4261902"/>
+              <a:gd name="connsiteY3" fmla="*/ 3104745 h 6719567"/>
+              <a:gd name="connsiteX4" fmla="*/ 177637 w 4261902"/>
+              <a:gd name="connsiteY4" fmla="*/ 2356779 h 6719567"/>
+              <a:gd name="connsiteX5" fmla="*/ 1791 w 4261902"/>
+              <a:gd name="connsiteY5" fmla="*/ 1248949 h 6719567"/>
+              <a:gd name="connsiteX6" fmla="*/ 142468 w 4261902"/>
+              <a:gd name="connsiteY6" fmla="*/ 299379 h 6719567"/>
+              <a:gd name="connsiteX7" fmla="*/ 881021 w 4261902"/>
+              <a:gd name="connsiteY7" fmla="*/ 441 h 6719567"/>
+              <a:gd name="connsiteX8" fmla="*/ 2147114 w 4261902"/>
+              <a:gd name="connsiteY8" fmla="*/ 229041 h 6719567"/>
+              <a:gd name="connsiteX9" fmla="*/ 2850498 w 4261902"/>
+              <a:gd name="connsiteY9" fmla="*/ 88364 h 6719567"/>
+              <a:gd name="connsiteX10" fmla="*/ 3465960 w 4261902"/>
+              <a:gd name="connsiteY10" fmla="*/ 18025 h 6719567"/>
+              <a:gd name="connsiteX11" fmla="*/ 4028668 w 4261902"/>
+              <a:gd name="connsiteY11" fmla="*/ 158702 h 6719567"/>
+              <a:gd name="connsiteX12" fmla="*/ 4257268 w 4261902"/>
+              <a:gd name="connsiteY12" fmla="*/ 967595 h 6719567"/>
+              <a:gd name="connsiteX13" fmla="*/ 4151760 w 4261902"/>
+              <a:gd name="connsiteY13" fmla="*/ 2128179 h 6719567"/>
+              <a:gd name="connsiteX14" fmla="*/ 3800068 w 4261902"/>
+              <a:gd name="connsiteY14" fmla="*/ 3060164 h 6719567"/>
+              <a:gd name="connsiteX15" fmla="*/ 3800068 w 4261902"/>
+              <a:gd name="connsiteY15" fmla="*/ 3886641 h 6719567"/>
+              <a:gd name="connsiteX16" fmla="*/ 3712144 w 4261902"/>
+              <a:gd name="connsiteY16" fmla="*/ 5187902 h 6719567"/>
+              <a:gd name="connsiteX17" fmla="*/ 3413206 w 4261902"/>
+              <a:gd name="connsiteY17" fmla="*/ 6717764 h 6719567"/>
+              <a:gd name="connsiteX18" fmla="*/ 2780160 w 4261902"/>
+              <a:gd name="connsiteY18" fmla="*/ 5469256 h 6719567"/>
+              <a:gd name="connsiteX19" fmla="*/ 2569144 w 4261902"/>
+              <a:gd name="connsiteY19" fmla="*/ 4220749 h 6719567"/>
+              <a:gd name="connsiteX20" fmla="*/ 2182283 w 4261902"/>
+              <a:gd name="connsiteY20" fmla="*/ 3904225 h 6719567"/>
+              <a:gd name="connsiteX21" fmla="*/ 1689914 w 4261902"/>
+              <a:gd name="connsiteY21" fmla="*/ 3974564 h 6719567"/>
+              <a:gd name="connsiteX22" fmla="*/ 1461314 w 4261902"/>
+              <a:gd name="connsiteY22" fmla="*/ 4185579 h 6719567"/>
+              <a:gd name="connsiteX23" fmla="*/ 1338221 w 4261902"/>
+              <a:gd name="connsiteY23" fmla="*/ 5135149 h 6719567"/>
+              <a:gd name="connsiteX24" fmla="*/ 1127206 w 4261902"/>
+              <a:gd name="connsiteY24" fmla="*/ 6137472 h 6719567"/>
+              <a:gd name="connsiteX25" fmla="*/ 845852 w 4261902"/>
+              <a:gd name="connsiteY25" fmla="*/ 6700179 h 6719567"/>
+              <a:gd name="connsiteX26" fmla="*/ 652421 w 4261902"/>
+              <a:gd name="connsiteY26" fmla="*/ 6330902 h 6719567"/>
+              <a:gd name="connsiteX0" fmla="*/ 652421 w 4261902"/>
+              <a:gd name="connsiteY0" fmla="*/ 6330902 h 6719567"/>
+              <a:gd name="connsiteX1" fmla="*/ 494160 w 4261902"/>
+              <a:gd name="connsiteY1" fmla="*/ 5434087 h 6719567"/>
+              <a:gd name="connsiteX2" fmla="*/ 388652 w 4261902"/>
+              <a:gd name="connsiteY2" fmla="*/ 4115241 h 6719567"/>
+              <a:gd name="connsiteX3" fmla="*/ 398063 w 4261902"/>
+              <a:gd name="connsiteY3" fmla="*/ 3104745 h 6719567"/>
+              <a:gd name="connsiteX4" fmla="*/ 177637 w 4261902"/>
+              <a:gd name="connsiteY4" fmla="*/ 2356779 h 6719567"/>
+              <a:gd name="connsiteX5" fmla="*/ 1791 w 4261902"/>
+              <a:gd name="connsiteY5" fmla="*/ 1248949 h 6719567"/>
+              <a:gd name="connsiteX6" fmla="*/ 142468 w 4261902"/>
+              <a:gd name="connsiteY6" fmla="*/ 299379 h 6719567"/>
+              <a:gd name="connsiteX7" fmla="*/ 881021 w 4261902"/>
+              <a:gd name="connsiteY7" fmla="*/ 441 h 6719567"/>
+              <a:gd name="connsiteX8" fmla="*/ 2147114 w 4261902"/>
+              <a:gd name="connsiteY8" fmla="*/ 229041 h 6719567"/>
+              <a:gd name="connsiteX9" fmla="*/ 2850498 w 4261902"/>
+              <a:gd name="connsiteY9" fmla="*/ 88364 h 6719567"/>
+              <a:gd name="connsiteX10" fmla="*/ 3465960 w 4261902"/>
+              <a:gd name="connsiteY10" fmla="*/ 18025 h 6719567"/>
+              <a:gd name="connsiteX11" fmla="*/ 4028668 w 4261902"/>
+              <a:gd name="connsiteY11" fmla="*/ 158702 h 6719567"/>
+              <a:gd name="connsiteX12" fmla="*/ 4257268 w 4261902"/>
+              <a:gd name="connsiteY12" fmla="*/ 967595 h 6719567"/>
+              <a:gd name="connsiteX13" fmla="*/ 4151760 w 4261902"/>
+              <a:gd name="connsiteY13" fmla="*/ 2128179 h 6719567"/>
+              <a:gd name="connsiteX14" fmla="*/ 3800068 w 4261902"/>
+              <a:gd name="connsiteY14" fmla="*/ 3085922 h 6719567"/>
+              <a:gd name="connsiteX15" fmla="*/ 3800068 w 4261902"/>
+              <a:gd name="connsiteY15" fmla="*/ 3886641 h 6719567"/>
+              <a:gd name="connsiteX16" fmla="*/ 3712144 w 4261902"/>
+              <a:gd name="connsiteY16" fmla="*/ 5187902 h 6719567"/>
+              <a:gd name="connsiteX17" fmla="*/ 3413206 w 4261902"/>
+              <a:gd name="connsiteY17" fmla="*/ 6717764 h 6719567"/>
+              <a:gd name="connsiteX18" fmla="*/ 2780160 w 4261902"/>
+              <a:gd name="connsiteY18" fmla="*/ 5469256 h 6719567"/>
+              <a:gd name="connsiteX19" fmla="*/ 2569144 w 4261902"/>
+              <a:gd name="connsiteY19" fmla="*/ 4220749 h 6719567"/>
+              <a:gd name="connsiteX20" fmla="*/ 2182283 w 4261902"/>
+              <a:gd name="connsiteY20" fmla="*/ 3904225 h 6719567"/>
+              <a:gd name="connsiteX21" fmla="*/ 1689914 w 4261902"/>
+              <a:gd name="connsiteY21" fmla="*/ 3974564 h 6719567"/>
+              <a:gd name="connsiteX22" fmla="*/ 1461314 w 4261902"/>
+              <a:gd name="connsiteY22" fmla="*/ 4185579 h 6719567"/>
+              <a:gd name="connsiteX23" fmla="*/ 1338221 w 4261902"/>
+              <a:gd name="connsiteY23" fmla="*/ 5135149 h 6719567"/>
+              <a:gd name="connsiteX24" fmla="*/ 1127206 w 4261902"/>
+              <a:gd name="connsiteY24" fmla="*/ 6137472 h 6719567"/>
+              <a:gd name="connsiteX25" fmla="*/ 845852 w 4261902"/>
+              <a:gd name="connsiteY25" fmla="*/ 6700179 h 6719567"/>
+              <a:gd name="connsiteX26" fmla="*/ 652421 w 4261902"/>
+              <a:gd name="connsiteY26" fmla="*/ 6330902 h 6719567"/>
+              <a:gd name="connsiteX0" fmla="*/ 652421 w 4261902"/>
+              <a:gd name="connsiteY0" fmla="*/ 6330902 h 6703211"/>
+              <a:gd name="connsiteX1" fmla="*/ 494160 w 4261902"/>
+              <a:gd name="connsiteY1" fmla="*/ 5434087 h 6703211"/>
+              <a:gd name="connsiteX2" fmla="*/ 388652 w 4261902"/>
+              <a:gd name="connsiteY2" fmla="*/ 4115241 h 6703211"/>
+              <a:gd name="connsiteX3" fmla="*/ 398063 w 4261902"/>
+              <a:gd name="connsiteY3" fmla="*/ 3104745 h 6703211"/>
+              <a:gd name="connsiteX4" fmla="*/ 177637 w 4261902"/>
+              <a:gd name="connsiteY4" fmla="*/ 2356779 h 6703211"/>
+              <a:gd name="connsiteX5" fmla="*/ 1791 w 4261902"/>
+              <a:gd name="connsiteY5" fmla="*/ 1248949 h 6703211"/>
+              <a:gd name="connsiteX6" fmla="*/ 142468 w 4261902"/>
+              <a:gd name="connsiteY6" fmla="*/ 299379 h 6703211"/>
+              <a:gd name="connsiteX7" fmla="*/ 881021 w 4261902"/>
+              <a:gd name="connsiteY7" fmla="*/ 441 h 6703211"/>
+              <a:gd name="connsiteX8" fmla="*/ 2147114 w 4261902"/>
+              <a:gd name="connsiteY8" fmla="*/ 229041 h 6703211"/>
+              <a:gd name="connsiteX9" fmla="*/ 2850498 w 4261902"/>
+              <a:gd name="connsiteY9" fmla="*/ 88364 h 6703211"/>
+              <a:gd name="connsiteX10" fmla="*/ 3465960 w 4261902"/>
+              <a:gd name="connsiteY10" fmla="*/ 18025 h 6703211"/>
+              <a:gd name="connsiteX11" fmla="*/ 4028668 w 4261902"/>
+              <a:gd name="connsiteY11" fmla="*/ 158702 h 6703211"/>
+              <a:gd name="connsiteX12" fmla="*/ 4257268 w 4261902"/>
+              <a:gd name="connsiteY12" fmla="*/ 967595 h 6703211"/>
+              <a:gd name="connsiteX13" fmla="*/ 4151760 w 4261902"/>
+              <a:gd name="connsiteY13" fmla="*/ 2128179 h 6703211"/>
+              <a:gd name="connsiteX14" fmla="*/ 3800068 w 4261902"/>
+              <a:gd name="connsiteY14" fmla="*/ 3085922 h 6703211"/>
+              <a:gd name="connsiteX15" fmla="*/ 3800068 w 4261902"/>
+              <a:gd name="connsiteY15" fmla="*/ 3886641 h 6703211"/>
+              <a:gd name="connsiteX16" fmla="*/ 3712144 w 4261902"/>
+              <a:gd name="connsiteY16" fmla="*/ 5187902 h 6703211"/>
+              <a:gd name="connsiteX17" fmla="*/ 3348812 w 4261902"/>
+              <a:gd name="connsiteY17" fmla="*/ 6679128 h 6703211"/>
+              <a:gd name="connsiteX18" fmla="*/ 2780160 w 4261902"/>
+              <a:gd name="connsiteY18" fmla="*/ 5469256 h 6703211"/>
+              <a:gd name="connsiteX19" fmla="*/ 2569144 w 4261902"/>
+              <a:gd name="connsiteY19" fmla="*/ 4220749 h 6703211"/>
+              <a:gd name="connsiteX20" fmla="*/ 2182283 w 4261902"/>
+              <a:gd name="connsiteY20" fmla="*/ 3904225 h 6703211"/>
+              <a:gd name="connsiteX21" fmla="*/ 1689914 w 4261902"/>
+              <a:gd name="connsiteY21" fmla="*/ 3974564 h 6703211"/>
+              <a:gd name="connsiteX22" fmla="*/ 1461314 w 4261902"/>
+              <a:gd name="connsiteY22" fmla="*/ 4185579 h 6703211"/>
+              <a:gd name="connsiteX23" fmla="*/ 1338221 w 4261902"/>
+              <a:gd name="connsiteY23" fmla="*/ 5135149 h 6703211"/>
+              <a:gd name="connsiteX24" fmla="*/ 1127206 w 4261902"/>
+              <a:gd name="connsiteY24" fmla="*/ 6137472 h 6703211"/>
+              <a:gd name="connsiteX25" fmla="*/ 845852 w 4261902"/>
+              <a:gd name="connsiteY25" fmla="*/ 6700179 h 6703211"/>
+              <a:gd name="connsiteX26" fmla="*/ 652421 w 4261902"/>
+              <a:gd name="connsiteY26" fmla="*/ 6330902 h 6703211"/>
+              <a:gd name="connsiteX0" fmla="*/ 652421 w 4261902"/>
+              <a:gd name="connsiteY0" fmla="*/ 6330902 h 6703211"/>
+              <a:gd name="connsiteX1" fmla="*/ 494160 w 4261902"/>
+              <a:gd name="connsiteY1" fmla="*/ 5434087 h 6703211"/>
+              <a:gd name="connsiteX2" fmla="*/ 388652 w 4261902"/>
+              <a:gd name="connsiteY2" fmla="*/ 4115241 h 6703211"/>
+              <a:gd name="connsiteX3" fmla="*/ 398063 w 4261902"/>
+              <a:gd name="connsiteY3" fmla="*/ 3104745 h 6703211"/>
+              <a:gd name="connsiteX4" fmla="*/ 177637 w 4261902"/>
+              <a:gd name="connsiteY4" fmla="*/ 2356779 h 6703211"/>
+              <a:gd name="connsiteX5" fmla="*/ 1791 w 4261902"/>
+              <a:gd name="connsiteY5" fmla="*/ 1248949 h 6703211"/>
+              <a:gd name="connsiteX6" fmla="*/ 142468 w 4261902"/>
+              <a:gd name="connsiteY6" fmla="*/ 299379 h 6703211"/>
+              <a:gd name="connsiteX7" fmla="*/ 881021 w 4261902"/>
+              <a:gd name="connsiteY7" fmla="*/ 441 h 6703211"/>
+              <a:gd name="connsiteX8" fmla="*/ 2147114 w 4261902"/>
+              <a:gd name="connsiteY8" fmla="*/ 229041 h 6703211"/>
+              <a:gd name="connsiteX9" fmla="*/ 2850498 w 4261902"/>
+              <a:gd name="connsiteY9" fmla="*/ 88364 h 6703211"/>
+              <a:gd name="connsiteX10" fmla="*/ 3465960 w 4261902"/>
+              <a:gd name="connsiteY10" fmla="*/ 18025 h 6703211"/>
+              <a:gd name="connsiteX11" fmla="*/ 4028668 w 4261902"/>
+              <a:gd name="connsiteY11" fmla="*/ 158702 h 6703211"/>
+              <a:gd name="connsiteX12" fmla="*/ 4257268 w 4261902"/>
+              <a:gd name="connsiteY12" fmla="*/ 967595 h 6703211"/>
+              <a:gd name="connsiteX13" fmla="*/ 4151760 w 4261902"/>
+              <a:gd name="connsiteY13" fmla="*/ 2128179 h 6703211"/>
+              <a:gd name="connsiteX14" fmla="*/ 3800068 w 4261902"/>
+              <a:gd name="connsiteY14" fmla="*/ 3085922 h 6703211"/>
+              <a:gd name="connsiteX15" fmla="*/ 3800068 w 4261902"/>
+              <a:gd name="connsiteY15" fmla="*/ 3886641 h 6703211"/>
+              <a:gd name="connsiteX16" fmla="*/ 3712144 w 4261902"/>
+              <a:gd name="connsiteY16" fmla="*/ 5187902 h 6703211"/>
+              <a:gd name="connsiteX17" fmla="*/ 3348812 w 4261902"/>
+              <a:gd name="connsiteY17" fmla="*/ 6679128 h 6703211"/>
+              <a:gd name="connsiteX18" fmla="*/ 2780160 w 4261902"/>
+              <a:gd name="connsiteY18" fmla="*/ 5469256 h 6703211"/>
+              <a:gd name="connsiteX19" fmla="*/ 2530507 w 4261902"/>
+              <a:gd name="connsiteY19" fmla="*/ 4272264 h 6703211"/>
+              <a:gd name="connsiteX20" fmla="*/ 2182283 w 4261902"/>
+              <a:gd name="connsiteY20" fmla="*/ 3904225 h 6703211"/>
+              <a:gd name="connsiteX21" fmla="*/ 1689914 w 4261902"/>
+              <a:gd name="connsiteY21" fmla="*/ 3974564 h 6703211"/>
+              <a:gd name="connsiteX22" fmla="*/ 1461314 w 4261902"/>
+              <a:gd name="connsiteY22" fmla="*/ 4185579 h 6703211"/>
+              <a:gd name="connsiteX23" fmla="*/ 1338221 w 4261902"/>
+              <a:gd name="connsiteY23" fmla="*/ 5135149 h 6703211"/>
+              <a:gd name="connsiteX24" fmla="*/ 1127206 w 4261902"/>
+              <a:gd name="connsiteY24" fmla="*/ 6137472 h 6703211"/>
+              <a:gd name="connsiteX25" fmla="*/ 845852 w 4261902"/>
+              <a:gd name="connsiteY25" fmla="*/ 6700179 h 6703211"/>
+              <a:gd name="connsiteX26" fmla="*/ 652421 w 4261902"/>
+              <a:gd name="connsiteY26" fmla="*/ 6330902 h 6703211"/>
+              <a:gd name="connsiteX0" fmla="*/ 652421 w 4261902"/>
+              <a:gd name="connsiteY0" fmla="*/ 6330902 h 6703211"/>
+              <a:gd name="connsiteX1" fmla="*/ 494160 w 4261902"/>
+              <a:gd name="connsiteY1" fmla="*/ 5434087 h 6703211"/>
+              <a:gd name="connsiteX2" fmla="*/ 388652 w 4261902"/>
+              <a:gd name="connsiteY2" fmla="*/ 4115241 h 6703211"/>
+              <a:gd name="connsiteX3" fmla="*/ 398063 w 4261902"/>
+              <a:gd name="connsiteY3" fmla="*/ 3104745 h 6703211"/>
+              <a:gd name="connsiteX4" fmla="*/ 177637 w 4261902"/>
+              <a:gd name="connsiteY4" fmla="*/ 2356779 h 6703211"/>
+              <a:gd name="connsiteX5" fmla="*/ 1791 w 4261902"/>
+              <a:gd name="connsiteY5" fmla="*/ 1248949 h 6703211"/>
+              <a:gd name="connsiteX6" fmla="*/ 142468 w 4261902"/>
+              <a:gd name="connsiteY6" fmla="*/ 299379 h 6703211"/>
+              <a:gd name="connsiteX7" fmla="*/ 881021 w 4261902"/>
+              <a:gd name="connsiteY7" fmla="*/ 441 h 6703211"/>
+              <a:gd name="connsiteX8" fmla="*/ 2147114 w 4261902"/>
+              <a:gd name="connsiteY8" fmla="*/ 229041 h 6703211"/>
+              <a:gd name="connsiteX9" fmla="*/ 2850498 w 4261902"/>
+              <a:gd name="connsiteY9" fmla="*/ 88364 h 6703211"/>
+              <a:gd name="connsiteX10" fmla="*/ 3465960 w 4261902"/>
+              <a:gd name="connsiteY10" fmla="*/ 18025 h 6703211"/>
+              <a:gd name="connsiteX11" fmla="*/ 4028668 w 4261902"/>
+              <a:gd name="connsiteY11" fmla="*/ 158702 h 6703211"/>
+              <a:gd name="connsiteX12" fmla="*/ 4257268 w 4261902"/>
+              <a:gd name="connsiteY12" fmla="*/ 967595 h 6703211"/>
+              <a:gd name="connsiteX13" fmla="*/ 4151760 w 4261902"/>
+              <a:gd name="connsiteY13" fmla="*/ 2128179 h 6703211"/>
+              <a:gd name="connsiteX14" fmla="*/ 3800068 w 4261902"/>
+              <a:gd name="connsiteY14" fmla="*/ 3085922 h 6703211"/>
+              <a:gd name="connsiteX15" fmla="*/ 3800068 w 4261902"/>
+              <a:gd name="connsiteY15" fmla="*/ 3886641 h 6703211"/>
+              <a:gd name="connsiteX16" fmla="*/ 3712144 w 4261902"/>
+              <a:gd name="connsiteY16" fmla="*/ 5187902 h 6703211"/>
+              <a:gd name="connsiteX17" fmla="*/ 3348812 w 4261902"/>
+              <a:gd name="connsiteY17" fmla="*/ 6679128 h 6703211"/>
+              <a:gd name="connsiteX18" fmla="*/ 2780160 w 4261902"/>
+              <a:gd name="connsiteY18" fmla="*/ 5469256 h 6703211"/>
+              <a:gd name="connsiteX19" fmla="*/ 2530507 w 4261902"/>
+              <a:gd name="connsiteY19" fmla="*/ 4272264 h 6703211"/>
+              <a:gd name="connsiteX20" fmla="*/ 2182283 w 4261902"/>
+              <a:gd name="connsiteY20" fmla="*/ 3904225 h 6703211"/>
+              <a:gd name="connsiteX21" fmla="*/ 1857339 w 4261902"/>
+              <a:gd name="connsiteY21" fmla="*/ 3884411 h 6703211"/>
+              <a:gd name="connsiteX22" fmla="*/ 1461314 w 4261902"/>
+              <a:gd name="connsiteY22" fmla="*/ 4185579 h 6703211"/>
+              <a:gd name="connsiteX23" fmla="*/ 1338221 w 4261902"/>
+              <a:gd name="connsiteY23" fmla="*/ 5135149 h 6703211"/>
+              <a:gd name="connsiteX24" fmla="*/ 1127206 w 4261902"/>
+              <a:gd name="connsiteY24" fmla="*/ 6137472 h 6703211"/>
+              <a:gd name="connsiteX25" fmla="*/ 845852 w 4261902"/>
+              <a:gd name="connsiteY25" fmla="*/ 6700179 h 6703211"/>
+              <a:gd name="connsiteX26" fmla="*/ 652421 w 4261902"/>
+              <a:gd name="connsiteY26" fmla="*/ 6330902 h 6703211"/>
+              <a:gd name="connsiteX0" fmla="*/ 652421 w 4261902"/>
+              <a:gd name="connsiteY0" fmla="*/ 6330902 h 6703211"/>
+              <a:gd name="connsiteX1" fmla="*/ 494160 w 4261902"/>
+              <a:gd name="connsiteY1" fmla="*/ 5434087 h 6703211"/>
+              <a:gd name="connsiteX2" fmla="*/ 388652 w 4261902"/>
+              <a:gd name="connsiteY2" fmla="*/ 4115241 h 6703211"/>
+              <a:gd name="connsiteX3" fmla="*/ 398063 w 4261902"/>
+              <a:gd name="connsiteY3" fmla="*/ 3104745 h 6703211"/>
+              <a:gd name="connsiteX4" fmla="*/ 177637 w 4261902"/>
+              <a:gd name="connsiteY4" fmla="*/ 2356779 h 6703211"/>
+              <a:gd name="connsiteX5" fmla="*/ 1791 w 4261902"/>
+              <a:gd name="connsiteY5" fmla="*/ 1248949 h 6703211"/>
+              <a:gd name="connsiteX6" fmla="*/ 142468 w 4261902"/>
+              <a:gd name="connsiteY6" fmla="*/ 299379 h 6703211"/>
+              <a:gd name="connsiteX7" fmla="*/ 881021 w 4261902"/>
+              <a:gd name="connsiteY7" fmla="*/ 441 h 6703211"/>
+              <a:gd name="connsiteX8" fmla="*/ 2147114 w 4261902"/>
+              <a:gd name="connsiteY8" fmla="*/ 229041 h 6703211"/>
+              <a:gd name="connsiteX9" fmla="*/ 2850498 w 4261902"/>
+              <a:gd name="connsiteY9" fmla="*/ 88364 h 6703211"/>
+              <a:gd name="connsiteX10" fmla="*/ 3465960 w 4261902"/>
+              <a:gd name="connsiteY10" fmla="*/ 18025 h 6703211"/>
+              <a:gd name="connsiteX11" fmla="*/ 4028668 w 4261902"/>
+              <a:gd name="connsiteY11" fmla="*/ 158702 h 6703211"/>
+              <a:gd name="connsiteX12" fmla="*/ 4257268 w 4261902"/>
+              <a:gd name="connsiteY12" fmla="*/ 967595 h 6703211"/>
+              <a:gd name="connsiteX13" fmla="*/ 4151760 w 4261902"/>
+              <a:gd name="connsiteY13" fmla="*/ 2128179 h 6703211"/>
+              <a:gd name="connsiteX14" fmla="*/ 3800068 w 4261902"/>
+              <a:gd name="connsiteY14" fmla="*/ 3085922 h 6703211"/>
+              <a:gd name="connsiteX15" fmla="*/ 3800068 w 4261902"/>
+              <a:gd name="connsiteY15" fmla="*/ 3886641 h 6703211"/>
+              <a:gd name="connsiteX16" fmla="*/ 3712144 w 4261902"/>
+              <a:gd name="connsiteY16" fmla="*/ 5187902 h 6703211"/>
+              <a:gd name="connsiteX17" fmla="*/ 3348812 w 4261902"/>
+              <a:gd name="connsiteY17" fmla="*/ 6679128 h 6703211"/>
+              <a:gd name="connsiteX18" fmla="*/ 2780160 w 4261902"/>
+              <a:gd name="connsiteY18" fmla="*/ 5469256 h 6703211"/>
+              <a:gd name="connsiteX19" fmla="*/ 2530507 w 4261902"/>
+              <a:gd name="connsiteY19" fmla="*/ 4272264 h 6703211"/>
+              <a:gd name="connsiteX20" fmla="*/ 2182283 w 4261902"/>
+              <a:gd name="connsiteY20" fmla="*/ 3904225 h 6703211"/>
+              <a:gd name="connsiteX21" fmla="*/ 1857339 w 4261902"/>
+              <a:gd name="connsiteY21" fmla="*/ 3884411 h 6703211"/>
+              <a:gd name="connsiteX22" fmla="*/ 1512829 w 4261902"/>
+              <a:gd name="connsiteY22" fmla="*/ 4121184 h 6703211"/>
+              <a:gd name="connsiteX23" fmla="*/ 1338221 w 4261902"/>
+              <a:gd name="connsiteY23" fmla="*/ 5135149 h 6703211"/>
+              <a:gd name="connsiteX24" fmla="*/ 1127206 w 4261902"/>
+              <a:gd name="connsiteY24" fmla="*/ 6137472 h 6703211"/>
+              <a:gd name="connsiteX25" fmla="*/ 845852 w 4261902"/>
+              <a:gd name="connsiteY25" fmla="*/ 6700179 h 6703211"/>
+              <a:gd name="connsiteX26" fmla="*/ 652421 w 4261902"/>
+              <a:gd name="connsiteY26" fmla="*/ 6330902 h 6703211"/>
+              <a:gd name="connsiteX0" fmla="*/ 652421 w 4261902"/>
+              <a:gd name="connsiteY0" fmla="*/ 6330902 h 6703211"/>
+              <a:gd name="connsiteX1" fmla="*/ 494160 w 4261902"/>
+              <a:gd name="connsiteY1" fmla="*/ 5434087 h 6703211"/>
+              <a:gd name="connsiteX2" fmla="*/ 388652 w 4261902"/>
+              <a:gd name="connsiteY2" fmla="*/ 4115241 h 6703211"/>
+              <a:gd name="connsiteX3" fmla="*/ 398063 w 4261902"/>
+              <a:gd name="connsiteY3" fmla="*/ 3104745 h 6703211"/>
+              <a:gd name="connsiteX4" fmla="*/ 177637 w 4261902"/>
+              <a:gd name="connsiteY4" fmla="*/ 2356779 h 6703211"/>
+              <a:gd name="connsiteX5" fmla="*/ 1791 w 4261902"/>
+              <a:gd name="connsiteY5" fmla="*/ 1248949 h 6703211"/>
+              <a:gd name="connsiteX6" fmla="*/ 142468 w 4261902"/>
+              <a:gd name="connsiteY6" fmla="*/ 299379 h 6703211"/>
+              <a:gd name="connsiteX7" fmla="*/ 881021 w 4261902"/>
+              <a:gd name="connsiteY7" fmla="*/ 441 h 6703211"/>
+              <a:gd name="connsiteX8" fmla="*/ 2147114 w 4261902"/>
+              <a:gd name="connsiteY8" fmla="*/ 229041 h 6703211"/>
+              <a:gd name="connsiteX9" fmla="*/ 2850498 w 4261902"/>
+              <a:gd name="connsiteY9" fmla="*/ 88364 h 6703211"/>
+              <a:gd name="connsiteX10" fmla="*/ 3465960 w 4261902"/>
+              <a:gd name="connsiteY10" fmla="*/ 18025 h 6703211"/>
+              <a:gd name="connsiteX11" fmla="*/ 4028668 w 4261902"/>
+              <a:gd name="connsiteY11" fmla="*/ 158702 h 6703211"/>
+              <a:gd name="connsiteX12" fmla="*/ 4257268 w 4261902"/>
+              <a:gd name="connsiteY12" fmla="*/ 967595 h 6703211"/>
+              <a:gd name="connsiteX13" fmla="*/ 4151760 w 4261902"/>
+              <a:gd name="connsiteY13" fmla="*/ 2128179 h 6703211"/>
+              <a:gd name="connsiteX14" fmla="*/ 3800068 w 4261902"/>
+              <a:gd name="connsiteY14" fmla="*/ 3085922 h 6703211"/>
+              <a:gd name="connsiteX15" fmla="*/ 3800068 w 4261902"/>
+              <a:gd name="connsiteY15" fmla="*/ 3886641 h 6703211"/>
+              <a:gd name="connsiteX16" fmla="*/ 3712144 w 4261902"/>
+              <a:gd name="connsiteY16" fmla="*/ 5187902 h 6703211"/>
+              <a:gd name="connsiteX17" fmla="*/ 3348812 w 4261902"/>
+              <a:gd name="connsiteY17" fmla="*/ 6679128 h 6703211"/>
+              <a:gd name="connsiteX18" fmla="*/ 2780160 w 4261902"/>
+              <a:gd name="connsiteY18" fmla="*/ 5469256 h 6703211"/>
+              <a:gd name="connsiteX19" fmla="*/ 2530507 w 4261902"/>
+              <a:gd name="connsiteY19" fmla="*/ 4272264 h 6703211"/>
+              <a:gd name="connsiteX20" fmla="*/ 2182283 w 4261902"/>
+              <a:gd name="connsiteY20" fmla="*/ 3904225 h 6703211"/>
+              <a:gd name="connsiteX21" fmla="*/ 1857339 w 4261902"/>
+              <a:gd name="connsiteY21" fmla="*/ 3884411 h 6703211"/>
+              <a:gd name="connsiteX22" fmla="*/ 1512829 w 4261902"/>
+              <a:gd name="connsiteY22" fmla="*/ 4211337 h 6703211"/>
+              <a:gd name="connsiteX23" fmla="*/ 1338221 w 4261902"/>
+              <a:gd name="connsiteY23" fmla="*/ 5135149 h 6703211"/>
+              <a:gd name="connsiteX24" fmla="*/ 1127206 w 4261902"/>
+              <a:gd name="connsiteY24" fmla="*/ 6137472 h 6703211"/>
+              <a:gd name="connsiteX25" fmla="*/ 845852 w 4261902"/>
+              <a:gd name="connsiteY25" fmla="*/ 6700179 h 6703211"/>
+              <a:gd name="connsiteX26" fmla="*/ 652421 w 4261902"/>
+              <a:gd name="connsiteY26" fmla="*/ 6330902 h 6703211"/>
+              <a:gd name="connsiteX0" fmla="*/ 652421 w 4261902"/>
+              <a:gd name="connsiteY0" fmla="*/ 6330902 h 6703211"/>
+              <a:gd name="connsiteX1" fmla="*/ 494160 w 4261902"/>
+              <a:gd name="connsiteY1" fmla="*/ 5434087 h 6703211"/>
+              <a:gd name="connsiteX2" fmla="*/ 388652 w 4261902"/>
+              <a:gd name="connsiteY2" fmla="*/ 4115241 h 6703211"/>
+              <a:gd name="connsiteX3" fmla="*/ 398063 w 4261902"/>
+              <a:gd name="connsiteY3" fmla="*/ 3104745 h 6703211"/>
+              <a:gd name="connsiteX4" fmla="*/ 177637 w 4261902"/>
+              <a:gd name="connsiteY4" fmla="*/ 2356779 h 6703211"/>
+              <a:gd name="connsiteX5" fmla="*/ 1791 w 4261902"/>
+              <a:gd name="connsiteY5" fmla="*/ 1248949 h 6703211"/>
+              <a:gd name="connsiteX6" fmla="*/ 142468 w 4261902"/>
+              <a:gd name="connsiteY6" fmla="*/ 299379 h 6703211"/>
+              <a:gd name="connsiteX7" fmla="*/ 881021 w 4261902"/>
+              <a:gd name="connsiteY7" fmla="*/ 441 h 6703211"/>
+              <a:gd name="connsiteX8" fmla="*/ 2147114 w 4261902"/>
+              <a:gd name="connsiteY8" fmla="*/ 229041 h 6703211"/>
+              <a:gd name="connsiteX9" fmla="*/ 2850498 w 4261902"/>
+              <a:gd name="connsiteY9" fmla="*/ 88364 h 6703211"/>
+              <a:gd name="connsiteX10" fmla="*/ 3465960 w 4261902"/>
+              <a:gd name="connsiteY10" fmla="*/ 18025 h 6703211"/>
+              <a:gd name="connsiteX11" fmla="*/ 4028668 w 4261902"/>
+              <a:gd name="connsiteY11" fmla="*/ 158702 h 6703211"/>
+              <a:gd name="connsiteX12" fmla="*/ 4257268 w 4261902"/>
+              <a:gd name="connsiteY12" fmla="*/ 967595 h 6703211"/>
+              <a:gd name="connsiteX13" fmla="*/ 4151760 w 4261902"/>
+              <a:gd name="connsiteY13" fmla="*/ 2128179 h 6703211"/>
+              <a:gd name="connsiteX14" fmla="*/ 3800068 w 4261902"/>
+              <a:gd name="connsiteY14" fmla="*/ 3085922 h 6703211"/>
+              <a:gd name="connsiteX15" fmla="*/ 3800068 w 4261902"/>
+              <a:gd name="connsiteY15" fmla="*/ 3886641 h 6703211"/>
+              <a:gd name="connsiteX16" fmla="*/ 3712144 w 4261902"/>
+              <a:gd name="connsiteY16" fmla="*/ 5187902 h 6703211"/>
+              <a:gd name="connsiteX17" fmla="*/ 3348812 w 4261902"/>
+              <a:gd name="connsiteY17" fmla="*/ 6679128 h 6703211"/>
+              <a:gd name="connsiteX18" fmla="*/ 2780160 w 4261902"/>
+              <a:gd name="connsiteY18" fmla="*/ 5469256 h 6703211"/>
+              <a:gd name="connsiteX19" fmla="*/ 2530507 w 4261902"/>
+              <a:gd name="connsiteY19" fmla="*/ 4272264 h 6703211"/>
+              <a:gd name="connsiteX20" fmla="*/ 2233798 w 4261902"/>
+              <a:gd name="connsiteY20" fmla="*/ 3891347 h 6703211"/>
+              <a:gd name="connsiteX21" fmla="*/ 1857339 w 4261902"/>
+              <a:gd name="connsiteY21" fmla="*/ 3884411 h 6703211"/>
+              <a:gd name="connsiteX22" fmla="*/ 1512829 w 4261902"/>
+              <a:gd name="connsiteY22" fmla="*/ 4211337 h 6703211"/>
+              <a:gd name="connsiteX23" fmla="*/ 1338221 w 4261902"/>
+              <a:gd name="connsiteY23" fmla="*/ 5135149 h 6703211"/>
+              <a:gd name="connsiteX24" fmla="*/ 1127206 w 4261902"/>
+              <a:gd name="connsiteY24" fmla="*/ 6137472 h 6703211"/>
+              <a:gd name="connsiteX25" fmla="*/ 845852 w 4261902"/>
+              <a:gd name="connsiteY25" fmla="*/ 6700179 h 6703211"/>
+              <a:gd name="connsiteX26" fmla="*/ 652421 w 4261902"/>
+              <a:gd name="connsiteY26" fmla="*/ 6330902 h 6703211"/>
+              <a:gd name="connsiteX0" fmla="*/ 652421 w 4264883"/>
+              <a:gd name="connsiteY0" fmla="*/ 6330902 h 6703211"/>
+              <a:gd name="connsiteX1" fmla="*/ 494160 w 4264883"/>
+              <a:gd name="connsiteY1" fmla="*/ 5434087 h 6703211"/>
+              <a:gd name="connsiteX2" fmla="*/ 388652 w 4264883"/>
+              <a:gd name="connsiteY2" fmla="*/ 4115241 h 6703211"/>
+              <a:gd name="connsiteX3" fmla="*/ 398063 w 4264883"/>
+              <a:gd name="connsiteY3" fmla="*/ 3104745 h 6703211"/>
+              <a:gd name="connsiteX4" fmla="*/ 177637 w 4264883"/>
+              <a:gd name="connsiteY4" fmla="*/ 2356779 h 6703211"/>
+              <a:gd name="connsiteX5" fmla="*/ 1791 w 4264883"/>
+              <a:gd name="connsiteY5" fmla="*/ 1248949 h 6703211"/>
+              <a:gd name="connsiteX6" fmla="*/ 142468 w 4264883"/>
+              <a:gd name="connsiteY6" fmla="*/ 299379 h 6703211"/>
+              <a:gd name="connsiteX7" fmla="*/ 881021 w 4264883"/>
+              <a:gd name="connsiteY7" fmla="*/ 441 h 6703211"/>
+              <a:gd name="connsiteX8" fmla="*/ 2147114 w 4264883"/>
+              <a:gd name="connsiteY8" fmla="*/ 229041 h 6703211"/>
+              <a:gd name="connsiteX9" fmla="*/ 2850498 w 4264883"/>
+              <a:gd name="connsiteY9" fmla="*/ 88364 h 6703211"/>
+              <a:gd name="connsiteX10" fmla="*/ 3465960 w 4264883"/>
+              <a:gd name="connsiteY10" fmla="*/ 18025 h 6703211"/>
+              <a:gd name="connsiteX11" fmla="*/ 3977152 w 4264883"/>
+              <a:gd name="connsiteY11" fmla="*/ 184460 h 6703211"/>
+              <a:gd name="connsiteX12" fmla="*/ 4257268 w 4264883"/>
+              <a:gd name="connsiteY12" fmla="*/ 967595 h 6703211"/>
+              <a:gd name="connsiteX13" fmla="*/ 4151760 w 4264883"/>
+              <a:gd name="connsiteY13" fmla="*/ 2128179 h 6703211"/>
+              <a:gd name="connsiteX14" fmla="*/ 3800068 w 4264883"/>
+              <a:gd name="connsiteY14" fmla="*/ 3085922 h 6703211"/>
+              <a:gd name="connsiteX15" fmla="*/ 3800068 w 4264883"/>
+              <a:gd name="connsiteY15" fmla="*/ 3886641 h 6703211"/>
+              <a:gd name="connsiteX16" fmla="*/ 3712144 w 4264883"/>
+              <a:gd name="connsiteY16" fmla="*/ 5187902 h 6703211"/>
+              <a:gd name="connsiteX17" fmla="*/ 3348812 w 4264883"/>
+              <a:gd name="connsiteY17" fmla="*/ 6679128 h 6703211"/>
+              <a:gd name="connsiteX18" fmla="*/ 2780160 w 4264883"/>
+              <a:gd name="connsiteY18" fmla="*/ 5469256 h 6703211"/>
+              <a:gd name="connsiteX19" fmla="*/ 2530507 w 4264883"/>
+              <a:gd name="connsiteY19" fmla="*/ 4272264 h 6703211"/>
+              <a:gd name="connsiteX20" fmla="*/ 2233798 w 4264883"/>
+              <a:gd name="connsiteY20" fmla="*/ 3891347 h 6703211"/>
+              <a:gd name="connsiteX21" fmla="*/ 1857339 w 4264883"/>
+              <a:gd name="connsiteY21" fmla="*/ 3884411 h 6703211"/>
+              <a:gd name="connsiteX22" fmla="*/ 1512829 w 4264883"/>
+              <a:gd name="connsiteY22" fmla="*/ 4211337 h 6703211"/>
+              <a:gd name="connsiteX23" fmla="*/ 1338221 w 4264883"/>
+              <a:gd name="connsiteY23" fmla="*/ 5135149 h 6703211"/>
+              <a:gd name="connsiteX24" fmla="*/ 1127206 w 4264883"/>
+              <a:gd name="connsiteY24" fmla="*/ 6137472 h 6703211"/>
+              <a:gd name="connsiteX25" fmla="*/ 845852 w 4264883"/>
+              <a:gd name="connsiteY25" fmla="*/ 6700179 h 6703211"/>
+              <a:gd name="connsiteX26" fmla="*/ 652421 w 4264883"/>
+              <a:gd name="connsiteY26" fmla="*/ 6330902 h 6703211"/>
+              <a:gd name="connsiteX0" fmla="*/ 652421 w 4261876"/>
+              <a:gd name="connsiteY0" fmla="*/ 6330902 h 6703211"/>
+              <a:gd name="connsiteX1" fmla="*/ 494160 w 4261876"/>
+              <a:gd name="connsiteY1" fmla="*/ 5434087 h 6703211"/>
+              <a:gd name="connsiteX2" fmla="*/ 388652 w 4261876"/>
+              <a:gd name="connsiteY2" fmla="*/ 4115241 h 6703211"/>
+              <a:gd name="connsiteX3" fmla="*/ 398063 w 4261876"/>
+              <a:gd name="connsiteY3" fmla="*/ 3104745 h 6703211"/>
+              <a:gd name="connsiteX4" fmla="*/ 177637 w 4261876"/>
+              <a:gd name="connsiteY4" fmla="*/ 2356779 h 6703211"/>
+              <a:gd name="connsiteX5" fmla="*/ 1791 w 4261876"/>
+              <a:gd name="connsiteY5" fmla="*/ 1248949 h 6703211"/>
+              <a:gd name="connsiteX6" fmla="*/ 142468 w 4261876"/>
+              <a:gd name="connsiteY6" fmla="*/ 299379 h 6703211"/>
+              <a:gd name="connsiteX7" fmla="*/ 881021 w 4261876"/>
+              <a:gd name="connsiteY7" fmla="*/ 441 h 6703211"/>
+              <a:gd name="connsiteX8" fmla="*/ 2147114 w 4261876"/>
+              <a:gd name="connsiteY8" fmla="*/ 229041 h 6703211"/>
+              <a:gd name="connsiteX9" fmla="*/ 2850498 w 4261876"/>
+              <a:gd name="connsiteY9" fmla="*/ 88364 h 6703211"/>
+              <a:gd name="connsiteX10" fmla="*/ 3465960 w 4261876"/>
+              <a:gd name="connsiteY10" fmla="*/ 18025 h 6703211"/>
+              <a:gd name="connsiteX11" fmla="*/ 3977152 w 4261876"/>
+              <a:gd name="connsiteY11" fmla="*/ 184460 h 6703211"/>
+              <a:gd name="connsiteX12" fmla="*/ 4257268 w 4261876"/>
+              <a:gd name="connsiteY12" fmla="*/ 967595 h 6703211"/>
+              <a:gd name="connsiteX13" fmla="*/ 4126002 w 4261876"/>
+              <a:gd name="connsiteY13" fmla="*/ 2269846 h 6703211"/>
+              <a:gd name="connsiteX14" fmla="*/ 3800068 w 4261876"/>
+              <a:gd name="connsiteY14" fmla="*/ 3085922 h 6703211"/>
+              <a:gd name="connsiteX15" fmla="*/ 3800068 w 4261876"/>
+              <a:gd name="connsiteY15" fmla="*/ 3886641 h 6703211"/>
+              <a:gd name="connsiteX16" fmla="*/ 3712144 w 4261876"/>
+              <a:gd name="connsiteY16" fmla="*/ 5187902 h 6703211"/>
+              <a:gd name="connsiteX17" fmla="*/ 3348812 w 4261876"/>
+              <a:gd name="connsiteY17" fmla="*/ 6679128 h 6703211"/>
+              <a:gd name="connsiteX18" fmla="*/ 2780160 w 4261876"/>
+              <a:gd name="connsiteY18" fmla="*/ 5469256 h 6703211"/>
+              <a:gd name="connsiteX19" fmla="*/ 2530507 w 4261876"/>
+              <a:gd name="connsiteY19" fmla="*/ 4272264 h 6703211"/>
+              <a:gd name="connsiteX20" fmla="*/ 2233798 w 4261876"/>
+              <a:gd name="connsiteY20" fmla="*/ 3891347 h 6703211"/>
+              <a:gd name="connsiteX21" fmla="*/ 1857339 w 4261876"/>
+              <a:gd name="connsiteY21" fmla="*/ 3884411 h 6703211"/>
+              <a:gd name="connsiteX22" fmla="*/ 1512829 w 4261876"/>
+              <a:gd name="connsiteY22" fmla="*/ 4211337 h 6703211"/>
+              <a:gd name="connsiteX23" fmla="*/ 1338221 w 4261876"/>
+              <a:gd name="connsiteY23" fmla="*/ 5135149 h 6703211"/>
+              <a:gd name="connsiteX24" fmla="*/ 1127206 w 4261876"/>
+              <a:gd name="connsiteY24" fmla="*/ 6137472 h 6703211"/>
+              <a:gd name="connsiteX25" fmla="*/ 845852 w 4261876"/>
+              <a:gd name="connsiteY25" fmla="*/ 6700179 h 6703211"/>
+              <a:gd name="connsiteX26" fmla="*/ 652421 w 4261876"/>
+              <a:gd name="connsiteY26" fmla="*/ 6330902 h 6703211"/>
+              <a:gd name="connsiteX0" fmla="*/ 652421 w 4261876"/>
+              <a:gd name="connsiteY0" fmla="*/ 6330895 h 6703204"/>
+              <a:gd name="connsiteX1" fmla="*/ 494160 w 4261876"/>
+              <a:gd name="connsiteY1" fmla="*/ 5434080 h 6703204"/>
+              <a:gd name="connsiteX2" fmla="*/ 388652 w 4261876"/>
+              <a:gd name="connsiteY2" fmla="*/ 4115234 h 6703204"/>
+              <a:gd name="connsiteX3" fmla="*/ 398063 w 4261876"/>
+              <a:gd name="connsiteY3" fmla="*/ 3104738 h 6703204"/>
+              <a:gd name="connsiteX4" fmla="*/ 177637 w 4261876"/>
+              <a:gd name="connsiteY4" fmla="*/ 2356772 h 6703204"/>
+              <a:gd name="connsiteX5" fmla="*/ 1791 w 4261876"/>
+              <a:gd name="connsiteY5" fmla="*/ 1248942 h 6703204"/>
+              <a:gd name="connsiteX6" fmla="*/ 142468 w 4261876"/>
+              <a:gd name="connsiteY6" fmla="*/ 299372 h 6703204"/>
+              <a:gd name="connsiteX7" fmla="*/ 881021 w 4261876"/>
+              <a:gd name="connsiteY7" fmla="*/ 434 h 6703204"/>
+              <a:gd name="connsiteX8" fmla="*/ 2147114 w 4261876"/>
+              <a:gd name="connsiteY8" fmla="*/ 229034 h 6703204"/>
+              <a:gd name="connsiteX9" fmla="*/ 2811861 w 4261876"/>
+              <a:gd name="connsiteY9" fmla="*/ 62599 h 6703204"/>
+              <a:gd name="connsiteX10" fmla="*/ 3465960 w 4261876"/>
+              <a:gd name="connsiteY10" fmla="*/ 18018 h 6703204"/>
+              <a:gd name="connsiteX11" fmla="*/ 3977152 w 4261876"/>
+              <a:gd name="connsiteY11" fmla="*/ 184453 h 6703204"/>
+              <a:gd name="connsiteX12" fmla="*/ 4257268 w 4261876"/>
+              <a:gd name="connsiteY12" fmla="*/ 967588 h 6703204"/>
+              <a:gd name="connsiteX13" fmla="*/ 4126002 w 4261876"/>
+              <a:gd name="connsiteY13" fmla="*/ 2269839 h 6703204"/>
+              <a:gd name="connsiteX14" fmla="*/ 3800068 w 4261876"/>
+              <a:gd name="connsiteY14" fmla="*/ 3085915 h 6703204"/>
+              <a:gd name="connsiteX15" fmla="*/ 3800068 w 4261876"/>
+              <a:gd name="connsiteY15" fmla="*/ 3886634 h 6703204"/>
+              <a:gd name="connsiteX16" fmla="*/ 3712144 w 4261876"/>
+              <a:gd name="connsiteY16" fmla="*/ 5187895 h 6703204"/>
+              <a:gd name="connsiteX17" fmla="*/ 3348812 w 4261876"/>
+              <a:gd name="connsiteY17" fmla="*/ 6679121 h 6703204"/>
+              <a:gd name="connsiteX18" fmla="*/ 2780160 w 4261876"/>
+              <a:gd name="connsiteY18" fmla="*/ 5469249 h 6703204"/>
+              <a:gd name="connsiteX19" fmla="*/ 2530507 w 4261876"/>
+              <a:gd name="connsiteY19" fmla="*/ 4272257 h 6703204"/>
+              <a:gd name="connsiteX20" fmla="*/ 2233798 w 4261876"/>
+              <a:gd name="connsiteY20" fmla="*/ 3891340 h 6703204"/>
+              <a:gd name="connsiteX21" fmla="*/ 1857339 w 4261876"/>
+              <a:gd name="connsiteY21" fmla="*/ 3884404 h 6703204"/>
+              <a:gd name="connsiteX22" fmla="*/ 1512829 w 4261876"/>
+              <a:gd name="connsiteY22" fmla="*/ 4211330 h 6703204"/>
+              <a:gd name="connsiteX23" fmla="*/ 1338221 w 4261876"/>
+              <a:gd name="connsiteY23" fmla="*/ 5135142 h 6703204"/>
+              <a:gd name="connsiteX24" fmla="*/ 1127206 w 4261876"/>
+              <a:gd name="connsiteY24" fmla="*/ 6137465 h 6703204"/>
+              <a:gd name="connsiteX25" fmla="*/ 845852 w 4261876"/>
+              <a:gd name="connsiteY25" fmla="*/ 6700172 h 6703204"/>
+              <a:gd name="connsiteX26" fmla="*/ 652421 w 4261876"/>
+              <a:gd name="connsiteY26" fmla="*/ 6330895 h 6703204"/>
+              <a:gd name="connsiteX0" fmla="*/ 652421 w 4261876"/>
+              <a:gd name="connsiteY0" fmla="*/ 6331638 h 6703947"/>
+              <a:gd name="connsiteX1" fmla="*/ 494160 w 4261876"/>
+              <a:gd name="connsiteY1" fmla="*/ 5434823 h 6703947"/>
+              <a:gd name="connsiteX2" fmla="*/ 388652 w 4261876"/>
+              <a:gd name="connsiteY2" fmla="*/ 4115977 h 6703947"/>
+              <a:gd name="connsiteX3" fmla="*/ 398063 w 4261876"/>
+              <a:gd name="connsiteY3" fmla="*/ 3105481 h 6703947"/>
+              <a:gd name="connsiteX4" fmla="*/ 177637 w 4261876"/>
+              <a:gd name="connsiteY4" fmla="*/ 2357515 h 6703947"/>
+              <a:gd name="connsiteX5" fmla="*/ 1791 w 4261876"/>
+              <a:gd name="connsiteY5" fmla="*/ 1249685 h 6703947"/>
+              <a:gd name="connsiteX6" fmla="*/ 142468 w 4261876"/>
+              <a:gd name="connsiteY6" fmla="*/ 300115 h 6703947"/>
+              <a:gd name="connsiteX7" fmla="*/ 881021 w 4261876"/>
+              <a:gd name="connsiteY7" fmla="*/ 1177 h 6703947"/>
+              <a:gd name="connsiteX8" fmla="*/ 2121357 w 4261876"/>
+              <a:gd name="connsiteY8" fmla="*/ 191140 h 6703947"/>
+              <a:gd name="connsiteX9" fmla="*/ 2811861 w 4261876"/>
+              <a:gd name="connsiteY9" fmla="*/ 63342 h 6703947"/>
+              <a:gd name="connsiteX10" fmla="*/ 3465960 w 4261876"/>
+              <a:gd name="connsiteY10" fmla="*/ 18761 h 6703947"/>
+              <a:gd name="connsiteX11" fmla="*/ 3977152 w 4261876"/>
+              <a:gd name="connsiteY11" fmla="*/ 185196 h 6703947"/>
+              <a:gd name="connsiteX12" fmla="*/ 4257268 w 4261876"/>
+              <a:gd name="connsiteY12" fmla="*/ 968331 h 6703947"/>
+              <a:gd name="connsiteX13" fmla="*/ 4126002 w 4261876"/>
+              <a:gd name="connsiteY13" fmla="*/ 2270582 h 6703947"/>
+              <a:gd name="connsiteX14" fmla="*/ 3800068 w 4261876"/>
+              <a:gd name="connsiteY14" fmla="*/ 3086658 h 6703947"/>
+              <a:gd name="connsiteX15" fmla="*/ 3800068 w 4261876"/>
+              <a:gd name="connsiteY15" fmla="*/ 3887377 h 6703947"/>
+              <a:gd name="connsiteX16" fmla="*/ 3712144 w 4261876"/>
+              <a:gd name="connsiteY16" fmla="*/ 5188638 h 6703947"/>
+              <a:gd name="connsiteX17" fmla="*/ 3348812 w 4261876"/>
+              <a:gd name="connsiteY17" fmla="*/ 6679864 h 6703947"/>
+              <a:gd name="connsiteX18" fmla="*/ 2780160 w 4261876"/>
+              <a:gd name="connsiteY18" fmla="*/ 5469992 h 6703947"/>
+              <a:gd name="connsiteX19" fmla="*/ 2530507 w 4261876"/>
+              <a:gd name="connsiteY19" fmla="*/ 4273000 h 6703947"/>
+              <a:gd name="connsiteX20" fmla="*/ 2233798 w 4261876"/>
+              <a:gd name="connsiteY20" fmla="*/ 3892083 h 6703947"/>
+              <a:gd name="connsiteX21" fmla="*/ 1857339 w 4261876"/>
+              <a:gd name="connsiteY21" fmla="*/ 3885147 h 6703947"/>
+              <a:gd name="connsiteX22" fmla="*/ 1512829 w 4261876"/>
+              <a:gd name="connsiteY22" fmla="*/ 4212073 h 6703947"/>
+              <a:gd name="connsiteX23" fmla="*/ 1338221 w 4261876"/>
+              <a:gd name="connsiteY23" fmla="*/ 5135885 h 6703947"/>
+              <a:gd name="connsiteX24" fmla="*/ 1127206 w 4261876"/>
+              <a:gd name="connsiteY24" fmla="*/ 6138208 h 6703947"/>
+              <a:gd name="connsiteX25" fmla="*/ 845852 w 4261876"/>
+              <a:gd name="connsiteY25" fmla="*/ 6700915 h 6703947"/>
+              <a:gd name="connsiteX26" fmla="*/ 652421 w 4261876"/>
+              <a:gd name="connsiteY26" fmla="*/ 6331638 h 6703947"/>
+              <a:gd name="connsiteX0" fmla="*/ 652421 w 4257613"/>
+              <a:gd name="connsiteY0" fmla="*/ 6331638 h 6703947"/>
+              <a:gd name="connsiteX1" fmla="*/ 494160 w 4257613"/>
+              <a:gd name="connsiteY1" fmla="*/ 5434823 h 6703947"/>
+              <a:gd name="connsiteX2" fmla="*/ 388652 w 4257613"/>
+              <a:gd name="connsiteY2" fmla="*/ 4115977 h 6703947"/>
+              <a:gd name="connsiteX3" fmla="*/ 398063 w 4257613"/>
+              <a:gd name="connsiteY3" fmla="*/ 3105481 h 6703947"/>
+              <a:gd name="connsiteX4" fmla="*/ 177637 w 4257613"/>
+              <a:gd name="connsiteY4" fmla="*/ 2357515 h 6703947"/>
+              <a:gd name="connsiteX5" fmla="*/ 1791 w 4257613"/>
+              <a:gd name="connsiteY5" fmla="*/ 1249685 h 6703947"/>
+              <a:gd name="connsiteX6" fmla="*/ 142468 w 4257613"/>
+              <a:gd name="connsiteY6" fmla="*/ 300115 h 6703947"/>
+              <a:gd name="connsiteX7" fmla="*/ 881021 w 4257613"/>
+              <a:gd name="connsiteY7" fmla="*/ 1177 h 6703947"/>
+              <a:gd name="connsiteX8" fmla="*/ 2121357 w 4257613"/>
+              <a:gd name="connsiteY8" fmla="*/ 191140 h 6703947"/>
+              <a:gd name="connsiteX9" fmla="*/ 2811861 w 4257613"/>
+              <a:gd name="connsiteY9" fmla="*/ 63342 h 6703947"/>
+              <a:gd name="connsiteX10" fmla="*/ 3465960 w 4257613"/>
+              <a:gd name="connsiteY10" fmla="*/ 18761 h 6703947"/>
+              <a:gd name="connsiteX11" fmla="*/ 4093061 w 4257613"/>
+              <a:gd name="connsiteY11" fmla="*/ 236711 h 6703947"/>
+              <a:gd name="connsiteX12" fmla="*/ 4257268 w 4257613"/>
+              <a:gd name="connsiteY12" fmla="*/ 968331 h 6703947"/>
+              <a:gd name="connsiteX13" fmla="*/ 4126002 w 4257613"/>
+              <a:gd name="connsiteY13" fmla="*/ 2270582 h 6703947"/>
+              <a:gd name="connsiteX14" fmla="*/ 3800068 w 4257613"/>
+              <a:gd name="connsiteY14" fmla="*/ 3086658 h 6703947"/>
+              <a:gd name="connsiteX15" fmla="*/ 3800068 w 4257613"/>
+              <a:gd name="connsiteY15" fmla="*/ 3887377 h 6703947"/>
+              <a:gd name="connsiteX16" fmla="*/ 3712144 w 4257613"/>
+              <a:gd name="connsiteY16" fmla="*/ 5188638 h 6703947"/>
+              <a:gd name="connsiteX17" fmla="*/ 3348812 w 4257613"/>
+              <a:gd name="connsiteY17" fmla="*/ 6679864 h 6703947"/>
+              <a:gd name="connsiteX18" fmla="*/ 2780160 w 4257613"/>
+              <a:gd name="connsiteY18" fmla="*/ 5469992 h 6703947"/>
+              <a:gd name="connsiteX19" fmla="*/ 2530507 w 4257613"/>
+              <a:gd name="connsiteY19" fmla="*/ 4273000 h 6703947"/>
+              <a:gd name="connsiteX20" fmla="*/ 2233798 w 4257613"/>
+              <a:gd name="connsiteY20" fmla="*/ 3892083 h 6703947"/>
+              <a:gd name="connsiteX21" fmla="*/ 1857339 w 4257613"/>
+              <a:gd name="connsiteY21" fmla="*/ 3885147 h 6703947"/>
+              <a:gd name="connsiteX22" fmla="*/ 1512829 w 4257613"/>
+              <a:gd name="connsiteY22" fmla="*/ 4212073 h 6703947"/>
+              <a:gd name="connsiteX23" fmla="*/ 1338221 w 4257613"/>
+              <a:gd name="connsiteY23" fmla="*/ 5135885 h 6703947"/>
+              <a:gd name="connsiteX24" fmla="*/ 1127206 w 4257613"/>
+              <a:gd name="connsiteY24" fmla="*/ 6138208 h 6703947"/>
+              <a:gd name="connsiteX25" fmla="*/ 845852 w 4257613"/>
+              <a:gd name="connsiteY25" fmla="*/ 6700915 h 6703947"/>
+              <a:gd name="connsiteX26" fmla="*/ 652421 w 4257613"/>
+              <a:gd name="connsiteY26" fmla="*/ 6331638 h 6703947"/>
+              <a:gd name="connsiteX0" fmla="*/ 652421 w 4258651"/>
+              <a:gd name="connsiteY0" fmla="*/ 6331638 h 6703947"/>
+              <a:gd name="connsiteX1" fmla="*/ 494160 w 4258651"/>
+              <a:gd name="connsiteY1" fmla="*/ 5434823 h 6703947"/>
+              <a:gd name="connsiteX2" fmla="*/ 388652 w 4258651"/>
+              <a:gd name="connsiteY2" fmla="*/ 4115977 h 6703947"/>
+              <a:gd name="connsiteX3" fmla="*/ 398063 w 4258651"/>
+              <a:gd name="connsiteY3" fmla="*/ 3105481 h 6703947"/>
+              <a:gd name="connsiteX4" fmla="*/ 177637 w 4258651"/>
+              <a:gd name="connsiteY4" fmla="*/ 2357515 h 6703947"/>
+              <a:gd name="connsiteX5" fmla="*/ 1791 w 4258651"/>
+              <a:gd name="connsiteY5" fmla="*/ 1249685 h 6703947"/>
+              <a:gd name="connsiteX6" fmla="*/ 142468 w 4258651"/>
+              <a:gd name="connsiteY6" fmla="*/ 300115 h 6703947"/>
+              <a:gd name="connsiteX7" fmla="*/ 881021 w 4258651"/>
+              <a:gd name="connsiteY7" fmla="*/ 1177 h 6703947"/>
+              <a:gd name="connsiteX8" fmla="*/ 2121357 w 4258651"/>
+              <a:gd name="connsiteY8" fmla="*/ 191140 h 6703947"/>
+              <a:gd name="connsiteX9" fmla="*/ 2811861 w 4258651"/>
+              <a:gd name="connsiteY9" fmla="*/ 63342 h 6703947"/>
+              <a:gd name="connsiteX10" fmla="*/ 3465960 w 4258651"/>
+              <a:gd name="connsiteY10" fmla="*/ 18761 h 6703947"/>
+              <a:gd name="connsiteX11" fmla="*/ 4054425 w 4258651"/>
+              <a:gd name="connsiteY11" fmla="*/ 236711 h 6703947"/>
+              <a:gd name="connsiteX12" fmla="*/ 4257268 w 4258651"/>
+              <a:gd name="connsiteY12" fmla="*/ 968331 h 6703947"/>
+              <a:gd name="connsiteX13" fmla="*/ 4126002 w 4258651"/>
+              <a:gd name="connsiteY13" fmla="*/ 2270582 h 6703947"/>
+              <a:gd name="connsiteX14" fmla="*/ 3800068 w 4258651"/>
+              <a:gd name="connsiteY14" fmla="*/ 3086658 h 6703947"/>
+              <a:gd name="connsiteX15" fmla="*/ 3800068 w 4258651"/>
+              <a:gd name="connsiteY15" fmla="*/ 3887377 h 6703947"/>
+              <a:gd name="connsiteX16" fmla="*/ 3712144 w 4258651"/>
+              <a:gd name="connsiteY16" fmla="*/ 5188638 h 6703947"/>
+              <a:gd name="connsiteX17" fmla="*/ 3348812 w 4258651"/>
+              <a:gd name="connsiteY17" fmla="*/ 6679864 h 6703947"/>
+              <a:gd name="connsiteX18" fmla="*/ 2780160 w 4258651"/>
+              <a:gd name="connsiteY18" fmla="*/ 5469992 h 6703947"/>
+              <a:gd name="connsiteX19" fmla="*/ 2530507 w 4258651"/>
+              <a:gd name="connsiteY19" fmla="*/ 4273000 h 6703947"/>
+              <a:gd name="connsiteX20" fmla="*/ 2233798 w 4258651"/>
+              <a:gd name="connsiteY20" fmla="*/ 3892083 h 6703947"/>
+              <a:gd name="connsiteX21" fmla="*/ 1857339 w 4258651"/>
+              <a:gd name="connsiteY21" fmla="*/ 3885147 h 6703947"/>
+              <a:gd name="connsiteX22" fmla="*/ 1512829 w 4258651"/>
+              <a:gd name="connsiteY22" fmla="*/ 4212073 h 6703947"/>
+              <a:gd name="connsiteX23" fmla="*/ 1338221 w 4258651"/>
+              <a:gd name="connsiteY23" fmla="*/ 5135885 h 6703947"/>
+              <a:gd name="connsiteX24" fmla="*/ 1127206 w 4258651"/>
+              <a:gd name="connsiteY24" fmla="*/ 6138208 h 6703947"/>
+              <a:gd name="connsiteX25" fmla="*/ 845852 w 4258651"/>
+              <a:gd name="connsiteY25" fmla="*/ 6700915 h 6703947"/>
+              <a:gd name="connsiteX26" fmla="*/ 652421 w 4258651"/>
+              <a:gd name="connsiteY26" fmla="*/ 6331638 h 6703947"/>
+              <a:gd name="connsiteX0" fmla="*/ 652421 w 4258651"/>
+              <a:gd name="connsiteY0" fmla="*/ 6331638 h 6703947"/>
+              <a:gd name="connsiteX1" fmla="*/ 494160 w 4258651"/>
+              <a:gd name="connsiteY1" fmla="*/ 5434823 h 6703947"/>
+              <a:gd name="connsiteX2" fmla="*/ 388652 w 4258651"/>
+              <a:gd name="connsiteY2" fmla="*/ 4115977 h 6703947"/>
+              <a:gd name="connsiteX3" fmla="*/ 398063 w 4258651"/>
+              <a:gd name="connsiteY3" fmla="*/ 3105481 h 6703947"/>
+              <a:gd name="connsiteX4" fmla="*/ 177637 w 4258651"/>
+              <a:gd name="connsiteY4" fmla="*/ 2357515 h 6703947"/>
+              <a:gd name="connsiteX5" fmla="*/ 1791 w 4258651"/>
+              <a:gd name="connsiteY5" fmla="*/ 1249685 h 6703947"/>
+              <a:gd name="connsiteX6" fmla="*/ 142468 w 4258651"/>
+              <a:gd name="connsiteY6" fmla="*/ 300115 h 6703947"/>
+              <a:gd name="connsiteX7" fmla="*/ 881021 w 4258651"/>
+              <a:gd name="connsiteY7" fmla="*/ 1177 h 6703947"/>
+              <a:gd name="connsiteX8" fmla="*/ 2121357 w 4258651"/>
+              <a:gd name="connsiteY8" fmla="*/ 191140 h 6703947"/>
+              <a:gd name="connsiteX9" fmla="*/ 2811861 w 4258651"/>
+              <a:gd name="connsiteY9" fmla="*/ 63342 h 6703947"/>
+              <a:gd name="connsiteX10" fmla="*/ 3465960 w 4258651"/>
+              <a:gd name="connsiteY10" fmla="*/ 18761 h 6703947"/>
+              <a:gd name="connsiteX11" fmla="*/ 4054425 w 4258651"/>
+              <a:gd name="connsiteY11" fmla="*/ 236711 h 6703947"/>
+              <a:gd name="connsiteX12" fmla="*/ 4257268 w 4258651"/>
+              <a:gd name="connsiteY12" fmla="*/ 968331 h 6703947"/>
+              <a:gd name="connsiteX13" fmla="*/ 4126002 w 4258651"/>
+              <a:gd name="connsiteY13" fmla="*/ 2270582 h 6703947"/>
+              <a:gd name="connsiteX14" fmla="*/ 3800068 w 4258651"/>
+              <a:gd name="connsiteY14" fmla="*/ 3086658 h 6703947"/>
+              <a:gd name="connsiteX15" fmla="*/ 3800068 w 4258651"/>
+              <a:gd name="connsiteY15" fmla="*/ 3887377 h 6703947"/>
+              <a:gd name="connsiteX16" fmla="*/ 3712144 w 4258651"/>
+              <a:gd name="connsiteY16" fmla="*/ 5188638 h 6703947"/>
+              <a:gd name="connsiteX17" fmla="*/ 3348812 w 4258651"/>
+              <a:gd name="connsiteY17" fmla="*/ 6679864 h 6703947"/>
+              <a:gd name="connsiteX18" fmla="*/ 2780160 w 4258651"/>
+              <a:gd name="connsiteY18" fmla="*/ 5469992 h 6703947"/>
+              <a:gd name="connsiteX19" fmla="*/ 2530507 w 4258651"/>
+              <a:gd name="connsiteY19" fmla="*/ 4273000 h 6703947"/>
+              <a:gd name="connsiteX20" fmla="*/ 2272435 w 4258651"/>
+              <a:gd name="connsiteY20" fmla="*/ 3892083 h 6703947"/>
+              <a:gd name="connsiteX21" fmla="*/ 1857339 w 4258651"/>
+              <a:gd name="connsiteY21" fmla="*/ 3885147 h 6703947"/>
+              <a:gd name="connsiteX22" fmla="*/ 1512829 w 4258651"/>
+              <a:gd name="connsiteY22" fmla="*/ 4212073 h 6703947"/>
+              <a:gd name="connsiteX23" fmla="*/ 1338221 w 4258651"/>
+              <a:gd name="connsiteY23" fmla="*/ 5135885 h 6703947"/>
+              <a:gd name="connsiteX24" fmla="*/ 1127206 w 4258651"/>
+              <a:gd name="connsiteY24" fmla="*/ 6138208 h 6703947"/>
+              <a:gd name="connsiteX25" fmla="*/ 845852 w 4258651"/>
+              <a:gd name="connsiteY25" fmla="*/ 6700915 h 6703947"/>
+              <a:gd name="connsiteX26" fmla="*/ 652421 w 4258651"/>
+              <a:gd name="connsiteY26" fmla="*/ 6331638 h 6703947"/>
+              <a:gd name="connsiteX0" fmla="*/ 652421 w 4258651"/>
+              <a:gd name="connsiteY0" fmla="*/ 6331638 h 6703947"/>
+              <a:gd name="connsiteX1" fmla="*/ 494160 w 4258651"/>
+              <a:gd name="connsiteY1" fmla="*/ 5434823 h 6703947"/>
+              <a:gd name="connsiteX2" fmla="*/ 388652 w 4258651"/>
+              <a:gd name="connsiteY2" fmla="*/ 4115977 h 6703947"/>
+              <a:gd name="connsiteX3" fmla="*/ 398063 w 4258651"/>
+              <a:gd name="connsiteY3" fmla="*/ 3105481 h 6703947"/>
+              <a:gd name="connsiteX4" fmla="*/ 177637 w 4258651"/>
+              <a:gd name="connsiteY4" fmla="*/ 2357515 h 6703947"/>
+              <a:gd name="connsiteX5" fmla="*/ 1791 w 4258651"/>
+              <a:gd name="connsiteY5" fmla="*/ 1249685 h 6703947"/>
+              <a:gd name="connsiteX6" fmla="*/ 142468 w 4258651"/>
+              <a:gd name="connsiteY6" fmla="*/ 300115 h 6703947"/>
+              <a:gd name="connsiteX7" fmla="*/ 881021 w 4258651"/>
+              <a:gd name="connsiteY7" fmla="*/ 1177 h 6703947"/>
+              <a:gd name="connsiteX8" fmla="*/ 2121357 w 4258651"/>
+              <a:gd name="connsiteY8" fmla="*/ 191140 h 6703947"/>
+              <a:gd name="connsiteX9" fmla="*/ 2811861 w 4258651"/>
+              <a:gd name="connsiteY9" fmla="*/ 63342 h 6703947"/>
+              <a:gd name="connsiteX10" fmla="*/ 3465960 w 4258651"/>
+              <a:gd name="connsiteY10" fmla="*/ 18761 h 6703947"/>
+              <a:gd name="connsiteX11" fmla="*/ 4054425 w 4258651"/>
+              <a:gd name="connsiteY11" fmla="*/ 236711 h 6703947"/>
+              <a:gd name="connsiteX12" fmla="*/ 4257268 w 4258651"/>
+              <a:gd name="connsiteY12" fmla="*/ 968331 h 6703947"/>
+              <a:gd name="connsiteX13" fmla="*/ 4126002 w 4258651"/>
+              <a:gd name="connsiteY13" fmla="*/ 2270582 h 6703947"/>
+              <a:gd name="connsiteX14" fmla="*/ 3800068 w 4258651"/>
+              <a:gd name="connsiteY14" fmla="*/ 3086658 h 6703947"/>
+              <a:gd name="connsiteX15" fmla="*/ 3800068 w 4258651"/>
+              <a:gd name="connsiteY15" fmla="*/ 3887377 h 6703947"/>
+              <a:gd name="connsiteX16" fmla="*/ 3712144 w 4258651"/>
+              <a:gd name="connsiteY16" fmla="*/ 5188638 h 6703947"/>
+              <a:gd name="connsiteX17" fmla="*/ 3348812 w 4258651"/>
+              <a:gd name="connsiteY17" fmla="*/ 6679864 h 6703947"/>
+              <a:gd name="connsiteX18" fmla="*/ 2780160 w 4258651"/>
+              <a:gd name="connsiteY18" fmla="*/ 5469992 h 6703947"/>
+              <a:gd name="connsiteX19" fmla="*/ 2530507 w 4258651"/>
+              <a:gd name="connsiteY19" fmla="*/ 4273000 h 6703947"/>
+              <a:gd name="connsiteX20" fmla="*/ 2272435 w 4258651"/>
+              <a:gd name="connsiteY20" fmla="*/ 3892083 h 6703947"/>
+              <a:gd name="connsiteX21" fmla="*/ 1857339 w 4258651"/>
+              <a:gd name="connsiteY21" fmla="*/ 3885147 h 6703947"/>
+              <a:gd name="connsiteX22" fmla="*/ 1512829 w 4258651"/>
+              <a:gd name="connsiteY22" fmla="*/ 4212073 h 6703947"/>
+              <a:gd name="connsiteX23" fmla="*/ 1338221 w 4258651"/>
+              <a:gd name="connsiteY23" fmla="*/ 5135885 h 6703947"/>
+              <a:gd name="connsiteX24" fmla="*/ 1127206 w 4258651"/>
+              <a:gd name="connsiteY24" fmla="*/ 6138208 h 6703947"/>
+              <a:gd name="connsiteX25" fmla="*/ 845852 w 4258651"/>
+              <a:gd name="connsiteY25" fmla="*/ 6700915 h 6703947"/>
+              <a:gd name="connsiteX26" fmla="*/ 652421 w 4258651"/>
+              <a:gd name="connsiteY26" fmla="*/ 6331638 h 6703947"/>
+              <a:gd name="connsiteX0" fmla="*/ 652421 w 4258651"/>
+              <a:gd name="connsiteY0" fmla="*/ 6331638 h 6703947"/>
+              <a:gd name="connsiteX1" fmla="*/ 494160 w 4258651"/>
+              <a:gd name="connsiteY1" fmla="*/ 5434823 h 6703947"/>
+              <a:gd name="connsiteX2" fmla="*/ 388652 w 4258651"/>
+              <a:gd name="connsiteY2" fmla="*/ 4115977 h 6703947"/>
+              <a:gd name="connsiteX3" fmla="*/ 398063 w 4258651"/>
+              <a:gd name="connsiteY3" fmla="*/ 3105481 h 6703947"/>
+              <a:gd name="connsiteX4" fmla="*/ 177637 w 4258651"/>
+              <a:gd name="connsiteY4" fmla="*/ 2357515 h 6703947"/>
+              <a:gd name="connsiteX5" fmla="*/ 1791 w 4258651"/>
+              <a:gd name="connsiteY5" fmla="*/ 1249685 h 6703947"/>
+              <a:gd name="connsiteX6" fmla="*/ 142468 w 4258651"/>
+              <a:gd name="connsiteY6" fmla="*/ 300115 h 6703947"/>
+              <a:gd name="connsiteX7" fmla="*/ 881021 w 4258651"/>
+              <a:gd name="connsiteY7" fmla="*/ 1177 h 6703947"/>
+              <a:gd name="connsiteX8" fmla="*/ 2121357 w 4258651"/>
+              <a:gd name="connsiteY8" fmla="*/ 191140 h 6703947"/>
+              <a:gd name="connsiteX9" fmla="*/ 2811861 w 4258651"/>
+              <a:gd name="connsiteY9" fmla="*/ 63342 h 6703947"/>
+              <a:gd name="connsiteX10" fmla="*/ 3465960 w 4258651"/>
+              <a:gd name="connsiteY10" fmla="*/ 18761 h 6703947"/>
+              <a:gd name="connsiteX11" fmla="*/ 4054425 w 4258651"/>
+              <a:gd name="connsiteY11" fmla="*/ 236711 h 6703947"/>
+              <a:gd name="connsiteX12" fmla="*/ 4257268 w 4258651"/>
+              <a:gd name="connsiteY12" fmla="*/ 968331 h 6703947"/>
+              <a:gd name="connsiteX13" fmla="*/ 4126002 w 4258651"/>
+              <a:gd name="connsiteY13" fmla="*/ 2270582 h 6703947"/>
+              <a:gd name="connsiteX14" fmla="*/ 3800068 w 4258651"/>
+              <a:gd name="connsiteY14" fmla="*/ 3086658 h 6703947"/>
+              <a:gd name="connsiteX15" fmla="*/ 3800068 w 4258651"/>
+              <a:gd name="connsiteY15" fmla="*/ 3887377 h 6703947"/>
+              <a:gd name="connsiteX16" fmla="*/ 3712144 w 4258651"/>
+              <a:gd name="connsiteY16" fmla="*/ 5188638 h 6703947"/>
+              <a:gd name="connsiteX17" fmla="*/ 3348812 w 4258651"/>
+              <a:gd name="connsiteY17" fmla="*/ 6679864 h 6703947"/>
+              <a:gd name="connsiteX18" fmla="*/ 2780160 w 4258651"/>
+              <a:gd name="connsiteY18" fmla="*/ 5469992 h 6703947"/>
+              <a:gd name="connsiteX19" fmla="*/ 2530507 w 4258651"/>
+              <a:gd name="connsiteY19" fmla="*/ 4273000 h 6703947"/>
+              <a:gd name="connsiteX20" fmla="*/ 2272435 w 4258651"/>
+              <a:gd name="connsiteY20" fmla="*/ 3892083 h 6703947"/>
+              <a:gd name="connsiteX21" fmla="*/ 1857339 w 4258651"/>
+              <a:gd name="connsiteY21" fmla="*/ 3885147 h 6703947"/>
+              <a:gd name="connsiteX22" fmla="*/ 1512829 w 4258651"/>
+              <a:gd name="connsiteY22" fmla="*/ 4212073 h 6703947"/>
+              <a:gd name="connsiteX23" fmla="*/ 1338221 w 4258651"/>
+              <a:gd name="connsiteY23" fmla="*/ 5135885 h 6703947"/>
+              <a:gd name="connsiteX24" fmla="*/ 1127206 w 4258651"/>
+              <a:gd name="connsiteY24" fmla="*/ 6138208 h 6703947"/>
+              <a:gd name="connsiteX25" fmla="*/ 845852 w 4258651"/>
+              <a:gd name="connsiteY25" fmla="*/ 6700915 h 6703947"/>
+              <a:gd name="connsiteX26" fmla="*/ 652421 w 4258651"/>
+              <a:gd name="connsiteY26" fmla="*/ 6331638 h 6703947"/>
+              <a:gd name="connsiteX0" fmla="*/ 652421 w 4258651"/>
+              <a:gd name="connsiteY0" fmla="*/ 6331638 h 6703947"/>
+              <a:gd name="connsiteX1" fmla="*/ 494160 w 4258651"/>
+              <a:gd name="connsiteY1" fmla="*/ 5434823 h 6703947"/>
+              <a:gd name="connsiteX2" fmla="*/ 388652 w 4258651"/>
+              <a:gd name="connsiteY2" fmla="*/ 4115977 h 6703947"/>
+              <a:gd name="connsiteX3" fmla="*/ 398063 w 4258651"/>
+              <a:gd name="connsiteY3" fmla="*/ 3105481 h 6703947"/>
+              <a:gd name="connsiteX4" fmla="*/ 177637 w 4258651"/>
+              <a:gd name="connsiteY4" fmla="*/ 2357515 h 6703947"/>
+              <a:gd name="connsiteX5" fmla="*/ 1791 w 4258651"/>
+              <a:gd name="connsiteY5" fmla="*/ 1249685 h 6703947"/>
+              <a:gd name="connsiteX6" fmla="*/ 142468 w 4258651"/>
+              <a:gd name="connsiteY6" fmla="*/ 300115 h 6703947"/>
+              <a:gd name="connsiteX7" fmla="*/ 881021 w 4258651"/>
+              <a:gd name="connsiteY7" fmla="*/ 1177 h 6703947"/>
+              <a:gd name="connsiteX8" fmla="*/ 2121357 w 4258651"/>
+              <a:gd name="connsiteY8" fmla="*/ 191140 h 6703947"/>
+              <a:gd name="connsiteX9" fmla="*/ 2811861 w 4258651"/>
+              <a:gd name="connsiteY9" fmla="*/ 63342 h 6703947"/>
+              <a:gd name="connsiteX10" fmla="*/ 3465960 w 4258651"/>
+              <a:gd name="connsiteY10" fmla="*/ 18761 h 6703947"/>
+              <a:gd name="connsiteX11" fmla="*/ 4054425 w 4258651"/>
+              <a:gd name="connsiteY11" fmla="*/ 236711 h 6703947"/>
+              <a:gd name="connsiteX12" fmla="*/ 4257268 w 4258651"/>
+              <a:gd name="connsiteY12" fmla="*/ 968331 h 6703947"/>
+              <a:gd name="connsiteX13" fmla="*/ 4126002 w 4258651"/>
+              <a:gd name="connsiteY13" fmla="*/ 2270582 h 6703947"/>
+              <a:gd name="connsiteX14" fmla="*/ 3800068 w 4258651"/>
+              <a:gd name="connsiteY14" fmla="*/ 3086658 h 6703947"/>
+              <a:gd name="connsiteX15" fmla="*/ 3800068 w 4258651"/>
+              <a:gd name="connsiteY15" fmla="*/ 3887377 h 6703947"/>
+              <a:gd name="connsiteX16" fmla="*/ 3712144 w 4258651"/>
+              <a:gd name="connsiteY16" fmla="*/ 5188638 h 6703947"/>
+              <a:gd name="connsiteX17" fmla="*/ 3348812 w 4258651"/>
+              <a:gd name="connsiteY17" fmla="*/ 6679864 h 6703947"/>
+              <a:gd name="connsiteX18" fmla="*/ 2780160 w 4258651"/>
+              <a:gd name="connsiteY18" fmla="*/ 5469992 h 6703947"/>
+              <a:gd name="connsiteX19" fmla="*/ 2530507 w 4258651"/>
+              <a:gd name="connsiteY19" fmla="*/ 4273000 h 6703947"/>
+              <a:gd name="connsiteX20" fmla="*/ 2272435 w 4258651"/>
+              <a:gd name="connsiteY20" fmla="*/ 3892083 h 6703947"/>
+              <a:gd name="connsiteX21" fmla="*/ 1857339 w 4258651"/>
+              <a:gd name="connsiteY21" fmla="*/ 3885147 h 6703947"/>
+              <a:gd name="connsiteX22" fmla="*/ 1512829 w 4258651"/>
+              <a:gd name="connsiteY22" fmla="*/ 4212073 h 6703947"/>
+              <a:gd name="connsiteX23" fmla="*/ 1338221 w 4258651"/>
+              <a:gd name="connsiteY23" fmla="*/ 5135885 h 6703947"/>
+              <a:gd name="connsiteX24" fmla="*/ 1127206 w 4258651"/>
+              <a:gd name="connsiteY24" fmla="*/ 6138208 h 6703947"/>
+              <a:gd name="connsiteX25" fmla="*/ 845852 w 4258651"/>
+              <a:gd name="connsiteY25" fmla="*/ 6700915 h 6703947"/>
+              <a:gd name="connsiteX26" fmla="*/ 652421 w 4258651"/>
+              <a:gd name="connsiteY26" fmla="*/ 6331638 h 6703947"/>
+              <a:gd name="connsiteX0" fmla="*/ 652421 w 4258651"/>
+              <a:gd name="connsiteY0" fmla="*/ 6331638 h 6703947"/>
+              <a:gd name="connsiteX1" fmla="*/ 494160 w 4258651"/>
+              <a:gd name="connsiteY1" fmla="*/ 5434823 h 6703947"/>
+              <a:gd name="connsiteX2" fmla="*/ 388652 w 4258651"/>
+              <a:gd name="connsiteY2" fmla="*/ 4115977 h 6703947"/>
+              <a:gd name="connsiteX3" fmla="*/ 398063 w 4258651"/>
+              <a:gd name="connsiteY3" fmla="*/ 3105481 h 6703947"/>
+              <a:gd name="connsiteX4" fmla="*/ 177637 w 4258651"/>
+              <a:gd name="connsiteY4" fmla="*/ 2357515 h 6703947"/>
+              <a:gd name="connsiteX5" fmla="*/ 1791 w 4258651"/>
+              <a:gd name="connsiteY5" fmla="*/ 1249685 h 6703947"/>
+              <a:gd name="connsiteX6" fmla="*/ 142468 w 4258651"/>
+              <a:gd name="connsiteY6" fmla="*/ 300115 h 6703947"/>
+              <a:gd name="connsiteX7" fmla="*/ 881021 w 4258651"/>
+              <a:gd name="connsiteY7" fmla="*/ 1177 h 6703947"/>
+              <a:gd name="connsiteX8" fmla="*/ 2121357 w 4258651"/>
+              <a:gd name="connsiteY8" fmla="*/ 191140 h 6703947"/>
+              <a:gd name="connsiteX9" fmla="*/ 2811861 w 4258651"/>
+              <a:gd name="connsiteY9" fmla="*/ 63342 h 6703947"/>
+              <a:gd name="connsiteX10" fmla="*/ 3465960 w 4258651"/>
+              <a:gd name="connsiteY10" fmla="*/ 18761 h 6703947"/>
+              <a:gd name="connsiteX11" fmla="*/ 4054425 w 4258651"/>
+              <a:gd name="connsiteY11" fmla="*/ 236711 h 6703947"/>
+              <a:gd name="connsiteX12" fmla="*/ 4257268 w 4258651"/>
+              <a:gd name="connsiteY12" fmla="*/ 968331 h 6703947"/>
+              <a:gd name="connsiteX13" fmla="*/ 4126002 w 4258651"/>
+              <a:gd name="connsiteY13" fmla="*/ 2270582 h 6703947"/>
+              <a:gd name="connsiteX14" fmla="*/ 3800068 w 4258651"/>
+              <a:gd name="connsiteY14" fmla="*/ 3086658 h 6703947"/>
+              <a:gd name="connsiteX15" fmla="*/ 3800068 w 4258651"/>
+              <a:gd name="connsiteY15" fmla="*/ 3887377 h 6703947"/>
+              <a:gd name="connsiteX16" fmla="*/ 3712144 w 4258651"/>
+              <a:gd name="connsiteY16" fmla="*/ 5188638 h 6703947"/>
+              <a:gd name="connsiteX17" fmla="*/ 3348812 w 4258651"/>
+              <a:gd name="connsiteY17" fmla="*/ 6679864 h 6703947"/>
+              <a:gd name="connsiteX18" fmla="*/ 2780160 w 4258651"/>
+              <a:gd name="connsiteY18" fmla="*/ 5469992 h 6703947"/>
+              <a:gd name="connsiteX19" fmla="*/ 2530507 w 4258651"/>
+              <a:gd name="connsiteY19" fmla="*/ 4273000 h 6703947"/>
+              <a:gd name="connsiteX20" fmla="*/ 2272435 w 4258651"/>
+              <a:gd name="connsiteY20" fmla="*/ 3892083 h 6703947"/>
+              <a:gd name="connsiteX21" fmla="*/ 1857339 w 4258651"/>
+              <a:gd name="connsiteY21" fmla="*/ 3885147 h 6703947"/>
+              <a:gd name="connsiteX22" fmla="*/ 1512829 w 4258651"/>
+              <a:gd name="connsiteY22" fmla="*/ 4212073 h 6703947"/>
+              <a:gd name="connsiteX23" fmla="*/ 1338221 w 4258651"/>
+              <a:gd name="connsiteY23" fmla="*/ 5135885 h 6703947"/>
+              <a:gd name="connsiteX24" fmla="*/ 1127206 w 4258651"/>
+              <a:gd name="connsiteY24" fmla="*/ 6138208 h 6703947"/>
+              <a:gd name="connsiteX25" fmla="*/ 845852 w 4258651"/>
+              <a:gd name="connsiteY25" fmla="*/ 6700915 h 6703947"/>
+              <a:gd name="connsiteX26" fmla="*/ 652421 w 4258651"/>
+              <a:gd name="connsiteY26" fmla="*/ 6331638 h 6703947"/>
+              <a:gd name="connsiteX0" fmla="*/ 652421 w 4258651"/>
+              <a:gd name="connsiteY0" fmla="*/ 6331638 h 6703947"/>
+              <a:gd name="connsiteX1" fmla="*/ 494160 w 4258651"/>
+              <a:gd name="connsiteY1" fmla="*/ 5434823 h 6703947"/>
+              <a:gd name="connsiteX2" fmla="*/ 388652 w 4258651"/>
+              <a:gd name="connsiteY2" fmla="*/ 4115977 h 6703947"/>
+              <a:gd name="connsiteX3" fmla="*/ 398063 w 4258651"/>
+              <a:gd name="connsiteY3" fmla="*/ 3105481 h 6703947"/>
+              <a:gd name="connsiteX4" fmla="*/ 177637 w 4258651"/>
+              <a:gd name="connsiteY4" fmla="*/ 2357515 h 6703947"/>
+              <a:gd name="connsiteX5" fmla="*/ 1791 w 4258651"/>
+              <a:gd name="connsiteY5" fmla="*/ 1249685 h 6703947"/>
+              <a:gd name="connsiteX6" fmla="*/ 142468 w 4258651"/>
+              <a:gd name="connsiteY6" fmla="*/ 300115 h 6703947"/>
+              <a:gd name="connsiteX7" fmla="*/ 881021 w 4258651"/>
+              <a:gd name="connsiteY7" fmla="*/ 1177 h 6703947"/>
+              <a:gd name="connsiteX8" fmla="*/ 2121357 w 4258651"/>
+              <a:gd name="connsiteY8" fmla="*/ 191140 h 6703947"/>
+              <a:gd name="connsiteX9" fmla="*/ 2811861 w 4258651"/>
+              <a:gd name="connsiteY9" fmla="*/ 63342 h 6703947"/>
+              <a:gd name="connsiteX10" fmla="*/ 3465960 w 4258651"/>
+              <a:gd name="connsiteY10" fmla="*/ 18761 h 6703947"/>
+              <a:gd name="connsiteX11" fmla="*/ 4054425 w 4258651"/>
+              <a:gd name="connsiteY11" fmla="*/ 236711 h 6703947"/>
+              <a:gd name="connsiteX12" fmla="*/ 4257268 w 4258651"/>
+              <a:gd name="connsiteY12" fmla="*/ 968331 h 6703947"/>
+              <a:gd name="connsiteX13" fmla="*/ 4126002 w 4258651"/>
+              <a:gd name="connsiteY13" fmla="*/ 2270582 h 6703947"/>
+              <a:gd name="connsiteX14" fmla="*/ 3800068 w 4258651"/>
+              <a:gd name="connsiteY14" fmla="*/ 3086658 h 6703947"/>
+              <a:gd name="connsiteX15" fmla="*/ 3800068 w 4258651"/>
+              <a:gd name="connsiteY15" fmla="*/ 3887377 h 6703947"/>
+              <a:gd name="connsiteX16" fmla="*/ 3712144 w 4258651"/>
+              <a:gd name="connsiteY16" fmla="*/ 5188638 h 6703947"/>
+              <a:gd name="connsiteX17" fmla="*/ 3348812 w 4258651"/>
+              <a:gd name="connsiteY17" fmla="*/ 6679864 h 6703947"/>
+              <a:gd name="connsiteX18" fmla="*/ 2780160 w 4258651"/>
+              <a:gd name="connsiteY18" fmla="*/ 5469992 h 6703947"/>
+              <a:gd name="connsiteX19" fmla="*/ 2530507 w 4258651"/>
+              <a:gd name="connsiteY19" fmla="*/ 4273000 h 6703947"/>
+              <a:gd name="connsiteX20" fmla="*/ 2272435 w 4258651"/>
+              <a:gd name="connsiteY20" fmla="*/ 3892083 h 6703947"/>
+              <a:gd name="connsiteX21" fmla="*/ 1857339 w 4258651"/>
+              <a:gd name="connsiteY21" fmla="*/ 3885147 h 6703947"/>
+              <a:gd name="connsiteX22" fmla="*/ 1512829 w 4258651"/>
+              <a:gd name="connsiteY22" fmla="*/ 4212073 h 6703947"/>
+              <a:gd name="connsiteX23" fmla="*/ 1338221 w 4258651"/>
+              <a:gd name="connsiteY23" fmla="*/ 5135885 h 6703947"/>
+              <a:gd name="connsiteX24" fmla="*/ 1127206 w 4258651"/>
+              <a:gd name="connsiteY24" fmla="*/ 6138208 h 6703947"/>
+              <a:gd name="connsiteX25" fmla="*/ 845852 w 4258651"/>
+              <a:gd name="connsiteY25" fmla="*/ 6700915 h 6703947"/>
+              <a:gd name="connsiteX26" fmla="*/ 652421 w 4258651"/>
+              <a:gd name="connsiteY26" fmla="*/ 6331638 h 6703947"/>
+            </a:gdLst>
+            <a:ahLst/>
+            <a:cxnLst>
+              <a:cxn ang="0">
+                <a:pos x="connsiteX0" y="connsiteY0"/>
+              </a:cxn>
+              <a:cxn ang="0">
+                <a:pos x="connsiteX1" y="connsiteY1"/>
+              </a:cxn>
+              <a:cxn ang="0">
+                <a:pos x="connsiteX2" y="connsiteY2"/>
+              </a:cxn>
+              <a:cxn ang="0">
+                <a:pos x="connsiteX3" y="connsiteY3"/>
+              </a:cxn>
+              <a:cxn ang="0">
+                <a:pos x="connsiteX4" y="connsiteY4"/>
+              </a:cxn>
+              <a:cxn ang="0">
+                <a:pos x="connsiteX5" y="connsiteY5"/>
+              </a:cxn>
+              <a:cxn ang="0">
+                <a:pos x="connsiteX6" y="connsiteY6"/>
+              </a:cxn>
+              <a:cxn ang="0">
+                <a:pos x="connsiteX7" y="connsiteY7"/>
+              </a:cxn>
+              <a:cxn ang="0">
+                <a:pos x="connsiteX8" y="connsiteY8"/>
+              </a:cxn>
+              <a:cxn ang="0">
+                <a:pos x="connsiteX9" y="connsiteY9"/>
+              </a:cxn>
+              <a:cxn ang="0">
+                <a:pos x="connsiteX10" y="connsiteY10"/>
+              </a:cxn>
+              <a:cxn ang="0">
+                <a:pos x="connsiteX11" y="connsiteY11"/>
+              </a:cxn>
+              <a:cxn ang="0">
+                <a:pos x="connsiteX12" y="connsiteY12"/>
+              </a:cxn>
+              <a:cxn ang="0">
+                <a:pos x="connsiteX13" y="connsiteY13"/>
+              </a:cxn>
+              <a:cxn ang="0">
+                <a:pos x="connsiteX14" y="connsiteY14"/>
+              </a:cxn>
+              <a:cxn ang="0">
+                <a:pos x="connsiteX15" y="connsiteY15"/>
+              </a:cxn>
+              <a:cxn ang="0">
+                <a:pos x="connsiteX16" y="connsiteY16"/>
+              </a:cxn>
+              <a:cxn ang="0">
+                <a:pos x="connsiteX17" y="connsiteY17"/>
+              </a:cxn>
+              <a:cxn ang="0">
+                <a:pos x="connsiteX18" y="connsiteY18"/>
+              </a:cxn>
+              <a:cxn ang="0">
+                <a:pos x="connsiteX19" y="connsiteY19"/>
+              </a:cxn>
+              <a:cxn ang="0">
+                <a:pos x="connsiteX20" y="connsiteY20"/>
+              </a:cxn>
+              <a:cxn ang="0">
+                <a:pos x="connsiteX21" y="connsiteY21"/>
+              </a:cxn>
+              <a:cxn ang="0">
+                <a:pos x="connsiteX22" y="connsiteY22"/>
+              </a:cxn>
+              <a:cxn ang="0">
+                <a:pos x="connsiteX23" y="connsiteY23"/>
+              </a:cxn>
+              <a:cxn ang="0">
+                <a:pos x="connsiteX24" y="connsiteY24"/>
+              </a:cxn>
+              <a:cxn ang="0">
+                <a:pos x="connsiteX25" y="connsiteY25"/>
+              </a:cxn>
+              <a:cxn ang="0">
+                <a:pos x="connsiteX26" y="connsiteY26"/>
+              </a:cxn>
+            </a:cxnLst>
+            <a:rect l="l" t="t" r="r" b="b"/>
+            <a:pathLst>
+              <a:path w="4258651" h="6703947">
+                <a:moveTo>
+                  <a:pt x="652421" y="6331638"/>
+                </a:moveTo>
+                <a:cubicBezTo>
+                  <a:pt x="593806" y="6120623"/>
+                  <a:pt x="538121" y="5804100"/>
+                  <a:pt x="494160" y="5434823"/>
+                </a:cubicBezTo>
+                <a:cubicBezTo>
+                  <a:pt x="450198" y="5065546"/>
+                  <a:pt x="404668" y="4504201"/>
+                  <a:pt x="388652" y="4115977"/>
+                </a:cubicBezTo>
+                <a:cubicBezTo>
+                  <a:pt x="372636" y="3727753"/>
+                  <a:pt x="433232" y="3398558"/>
+                  <a:pt x="398063" y="3105481"/>
+                </a:cubicBezTo>
+                <a:cubicBezTo>
+                  <a:pt x="362894" y="2812404"/>
+                  <a:pt x="243682" y="2666814"/>
+                  <a:pt x="177637" y="2357515"/>
+                </a:cubicBezTo>
+                <a:cubicBezTo>
+                  <a:pt x="111592" y="2048216"/>
+                  <a:pt x="7652" y="1592585"/>
+                  <a:pt x="1791" y="1249685"/>
+                </a:cubicBezTo>
+                <a:cubicBezTo>
+                  <a:pt x="-4071" y="906785"/>
+                  <a:pt x="-4070" y="508200"/>
+                  <a:pt x="142468" y="300115"/>
+                </a:cubicBezTo>
+                <a:cubicBezTo>
+                  <a:pt x="289006" y="92030"/>
+                  <a:pt x="551206" y="19340"/>
+                  <a:pt x="881021" y="1177"/>
+                </a:cubicBezTo>
+                <a:cubicBezTo>
+                  <a:pt x="1210836" y="-16986"/>
+                  <a:pt x="1799550" y="180779"/>
+                  <a:pt x="2121357" y="191140"/>
+                </a:cubicBezTo>
+                <a:cubicBezTo>
+                  <a:pt x="2443164" y="201501"/>
+                  <a:pt x="2574882" y="111391"/>
+                  <a:pt x="2811861" y="63342"/>
+                </a:cubicBezTo>
+                <a:cubicBezTo>
+                  <a:pt x="3048840" y="15293"/>
+                  <a:pt x="3323260" y="2745"/>
+                  <a:pt x="3465960" y="18761"/>
+                </a:cubicBezTo>
+                <a:cubicBezTo>
+                  <a:pt x="3608660" y="34777"/>
+                  <a:pt x="3922540" y="78449"/>
+                  <a:pt x="4054425" y="236711"/>
+                </a:cubicBezTo>
+                <a:cubicBezTo>
+                  <a:pt x="4186310" y="394973"/>
+                  <a:pt x="4245339" y="629353"/>
+                  <a:pt x="4257268" y="968331"/>
+                </a:cubicBezTo>
+                <a:cubicBezTo>
+                  <a:pt x="4269197" y="1307309"/>
+                  <a:pt x="4202202" y="1917528"/>
+                  <a:pt x="4126002" y="2270582"/>
+                </a:cubicBezTo>
+                <a:cubicBezTo>
+                  <a:pt x="4049802" y="2623636"/>
+                  <a:pt x="3854390" y="2817192"/>
+                  <a:pt x="3800068" y="3086658"/>
+                </a:cubicBezTo>
+                <a:cubicBezTo>
+                  <a:pt x="3745746" y="3356124"/>
+                  <a:pt x="3814722" y="3537047"/>
+                  <a:pt x="3800068" y="3887377"/>
+                </a:cubicBezTo>
+                <a:cubicBezTo>
+                  <a:pt x="3785414" y="4237707"/>
+                  <a:pt x="3787353" y="4723223"/>
+                  <a:pt x="3712144" y="5188638"/>
+                </a:cubicBezTo>
+                <a:cubicBezTo>
+                  <a:pt x="3636935" y="5654053"/>
+                  <a:pt x="3504143" y="6632972"/>
+                  <a:pt x="3348812" y="6679864"/>
+                </a:cubicBezTo>
+                <a:cubicBezTo>
+                  <a:pt x="3193481" y="6726756"/>
+                  <a:pt x="2903665" y="5884015"/>
+                  <a:pt x="2780160" y="5469992"/>
+                </a:cubicBezTo>
+                <a:cubicBezTo>
+                  <a:pt x="2656655" y="5055969"/>
+                  <a:pt x="2615128" y="4535985"/>
+                  <a:pt x="2530507" y="4273000"/>
+                </a:cubicBezTo>
+                <a:cubicBezTo>
+                  <a:pt x="2445886" y="4010015"/>
+                  <a:pt x="2358871" y="3930968"/>
+                  <a:pt x="2272435" y="3892083"/>
+                </a:cubicBezTo>
+                <a:cubicBezTo>
+                  <a:pt x="2185999" y="3853198"/>
+                  <a:pt x="1983940" y="3831815"/>
+                  <a:pt x="1857339" y="3885147"/>
+                </a:cubicBezTo>
+                <a:cubicBezTo>
+                  <a:pt x="1730738" y="3938479"/>
+                  <a:pt x="1599349" y="4003617"/>
+                  <a:pt x="1512829" y="4212073"/>
+                </a:cubicBezTo>
+                <a:cubicBezTo>
+                  <a:pt x="1426309" y="4420529"/>
+                  <a:pt x="1402491" y="4814863"/>
+                  <a:pt x="1338221" y="5135885"/>
+                </a:cubicBezTo>
+                <a:cubicBezTo>
+                  <a:pt x="1273951" y="5456907"/>
+                  <a:pt x="1209267" y="5877370"/>
+                  <a:pt x="1127206" y="6138208"/>
+                </a:cubicBezTo>
+                <a:cubicBezTo>
+                  <a:pt x="1045145" y="6399046"/>
+                  <a:pt x="922052" y="6671607"/>
+                  <a:pt x="845852" y="6700915"/>
+                </a:cubicBezTo>
+                <a:cubicBezTo>
+                  <a:pt x="769652" y="6730223"/>
+                  <a:pt x="711036" y="6542653"/>
+                  <a:pt x="652421" y="6331638"/>
+                </a:cubicBezTo>
+                <a:close/>
+              </a:path>
+            </a:pathLst>
+          </a:custGeom>
+          <a:solidFill>
+            <a:srgbClr val="9AABCB"/>
+          </a:solidFill>
+          <a:ln>
+            <a:noFill/>
+          </a:ln>
+        </p:spPr>
+        <p:style>
+          <a:lnRef idx="2">
+            <a:schemeClr val="accent1">
+              <a:shade val="50000"/>
+            </a:schemeClr>
+          </a:lnRef>
+          <a:fillRef idx="1">
+            <a:schemeClr val="accent1"/>
+          </a:fillRef>
+          <a:effectRef idx="0">
+            <a:schemeClr val="accent1"/>
+          </a:effectRef>
+          <a:fontRef idx="minor">
+            <a:schemeClr val="lt1"/>
+          </a:fontRef>
+        </p:style>
+        <p:txBody>
+          <a:bodyPr rtlCol="0" anchor="ctr"/>
+          <a:lstStyle/>
+          <a:p>
+            <a:pPr algn="ctr"/>
+            <a:endParaRPr lang="en-US" sz="1350"/>
+          </a:p>
+        </p:txBody>
+      </p:sp>
+      <p:sp>
+        <p:nvSpPr>
+          <p:cNvPr id="7" name="TextBox 6"/>
+          <p:cNvSpPr txBox="1"/>
+          <p:nvPr/>
+        </p:nvSpPr>
+        <p:spPr>
+          <a:xfrm>
+            <a:off x="1857154" y="6189757"/>
+            <a:ext cx="5429692" cy="1920526"/>
+          </a:xfrm>
+          <a:prstGeom prst="rect">
+            <a:avLst/>
+          </a:prstGeom>
+          <a:noFill/>
+          <a:ln>
+            <a:noFill/>
+          </a:ln>
+        </p:spPr>
+        <p:txBody>
+          <a:bodyPr wrap="none" rtlCol="0" anchor="ctr" anchorCtr="0">
+            <a:spAutoFit/>
+          </a:bodyPr>
+          <a:lstStyle/>
+          <a:p>
+            <a:pPr algn="ctr">
+              <a:lnSpc>
+                <a:spcPct val="90000"/>
+              </a:lnSpc>
+            </a:pPr>
+            <a:r>
+              <a:rPr lang="en-US" sz="6600" dirty="0" smtClean="0">
+                <a:solidFill>
+                  <a:srgbClr val="9AABCB"/>
+                </a:solidFill>
+                <a:latin typeface="Roboto Light" charset="0"/>
+                <a:ea typeface="Roboto Light" charset="0"/>
+                <a:cs typeface="Roboto Light" charset="0"/>
+              </a:rPr>
+              <a:t>DELTA DELTA</a:t>
+            </a:r>
+          </a:p>
+          <a:p>
+            <a:pPr algn="ctr">
+              <a:lnSpc>
+                <a:spcPct val="90000"/>
+              </a:lnSpc>
+            </a:pPr>
+            <a:r>
+              <a:rPr lang="en-US" sz="6600" dirty="0" smtClean="0">
+                <a:solidFill>
+                  <a:srgbClr val="9AABCB"/>
+                </a:solidFill>
+                <a:latin typeface="Roboto Light" charset="0"/>
+                <a:ea typeface="Roboto Light" charset="0"/>
+                <a:cs typeface="Roboto Light" charset="0"/>
+              </a:rPr>
+              <a:t>SIGMA</a:t>
+            </a:r>
+            <a:endParaRPr lang="en-US" sz="6600" dirty="0">
+              <a:solidFill>
+                <a:srgbClr val="9AABCB"/>
+              </a:solidFill>
+              <a:latin typeface="Roboto Light" charset="0"/>
+              <a:ea typeface="Roboto Light" charset="0"/>
+              <a:cs typeface="Roboto Light" charset="0"/>
+            </a:endParaRPr>
+          </a:p>
+        </p:txBody>
+      </p:sp>
+    </p:spTree>
+    <p:extLst>
+      <p:ext uri="{BB962C8B-B14F-4D97-AF65-F5344CB8AC3E}">
+        <p14:creationId xmlns:p14="http://schemas.microsoft.com/office/powerpoint/2010/main" val="1857286497"/>
+      </p:ext>
+    </p:extLst>
+  </p:cSld>
+  <p:clrMapOvr>
+    <a:masterClrMapping/>
+  </p:clrMapOvr>
+  <p:timing>
+    <p:tnLst>
+      <p:par>
+        <p:cTn id="1" dur="indefinite" restart="never" nodeType="tmRoot"/>
+      </p:par>
+    </p:tnLst>
+  </p:timing>
+</p:sld>
+</file>
+
+<file path=ppt/slides/slide3.xml><?xml version="1.0" encoding="utf-8"?>
+<p:sld xmlns:a="http://schemas.openxmlformats.org/drawingml/2006/main" xmlns:r="http://schemas.openxmlformats.org/officeDocument/2006/relationships" xmlns:p="http://schemas.openxmlformats.org/presentationml/2006/main">
+  <p:cSld>
+    <p:spTree>
+      <p:nvGrpSpPr>
+        <p:cNvPr id="1" name=""/>
+        <p:cNvGrpSpPr/>
+        <p:nvPr/>
+      </p:nvGrpSpPr>
+      <p:grpSpPr>
+        <a:xfrm>
+          <a:off x="0" y="0"/>
+          <a:ext cx="0" cy="0"/>
+          <a:chOff x="0" y="0"/>
+          <a:chExt cx="0" cy="0"/>
+        </a:xfrm>
+      </p:grpSpPr>
+      <p:sp>
+        <p:nvSpPr>
+          <p:cNvPr id="5" name="Freeform 4"/>
+          <p:cNvSpPr/>
+          <p:nvPr/>
+        </p:nvSpPr>
+        <p:spPr>
+          <a:xfrm>
+            <a:off x="3200400" y="1343688"/>
+            <a:ext cx="2743200" cy="4318334"/>
+          </a:xfrm>
+          <a:custGeom>
+            <a:avLst/>
+            <a:gdLst>
+              <a:gd name="connsiteX0" fmla="*/ 652421 w 4261902"/>
+              <a:gd name="connsiteY0" fmla="*/ 6330902 h 6719567"/>
+              <a:gd name="connsiteX1" fmla="*/ 494160 w 4261902"/>
+              <a:gd name="connsiteY1" fmla="*/ 5434087 h 6719567"/>
+              <a:gd name="connsiteX2" fmla="*/ 388652 w 4261902"/>
+              <a:gd name="connsiteY2" fmla="*/ 4115241 h 6719567"/>
+              <a:gd name="connsiteX3" fmla="*/ 423821 w 4261902"/>
+              <a:gd name="connsiteY3" fmla="*/ 3130502 h 6719567"/>
+              <a:gd name="connsiteX4" fmla="*/ 177637 w 4261902"/>
+              <a:gd name="connsiteY4" fmla="*/ 2356779 h 6719567"/>
+              <a:gd name="connsiteX5" fmla="*/ 1791 w 4261902"/>
+              <a:gd name="connsiteY5" fmla="*/ 1248949 h 6719567"/>
+              <a:gd name="connsiteX6" fmla="*/ 142468 w 4261902"/>
+              <a:gd name="connsiteY6" fmla="*/ 299379 h 6719567"/>
+              <a:gd name="connsiteX7" fmla="*/ 881021 w 4261902"/>
+              <a:gd name="connsiteY7" fmla="*/ 441 h 6719567"/>
+              <a:gd name="connsiteX8" fmla="*/ 2147114 w 4261902"/>
+              <a:gd name="connsiteY8" fmla="*/ 229041 h 6719567"/>
+              <a:gd name="connsiteX9" fmla="*/ 2850498 w 4261902"/>
+              <a:gd name="connsiteY9" fmla="*/ 88364 h 6719567"/>
+              <a:gd name="connsiteX10" fmla="*/ 3465960 w 4261902"/>
+              <a:gd name="connsiteY10" fmla="*/ 18025 h 6719567"/>
+              <a:gd name="connsiteX11" fmla="*/ 4028668 w 4261902"/>
+              <a:gd name="connsiteY11" fmla="*/ 158702 h 6719567"/>
+              <a:gd name="connsiteX12" fmla="*/ 4257268 w 4261902"/>
+              <a:gd name="connsiteY12" fmla="*/ 967595 h 6719567"/>
+              <a:gd name="connsiteX13" fmla="*/ 4151760 w 4261902"/>
+              <a:gd name="connsiteY13" fmla="*/ 2128179 h 6719567"/>
+              <a:gd name="connsiteX14" fmla="*/ 3800068 w 4261902"/>
+              <a:gd name="connsiteY14" fmla="*/ 3060164 h 6719567"/>
+              <a:gd name="connsiteX15" fmla="*/ 3800068 w 4261902"/>
+              <a:gd name="connsiteY15" fmla="*/ 3886641 h 6719567"/>
+              <a:gd name="connsiteX16" fmla="*/ 3712144 w 4261902"/>
+              <a:gd name="connsiteY16" fmla="*/ 5187902 h 6719567"/>
+              <a:gd name="connsiteX17" fmla="*/ 3413206 w 4261902"/>
+              <a:gd name="connsiteY17" fmla="*/ 6717764 h 6719567"/>
+              <a:gd name="connsiteX18" fmla="*/ 2780160 w 4261902"/>
+              <a:gd name="connsiteY18" fmla="*/ 5469256 h 6719567"/>
+              <a:gd name="connsiteX19" fmla="*/ 2569144 w 4261902"/>
+              <a:gd name="connsiteY19" fmla="*/ 4220749 h 6719567"/>
+              <a:gd name="connsiteX20" fmla="*/ 2182283 w 4261902"/>
+              <a:gd name="connsiteY20" fmla="*/ 3904225 h 6719567"/>
+              <a:gd name="connsiteX21" fmla="*/ 1689914 w 4261902"/>
+              <a:gd name="connsiteY21" fmla="*/ 3974564 h 6719567"/>
+              <a:gd name="connsiteX22" fmla="*/ 1461314 w 4261902"/>
+              <a:gd name="connsiteY22" fmla="*/ 4185579 h 6719567"/>
+              <a:gd name="connsiteX23" fmla="*/ 1338221 w 4261902"/>
+              <a:gd name="connsiteY23" fmla="*/ 5135149 h 6719567"/>
+              <a:gd name="connsiteX24" fmla="*/ 1127206 w 4261902"/>
+              <a:gd name="connsiteY24" fmla="*/ 6137472 h 6719567"/>
+              <a:gd name="connsiteX25" fmla="*/ 845852 w 4261902"/>
+              <a:gd name="connsiteY25" fmla="*/ 6700179 h 6719567"/>
+              <a:gd name="connsiteX26" fmla="*/ 652421 w 4261902"/>
+              <a:gd name="connsiteY26" fmla="*/ 6330902 h 6719567"/>
+              <a:gd name="connsiteX0" fmla="*/ 652421 w 4261902"/>
+              <a:gd name="connsiteY0" fmla="*/ 6330902 h 6719567"/>
+              <a:gd name="connsiteX1" fmla="*/ 494160 w 4261902"/>
+              <a:gd name="connsiteY1" fmla="*/ 5434087 h 6719567"/>
+              <a:gd name="connsiteX2" fmla="*/ 388652 w 4261902"/>
+              <a:gd name="connsiteY2" fmla="*/ 4115241 h 6719567"/>
+              <a:gd name="connsiteX3" fmla="*/ 398063 w 4261902"/>
+              <a:gd name="connsiteY3" fmla="*/ 3104745 h 6719567"/>
+              <a:gd name="connsiteX4" fmla="*/ 177637 w 4261902"/>
+              <a:gd name="connsiteY4" fmla="*/ 2356779 h 6719567"/>
+              <a:gd name="connsiteX5" fmla="*/ 1791 w 4261902"/>
+              <a:gd name="connsiteY5" fmla="*/ 1248949 h 6719567"/>
+              <a:gd name="connsiteX6" fmla="*/ 142468 w 4261902"/>
+              <a:gd name="connsiteY6" fmla="*/ 299379 h 6719567"/>
+              <a:gd name="connsiteX7" fmla="*/ 881021 w 4261902"/>
+              <a:gd name="connsiteY7" fmla="*/ 441 h 6719567"/>
+              <a:gd name="connsiteX8" fmla="*/ 2147114 w 4261902"/>
+              <a:gd name="connsiteY8" fmla="*/ 229041 h 6719567"/>
+              <a:gd name="connsiteX9" fmla="*/ 2850498 w 4261902"/>
+              <a:gd name="connsiteY9" fmla="*/ 88364 h 6719567"/>
+              <a:gd name="connsiteX10" fmla="*/ 3465960 w 4261902"/>
+              <a:gd name="connsiteY10" fmla="*/ 18025 h 6719567"/>
+              <a:gd name="connsiteX11" fmla="*/ 4028668 w 4261902"/>
+              <a:gd name="connsiteY11" fmla="*/ 158702 h 6719567"/>
+              <a:gd name="connsiteX12" fmla="*/ 4257268 w 4261902"/>
+              <a:gd name="connsiteY12" fmla="*/ 967595 h 6719567"/>
+              <a:gd name="connsiteX13" fmla="*/ 4151760 w 4261902"/>
+              <a:gd name="connsiteY13" fmla="*/ 2128179 h 6719567"/>
+              <a:gd name="connsiteX14" fmla="*/ 3800068 w 4261902"/>
+              <a:gd name="connsiteY14" fmla="*/ 3060164 h 6719567"/>
+              <a:gd name="connsiteX15" fmla="*/ 3800068 w 4261902"/>
+              <a:gd name="connsiteY15" fmla="*/ 3886641 h 6719567"/>
+              <a:gd name="connsiteX16" fmla="*/ 3712144 w 4261902"/>
+              <a:gd name="connsiteY16" fmla="*/ 5187902 h 6719567"/>
+              <a:gd name="connsiteX17" fmla="*/ 3413206 w 4261902"/>
+              <a:gd name="connsiteY17" fmla="*/ 6717764 h 6719567"/>
+              <a:gd name="connsiteX18" fmla="*/ 2780160 w 4261902"/>
+              <a:gd name="connsiteY18" fmla="*/ 5469256 h 6719567"/>
+              <a:gd name="connsiteX19" fmla="*/ 2569144 w 4261902"/>
+              <a:gd name="connsiteY19" fmla="*/ 4220749 h 6719567"/>
+              <a:gd name="connsiteX20" fmla="*/ 2182283 w 4261902"/>
+              <a:gd name="connsiteY20" fmla="*/ 3904225 h 6719567"/>
+              <a:gd name="connsiteX21" fmla="*/ 1689914 w 4261902"/>
+              <a:gd name="connsiteY21" fmla="*/ 3974564 h 6719567"/>
+              <a:gd name="connsiteX22" fmla="*/ 1461314 w 4261902"/>
+              <a:gd name="connsiteY22" fmla="*/ 4185579 h 6719567"/>
+              <a:gd name="connsiteX23" fmla="*/ 1338221 w 4261902"/>
+              <a:gd name="connsiteY23" fmla="*/ 5135149 h 6719567"/>
+              <a:gd name="connsiteX24" fmla="*/ 1127206 w 4261902"/>
+              <a:gd name="connsiteY24" fmla="*/ 6137472 h 6719567"/>
+              <a:gd name="connsiteX25" fmla="*/ 845852 w 4261902"/>
+              <a:gd name="connsiteY25" fmla="*/ 6700179 h 6719567"/>
+              <a:gd name="connsiteX26" fmla="*/ 652421 w 4261902"/>
+              <a:gd name="connsiteY26" fmla="*/ 6330902 h 6719567"/>
+              <a:gd name="connsiteX0" fmla="*/ 652421 w 4261902"/>
+              <a:gd name="connsiteY0" fmla="*/ 6330902 h 6719567"/>
+              <a:gd name="connsiteX1" fmla="*/ 494160 w 4261902"/>
+              <a:gd name="connsiteY1" fmla="*/ 5434087 h 6719567"/>
+              <a:gd name="connsiteX2" fmla="*/ 388652 w 4261902"/>
+              <a:gd name="connsiteY2" fmla="*/ 4115241 h 6719567"/>
+              <a:gd name="connsiteX3" fmla="*/ 398063 w 4261902"/>
+              <a:gd name="connsiteY3" fmla="*/ 3104745 h 6719567"/>
+              <a:gd name="connsiteX4" fmla="*/ 177637 w 4261902"/>
+              <a:gd name="connsiteY4" fmla="*/ 2356779 h 6719567"/>
+              <a:gd name="connsiteX5" fmla="*/ 1791 w 4261902"/>
+              <a:gd name="connsiteY5" fmla="*/ 1248949 h 6719567"/>
+              <a:gd name="connsiteX6" fmla="*/ 142468 w 4261902"/>
+              <a:gd name="connsiteY6" fmla="*/ 299379 h 6719567"/>
+              <a:gd name="connsiteX7" fmla="*/ 881021 w 4261902"/>
+              <a:gd name="connsiteY7" fmla="*/ 441 h 6719567"/>
+              <a:gd name="connsiteX8" fmla="*/ 2147114 w 4261902"/>
+              <a:gd name="connsiteY8" fmla="*/ 229041 h 6719567"/>
+              <a:gd name="connsiteX9" fmla="*/ 2850498 w 4261902"/>
+              <a:gd name="connsiteY9" fmla="*/ 88364 h 6719567"/>
+              <a:gd name="connsiteX10" fmla="*/ 3465960 w 4261902"/>
+              <a:gd name="connsiteY10" fmla="*/ 18025 h 6719567"/>
+              <a:gd name="connsiteX11" fmla="*/ 4028668 w 4261902"/>
+              <a:gd name="connsiteY11" fmla="*/ 158702 h 6719567"/>
+              <a:gd name="connsiteX12" fmla="*/ 4257268 w 4261902"/>
+              <a:gd name="connsiteY12" fmla="*/ 967595 h 6719567"/>
+              <a:gd name="connsiteX13" fmla="*/ 4151760 w 4261902"/>
+              <a:gd name="connsiteY13" fmla="*/ 2128179 h 6719567"/>
+              <a:gd name="connsiteX14" fmla="*/ 3800068 w 4261902"/>
+              <a:gd name="connsiteY14" fmla="*/ 3085922 h 6719567"/>
+              <a:gd name="connsiteX15" fmla="*/ 3800068 w 4261902"/>
+              <a:gd name="connsiteY15" fmla="*/ 3886641 h 6719567"/>
+              <a:gd name="connsiteX16" fmla="*/ 3712144 w 4261902"/>
+              <a:gd name="connsiteY16" fmla="*/ 5187902 h 6719567"/>
+              <a:gd name="connsiteX17" fmla="*/ 3413206 w 4261902"/>
+              <a:gd name="connsiteY17" fmla="*/ 6717764 h 6719567"/>
+              <a:gd name="connsiteX18" fmla="*/ 2780160 w 4261902"/>
+              <a:gd name="connsiteY18" fmla="*/ 5469256 h 6719567"/>
+              <a:gd name="connsiteX19" fmla="*/ 2569144 w 4261902"/>
+              <a:gd name="connsiteY19" fmla="*/ 4220749 h 6719567"/>
+              <a:gd name="connsiteX20" fmla="*/ 2182283 w 4261902"/>
+              <a:gd name="connsiteY20" fmla="*/ 3904225 h 6719567"/>
+              <a:gd name="connsiteX21" fmla="*/ 1689914 w 4261902"/>
+              <a:gd name="connsiteY21" fmla="*/ 3974564 h 6719567"/>
+              <a:gd name="connsiteX22" fmla="*/ 1461314 w 4261902"/>
+              <a:gd name="connsiteY22" fmla="*/ 4185579 h 6719567"/>
+              <a:gd name="connsiteX23" fmla="*/ 1338221 w 4261902"/>
+              <a:gd name="connsiteY23" fmla="*/ 5135149 h 6719567"/>
+              <a:gd name="connsiteX24" fmla="*/ 1127206 w 4261902"/>
+              <a:gd name="connsiteY24" fmla="*/ 6137472 h 6719567"/>
+              <a:gd name="connsiteX25" fmla="*/ 845852 w 4261902"/>
+              <a:gd name="connsiteY25" fmla="*/ 6700179 h 6719567"/>
+              <a:gd name="connsiteX26" fmla="*/ 652421 w 4261902"/>
+              <a:gd name="connsiteY26" fmla="*/ 6330902 h 6719567"/>
+              <a:gd name="connsiteX0" fmla="*/ 652421 w 4261902"/>
+              <a:gd name="connsiteY0" fmla="*/ 6330902 h 6703211"/>
+              <a:gd name="connsiteX1" fmla="*/ 494160 w 4261902"/>
+              <a:gd name="connsiteY1" fmla="*/ 5434087 h 6703211"/>
+              <a:gd name="connsiteX2" fmla="*/ 388652 w 4261902"/>
+              <a:gd name="connsiteY2" fmla="*/ 4115241 h 6703211"/>
+              <a:gd name="connsiteX3" fmla="*/ 398063 w 4261902"/>
+              <a:gd name="connsiteY3" fmla="*/ 3104745 h 6703211"/>
+              <a:gd name="connsiteX4" fmla="*/ 177637 w 4261902"/>
+              <a:gd name="connsiteY4" fmla="*/ 2356779 h 6703211"/>
+              <a:gd name="connsiteX5" fmla="*/ 1791 w 4261902"/>
+              <a:gd name="connsiteY5" fmla="*/ 1248949 h 6703211"/>
+              <a:gd name="connsiteX6" fmla="*/ 142468 w 4261902"/>
+              <a:gd name="connsiteY6" fmla="*/ 299379 h 6703211"/>
+              <a:gd name="connsiteX7" fmla="*/ 881021 w 4261902"/>
+              <a:gd name="connsiteY7" fmla="*/ 441 h 6703211"/>
+              <a:gd name="connsiteX8" fmla="*/ 2147114 w 4261902"/>
+              <a:gd name="connsiteY8" fmla="*/ 229041 h 6703211"/>
+              <a:gd name="connsiteX9" fmla="*/ 2850498 w 4261902"/>
+              <a:gd name="connsiteY9" fmla="*/ 88364 h 6703211"/>
+              <a:gd name="connsiteX10" fmla="*/ 3465960 w 4261902"/>
+              <a:gd name="connsiteY10" fmla="*/ 18025 h 6703211"/>
+              <a:gd name="connsiteX11" fmla="*/ 4028668 w 4261902"/>
+              <a:gd name="connsiteY11" fmla="*/ 158702 h 6703211"/>
+              <a:gd name="connsiteX12" fmla="*/ 4257268 w 4261902"/>
+              <a:gd name="connsiteY12" fmla="*/ 967595 h 6703211"/>
+              <a:gd name="connsiteX13" fmla="*/ 4151760 w 4261902"/>
+              <a:gd name="connsiteY13" fmla="*/ 2128179 h 6703211"/>
+              <a:gd name="connsiteX14" fmla="*/ 3800068 w 4261902"/>
+              <a:gd name="connsiteY14" fmla="*/ 3085922 h 6703211"/>
+              <a:gd name="connsiteX15" fmla="*/ 3800068 w 4261902"/>
+              <a:gd name="connsiteY15" fmla="*/ 3886641 h 6703211"/>
+              <a:gd name="connsiteX16" fmla="*/ 3712144 w 4261902"/>
+              <a:gd name="connsiteY16" fmla="*/ 5187902 h 6703211"/>
+              <a:gd name="connsiteX17" fmla="*/ 3348812 w 4261902"/>
+              <a:gd name="connsiteY17" fmla="*/ 6679128 h 6703211"/>
+              <a:gd name="connsiteX18" fmla="*/ 2780160 w 4261902"/>
+              <a:gd name="connsiteY18" fmla="*/ 5469256 h 6703211"/>
+              <a:gd name="connsiteX19" fmla="*/ 2569144 w 4261902"/>
+              <a:gd name="connsiteY19" fmla="*/ 4220749 h 6703211"/>
+              <a:gd name="connsiteX20" fmla="*/ 2182283 w 4261902"/>
+              <a:gd name="connsiteY20" fmla="*/ 3904225 h 6703211"/>
+              <a:gd name="connsiteX21" fmla="*/ 1689914 w 4261902"/>
+              <a:gd name="connsiteY21" fmla="*/ 3974564 h 6703211"/>
+              <a:gd name="connsiteX22" fmla="*/ 1461314 w 4261902"/>
+              <a:gd name="connsiteY22" fmla="*/ 4185579 h 6703211"/>
+              <a:gd name="connsiteX23" fmla="*/ 1338221 w 4261902"/>
+              <a:gd name="connsiteY23" fmla="*/ 5135149 h 6703211"/>
+              <a:gd name="connsiteX24" fmla="*/ 1127206 w 4261902"/>
+              <a:gd name="connsiteY24" fmla="*/ 6137472 h 6703211"/>
+              <a:gd name="connsiteX25" fmla="*/ 845852 w 4261902"/>
+              <a:gd name="connsiteY25" fmla="*/ 6700179 h 6703211"/>
+              <a:gd name="connsiteX26" fmla="*/ 652421 w 4261902"/>
+              <a:gd name="connsiteY26" fmla="*/ 6330902 h 6703211"/>
+              <a:gd name="connsiteX0" fmla="*/ 652421 w 4261902"/>
+              <a:gd name="connsiteY0" fmla="*/ 6330902 h 6703211"/>
+              <a:gd name="connsiteX1" fmla="*/ 494160 w 4261902"/>
+              <a:gd name="connsiteY1" fmla="*/ 5434087 h 6703211"/>
+              <a:gd name="connsiteX2" fmla="*/ 388652 w 4261902"/>
+              <a:gd name="connsiteY2" fmla="*/ 4115241 h 6703211"/>
+              <a:gd name="connsiteX3" fmla="*/ 398063 w 4261902"/>
+              <a:gd name="connsiteY3" fmla="*/ 3104745 h 6703211"/>
+              <a:gd name="connsiteX4" fmla="*/ 177637 w 4261902"/>
+              <a:gd name="connsiteY4" fmla="*/ 2356779 h 6703211"/>
+              <a:gd name="connsiteX5" fmla="*/ 1791 w 4261902"/>
+              <a:gd name="connsiteY5" fmla="*/ 1248949 h 6703211"/>
+              <a:gd name="connsiteX6" fmla="*/ 142468 w 4261902"/>
+              <a:gd name="connsiteY6" fmla="*/ 299379 h 6703211"/>
+              <a:gd name="connsiteX7" fmla="*/ 881021 w 4261902"/>
+              <a:gd name="connsiteY7" fmla="*/ 441 h 6703211"/>
+              <a:gd name="connsiteX8" fmla="*/ 2147114 w 4261902"/>
+              <a:gd name="connsiteY8" fmla="*/ 229041 h 6703211"/>
+              <a:gd name="connsiteX9" fmla="*/ 2850498 w 4261902"/>
+              <a:gd name="connsiteY9" fmla="*/ 88364 h 6703211"/>
+              <a:gd name="connsiteX10" fmla="*/ 3465960 w 4261902"/>
+              <a:gd name="connsiteY10" fmla="*/ 18025 h 6703211"/>
+              <a:gd name="connsiteX11" fmla="*/ 4028668 w 4261902"/>
+              <a:gd name="connsiteY11" fmla="*/ 158702 h 6703211"/>
+              <a:gd name="connsiteX12" fmla="*/ 4257268 w 4261902"/>
+              <a:gd name="connsiteY12" fmla="*/ 967595 h 6703211"/>
+              <a:gd name="connsiteX13" fmla="*/ 4151760 w 4261902"/>
+              <a:gd name="connsiteY13" fmla="*/ 2128179 h 6703211"/>
+              <a:gd name="connsiteX14" fmla="*/ 3800068 w 4261902"/>
+              <a:gd name="connsiteY14" fmla="*/ 3085922 h 6703211"/>
+              <a:gd name="connsiteX15" fmla="*/ 3800068 w 4261902"/>
+              <a:gd name="connsiteY15" fmla="*/ 3886641 h 6703211"/>
+              <a:gd name="connsiteX16" fmla="*/ 3712144 w 4261902"/>
+              <a:gd name="connsiteY16" fmla="*/ 5187902 h 6703211"/>
+              <a:gd name="connsiteX17" fmla="*/ 3348812 w 4261902"/>
+              <a:gd name="connsiteY17" fmla="*/ 6679128 h 6703211"/>
+              <a:gd name="connsiteX18" fmla="*/ 2780160 w 4261902"/>
+              <a:gd name="connsiteY18" fmla="*/ 5469256 h 6703211"/>
+              <a:gd name="connsiteX19" fmla="*/ 2530507 w 4261902"/>
+              <a:gd name="connsiteY19" fmla="*/ 4272264 h 6703211"/>
+              <a:gd name="connsiteX20" fmla="*/ 2182283 w 4261902"/>
+              <a:gd name="connsiteY20" fmla="*/ 3904225 h 6703211"/>
+              <a:gd name="connsiteX21" fmla="*/ 1689914 w 4261902"/>
+              <a:gd name="connsiteY21" fmla="*/ 3974564 h 6703211"/>
+              <a:gd name="connsiteX22" fmla="*/ 1461314 w 4261902"/>
+              <a:gd name="connsiteY22" fmla="*/ 4185579 h 6703211"/>
+              <a:gd name="connsiteX23" fmla="*/ 1338221 w 4261902"/>
+              <a:gd name="connsiteY23" fmla="*/ 5135149 h 6703211"/>
+              <a:gd name="connsiteX24" fmla="*/ 1127206 w 4261902"/>
+              <a:gd name="connsiteY24" fmla="*/ 6137472 h 6703211"/>
+              <a:gd name="connsiteX25" fmla="*/ 845852 w 4261902"/>
+              <a:gd name="connsiteY25" fmla="*/ 6700179 h 6703211"/>
+              <a:gd name="connsiteX26" fmla="*/ 652421 w 4261902"/>
+              <a:gd name="connsiteY26" fmla="*/ 6330902 h 6703211"/>
+              <a:gd name="connsiteX0" fmla="*/ 652421 w 4261902"/>
+              <a:gd name="connsiteY0" fmla="*/ 6330902 h 6703211"/>
+              <a:gd name="connsiteX1" fmla="*/ 494160 w 4261902"/>
+              <a:gd name="connsiteY1" fmla="*/ 5434087 h 6703211"/>
+              <a:gd name="connsiteX2" fmla="*/ 388652 w 4261902"/>
+              <a:gd name="connsiteY2" fmla="*/ 4115241 h 6703211"/>
+              <a:gd name="connsiteX3" fmla="*/ 398063 w 4261902"/>
+              <a:gd name="connsiteY3" fmla="*/ 3104745 h 6703211"/>
+              <a:gd name="connsiteX4" fmla="*/ 177637 w 4261902"/>
+              <a:gd name="connsiteY4" fmla="*/ 2356779 h 6703211"/>
+              <a:gd name="connsiteX5" fmla="*/ 1791 w 4261902"/>
+              <a:gd name="connsiteY5" fmla="*/ 1248949 h 6703211"/>
+              <a:gd name="connsiteX6" fmla="*/ 142468 w 4261902"/>
+              <a:gd name="connsiteY6" fmla="*/ 299379 h 6703211"/>
+              <a:gd name="connsiteX7" fmla="*/ 881021 w 4261902"/>
+              <a:gd name="connsiteY7" fmla="*/ 441 h 6703211"/>
+              <a:gd name="connsiteX8" fmla="*/ 2147114 w 4261902"/>
+              <a:gd name="connsiteY8" fmla="*/ 229041 h 6703211"/>
+              <a:gd name="connsiteX9" fmla="*/ 2850498 w 4261902"/>
+              <a:gd name="connsiteY9" fmla="*/ 88364 h 6703211"/>
+              <a:gd name="connsiteX10" fmla="*/ 3465960 w 4261902"/>
+              <a:gd name="connsiteY10" fmla="*/ 18025 h 6703211"/>
+              <a:gd name="connsiteX11" fmla="*/ 4028668 w 4261902"/>
+              <a:gd name="connsiteY11" fmla="*/ 158702 h 6703211"/>
+              <a:gd name="connsiteX12" fmla="*/ 4257268 w 4261902"/>
+              <a:gd name="connsiteY12" fmla="*/ 967595 h 6703211"/>
+              <a:gd name="connsiteX13" fmla="*/ 4151760 w 4261902"/>
+              <a:gd name="connsiteY13" fmla="*/ 2128179 h 6703211"/>
+              <a:gd name="connsiteX14" fmla="*/ 3800068 w 4261902"/>
+              <a:gd name="connsiteY14" fmla="*/ 3085922 h 6703211"/>
+              <a:gd name="connsiteX15" fmla="*/ 3800068 w 4261902"/>
+              <a:gd name="connsiteY15" fmla="*/ 3886641 h 6703211"/>
+              <a:gd name="connsiteX16" fmla="*/ 3712144 w 4261902"/>
+              <a:gd name="connsiteY16" fmla="*/ 5187902 h 6703211"/>
+              <a:gd name="connsiteX17" fmla="*/ 3348812 w 4261902"/>
+              <a:gd name="connsiteY17" fmla="*/ 6679128 h 6703211"/>
+              <a:gd name="connsiteX18" fmla="*/ 2780160 w 4261902"/>
+              <a:gd name="connsiteY18" fmla="*/ 5469256 h 6703211"/>
+              <a:gd name="connsiteX19" fmla="*/ 2530507 w 4261902"/>
+              <a:gd name="connsiteY19" fmla="*/ 4272264 h 6703211"/>
+              <a:gd name="connsiteX20" fmla="*/ 2182283 w 4261902"/>
+              <a:gd name="connsiteY20" fmla="*/ 3904225 h 6703211"/>
+              <a:gd name="connsiteX21" fmla="*/ 1857339 w 4261902"/>
+              <a:gd name="connsiteY21" fmla="*/ 3884411 h 6703211"/>
+              <a:gd name="connsiteX22" fmla="*/ 1461314 w 4261902"/>
+              <a:gd name="connsiteY22" fmla="*/ 4185579 h 6703211"/>
+              <a:gd name="connsiteX23" fmla="*/ 1338221 w 4261902"/>
+              <a:gd name="connsiteY23" fmla="*/ 5135149 h 6703211"/>
+              <a:gd name="connsiteX24" fmla="*/ 1127206 w 4261902"/>
+              <a:gd name="connsiteY24" fmla="*/ 6137472 h 6703211"/>
+              <a:gd name="connsiteX25" fmla="*/ 845852 w 4261902"/>
+              <a:gd name="connsiteY25" fmla="*/ 6700179 h 6703211"/>
+              <a:gd name="connsiteX26" fmla="*/ 652421 w 4261902"/>
+              <a:gd name="connsiteY26" fmla="*/ 6330902 h 6703211"/>
+              <a:gd name="connsiteX0" fmla="*/ 652421 w 4261902"/>
+              <a:gd name="connsiteY0" fmla="*/ 6330902 h 6703211"/>
+              <a:gd name="connsiteX1" fmla="*/ 494160 w 4261902"/>
+              <a:gd name="connsiteY1" fmla="*/ 5434087 h 6703211"/>
+              <a:gd name="connsiteX2" fmla="*/ 388652 w 4261902"/>
+              <a:gd name="connsiteY2" fmla="*/ 4115241 h 6703211"/>
+              <a:gd name="connsiteX3" fmla="*/ 398063 w 4261902"/>
+              <a:gd name="connsiteY3" fmla="*/ 3104745 h 6703211"/>
+              <a:gd name="connsiteX4" fmla="*/ 177637 w 4261902"/>
+              <a:gd name="connsiteY4" fmla="*/ 2356779 h 6703211"/>
+              <a:gd name="connsiteX5" fmla="*/ 1791 w 4261902"/>
+              <a:gd name="connsiteY5" fmla="*/ 1248949 h 6703211"/>
+              <a:gd name="connsiteX6" fmla="*/ 142468 w 4261902"/>
+              <a:gd name="connsiteY6" fmla="*/ 299379 h 6703211"/>
+              <a:gd name="connsiteX7" fmla="*/ 881021 w 4261902"/>
+              <a:gd name="connsiteY7" fmla="*/ 441 h 6703211"/>
+              <a:gd name="connsiteX8" fmla="*/ 2147114 w 4261902"/>
+              <a:gd name="connsiteY8" fmla="*/ 229041 h 6703211"/>
+              <a:gd name="connsiteX9" fmla="*/ 2850498 w 4261902"/>
+              <a:gd name="connsiteY9" fmla="*/ 88364 h 6703211"/>
+              <a:gd name="connsiteX10" fmla="*/ 3465960 w 4261902"/>
+              <a:gd name="connsiteY10" fmla="*/ 18025 h 6703211"/>
+              <a:gd name="connsiteX11" fmla="*/ 4028668 w 4261902"/>
+              <a:gd name="connsiteY11" fmla="*/ 158702 h 6703211"/>
+              <a:gd name="connsiteX12" fmla="*/ 4257268 w 4261902"/>
+              <a:gd name="connsiteY12" fmla="*/ 967595 h 6703211"/>
+              <a:gd name="connsiteX13" fmla="*/ 4151760 w 4261902"/>
+              <a:gd name="connsiteY13" fmla="*/ 2128179 h 6703211"/>
+              <a:gd name="connsiteX14" fmla="*/ 3800068 w 4261902"/>
+              <a:gd name="connsiteY14" fmla="*/ 3085922 h 6703211"/>
+              <a:gd name="connsiteX15" fmla="*/ 3800068 w 4261902"/>
+              <a:gd name="connsiteY15" fmla="*/ 3886641 h 6703211"/>
+              <a:gd name="connsiteX16" fmla="*/ 3712144 w 4261902"/>
+              <a:gd name="connsiteY16" fmla="*/ 5187902 h 6703211"/>
+              <a:gd name="connsiteX17" fmla="*/ 3348812 w 4261902"/>
+              <a:gd name="connsiteY17" fmla="*/ 6679128 h 6703211"/>
+              <a:gd name="connsiteX18" fmla="*/ 2780160 w 4261902"/>
+              <a:gd name="connsiteY18" fmla="*/ 5469256 h 6703211"/>
+              <a:gd name="connsiteX19" fmla="*/ 2530507 w 4261902"/>
+              <a:gd name="connsiteY19" fmla="*/ 4272264 h 6703211"/>
+              <a:gd name="connsiteX20" fmla="*/ 2182283 w 4261902"/>
+              <a:gd name="connsiteY20" fmla="*/ 3904225 h 6703211"/>
+              <a:gd name="connsiteX21" fmla="*/ 1857339 w 4261902"/>
+              <a:gd name="connsiteY21" fmla="*/ 3884411 h 6703211"/>
+              <a:gd name="connsiteX22" fmla="*/ 1512829 w 4261902"/>
+              <a:gd name="connsiteY22" fmla="*/ 4121184 h 6703211"/>
+              <a:gd name="connsiteX23" fmla="*/ 1338221 w 4261902"/>
+              <a:gd name="connsiteY23" fmla="*/ 5135149 h 6703211"/>
+              <a:gd name="connsiteX24" fmla="*/ 1127206 w 4261902"/>
+              <a:gd name="connsiteY24" fmla="*/ 6137472 h 6703211"/>
+              <a:gd name="connsiteX25" fmla="*/ 845852 w 4261902"/>
+              <a:gd name="connsiteY25" fmla="*/ 6700179 h 6703211"/>
+              <a:gd name="connsiteX26" fmla="*/ 652421 w 4261902"/>
+              <a:gd name="connsiteY26" fmla="*/ 6330902 h 6703211"/>
+              <a:gd name="connsiteX0" fmla="*/ 652421 w 4261902"/>
+              <a:gd name="connsiteY0" fmla="*/ 6330902 h 6703211"/>
+              <a:gd name="connsiteX1" fmla="*/ 494160 w 4261902"/>
+              <a:gd name="connsiteY1" fmla="*/ 5434087 h 6703211"/>
+              <a:gd name="connsiteX2" fmla="*/ 388652 w 4261902"/>
+              <a:gd name="connsiteY2" fmla="*/ 4115241 h 6703211"/>
+              <a:gd name="connsiteX3" fmla="*/ 398063 w 4261902"/>
+              <a:gd name="connsiteY3" fmla="*/ 3104745 h 6703211"/>
+              <a:gd name="connsiteX4" fmla="*/ 177637 w 4261902"/>
+              <a:gd name="connsiteY4" fmla="*/ 2356779 h 6703211"/>
+              <a:gd name="connsiteX5" fmla="*/ 1791 w 4261902"/>
+              <a:gd name="connsiteY5" fmla="*/ 1248949 h 6703211"/>
+              <a:gd name="connsiteX6" fmla="*/ 142468 w 4261902"/>
+              <a:gd name="connsiteY6" fmla="*/ 299379 h 6703211"/>
+              <a:gd name="connsiteX7" fmla="*/ 881021 w 4261902"/>
+              <a:gd name="connsiteY7" fmla="*/ 441 h 6703211"/>
+              <a:gd name="connsiteX8" fmla="*/ 2147114 w 4261902"/>
+              <a:gd name="connsiteY8" fmla="*/ 229041 h 6703211"/>
+              <a:gd name="connsiteX9" fmla="*/ 2850498 w 4261902"/>
+              <a:gd name="connsiteY9" fmla="*/ 88364 h 6703211"/>
+              <a:gd name="connsiteX10" fmla="*/ 3465960 w 4261902"/>
+              <a:gd name="connsiteY10" fmla="*/ 18025 h 6703211"/>
+              <a:gd name="connsiteX11" fmla="*/ 4028668 w 4261902"/>
+              <a:gd name="connsiteY11" fmla="*/ 158702 h 6703211"/>
+              <a:gd name="connsiteX12" fmla="*/ 4257268 w 4261902"/>
+              <a:gd name="connsiteY12" fmla="*/ 967595 h 6703211"/>
+              <a:gd name="connsiteX13" fmla="*/ 4151760 w 4261902"/>
+              <a:gd name="connsiteY13" fmla="*/ 2128179 h 6703211"/>
+              <a:gd name="connsiteX14" fmla="*/ 3800068 w 4261902"/>
+              <a:gd name="connsiteY14" fmla="*/ 3085922 h 6703211"/>
+              <a:gd name="connsiteX15" fmla="*/ 3800068 w 4261902"/>
+              <a:gd name="connsiteY15" fmla="*/ 3886641 h 6703211"/>
+              <a:gd name="connsiteX16" fmla="*/ 3712144 w 4261902"/>
+              <a:gd name="connsiteY16" fmla="*/ 5187902 h 6703211"/>
+              <a:gd name="connsiteX17" fmla="*/ 3348812 w 4261902"/>
+              <a:gd name="connsiteY17" fmla="*/ 6679128 h 6703211"/>
+              <a:gd name="connsiteX18" fmla="*/ 2780160 w 4261902"/>
+              <a:gd name="connsiteY18" fmla="*/ 5469256 h 6703211"/>
+              <a:gd name="connsiteX19" fmla="*/ 2530507 w 4261902"/>
+              <a:gd name="connsiteY19" fmla="*/ 4272264 h 6703211"/>
+              <a:gd name="connsiteX20" fmla="*/ 2182283 w 4261902"/>
+              <a:gd name="connsiteY20" fmla="*/ 3904225 h 6703211"/>
+              <a:gd name="connsiteX21" fmla="*/ 1857339 w 4261902"/>
+              <a:gd name="connsiteY21" fmla="*/ 3884411 h 6703211"/>
+              <a:gd name="connsiteX22" fmla="*/ 1512829 w 4261902"/>
+              <a:gd name="connsiteY22" fmla="*/ 4211337 h 6703211"/>
+              <a:gd name="connsiteX23" fmla="*/ 1338221 w 4261902"/>
+              <a:gd name="connsiteY23" fmla="*/ 5135149 h 6703211"/>
+              <a:gd name="connsiteX24" fmla="*/ 1127206 w 4261902"/>
+              <a:gd name="connsiteY24" fmla="*/ 6137472 h 6703211"/>
+              <a:gd name="connsiteX25" fmla="*/ 845852 w 4261902"/>
+              <a:gd name="connsiteY25" fmla="*/ 6700179 h 6703211"/>
+              <a:gd name="connsiteX26" fmla="*/ 652421 w 4261902"/>
+              <a:gd name="connsiteY26" fmla="*/ 6330902 h 6703211"/>
+              <a:gd name="connsiteX0" fmla="*/ 652421 w 4261902"/>
+              <a:gd name="connsiteY0" fmla="*/ 6330902 h 6703211"/>
+              <a:gd name="connsiteX1" fmla="*/ 494160 w 4261902"/>
+              <a:gd name="connsiteY1" fmla="*/ 5434087 h 6703211"/>
+              <a:gd name="connsiteX2" fmla="*/ 388652 w 4261902"/>
+              <a:gd name="connsiteY2" fmla="*/ 4115241 h 6703211"/>
+              <a:gd name="connsiteX3" fmla="*/ 398063 w 4261902"/>
+              <a:gd name="connsiteY3" fmla="*/ 3104745 h 6703211"/>
+              <a:gd name="connsiteX4" fmla="*/ 177637 w 4261902"/>
+              <a:gd name="connsiteY4" fmla="*/ 2356779 h 6703211"/>
+              <a:gd name="connsiteX5" fmla="*/ 1791 w 4261902"/>
+              <a:gd name="connsiteY5" fmla="*/ 1248949 h 6703211"/>
+              <a:gd name="connsiteX6" fmla="*/ 142468 w 4261902"/>
+              <a:gd name="connsiteY6" fmla="*/ 299379 h 6703211"/>
+              <a:gd name="connsiteX7" fmla="*/ 881021 w 4261902"/>
+              <a:gd name="connsiteY7" fmla="*/ 441 h 6703211"/>
+              <a:gd name="connsiteX8" fmla="*/ 2147114 w 4261902"/>
+              <a:gd name="connsiteY8" fmla="*/ 229041 h 6703211"/>
+              <a:gd name="connsiteX9" fmla="*/ 2850498 w 4261902"/>
+              <a:gd name="connsiteY9" fmla="*/ 88364 h 6703211"/>
+              <a:gd name="connsiteX10" fmla="*/ 3465960 w 4261902"/>
+              <a:gd name="connsiteY10" fmla="*/ 18025 h 6703211"/>
+              <a:gd name="connsiteX11" fmla="*/ 4028668 w 4261902"/>
+              <a:gd name="connsiteY11" fmla="*/ 158702 h 6703211"/>
+              <a:gd name="connsiteX12" fmla="*/ 4257268 w 4261902"/>
+              <a:gd name="connsiteY12" fmla="*/ 967595 h 6703211"/>
+              <a:gd name="connsiteX13" fmla="*/ 4151760 w 4261902"/>
+              <a:gd name="connsiteY13" fmla="*/ 2128179 h 6703211"/>
+              <a:gd name="connsiteX14" fmla="*/ 3800068 w 4261902"/>
+              <a:gd name="connsiteY14" fmla="*/ 3085922 h 6703211"/>
+              <a:gd name="connsiteX15" fmla="*/ 3800068 w 4261902"/>
+              <a:gd name="connsiteY15" fmla="*/ 3886641 h 6703211"/>
+              <a:gd name="connsiteX16" fmla="*/ 3712144 w 4261902"/>
+              <a:gd name="connsiteY16" fmla="*/ 5187902 h 6703211"/>
+              <a:gd name="connsiteX17" fmla="*/ 3348812 w 4261902"/>
+              <a:gd name="connsiteY17" fmla="*/ 6679128 h 6703211"/>
+              <a:gd name="connsiteX18" fmla="*/ 2780160 w 4261902"/>
+              <a:gd name="connsiteY18" fmla="*/ 5469256 h 6703211"/>
+              <a:gd name="connsiteX19" fmla="*/ 2530507 w 4261902"/>
+              <a:gd name="connsiteY19" fmla="*/ 4272264 h 6703211"/>
+              <a:gd name="connsiteX20" fmla="*/ 2233798 w 4261902"/>
+              <a:gd name="connsiteY20" fmla="*/ 3891347 h 6703211"/>
+              <a:gd name="connsiteX21" fmla="*/ 1857339 w 4261902"/>
+              <a:gd name="connsiteY21" fmla="*/ 3884411 h 6703211"/>
+              <a:gd name="connsiteX22" fmla="*/ 1512829 w 4261902"/>
+              <a:gd name="connsiteY22" fmla="*/ 4211337 h 6703211"/>
+              <a:gd name="connsiteX23" fmla="*/ 1338221 w 4261902"/>
+              <a:gd name="connsiteY23" fmla="*/ 5135149 h 6703211"/>
+              <a:gd name="connsiteX24" fmla="*/ 1127206 w 4261902"/>
+              <a:gd name="connsiteY24" fmla="*/ 6137472 h 6703211"/>
+              <a:gd name="connsiteX25" fmla="*/ 845852 w 4261902"/>
+              <a:gd name="connsiteY25" fmla="*/ 6700179 h 6703211"/>
+              <a:gd name="connsiteX26" fmla="*/ 652421 w 4261902"/>
+              <a:gd name="connsiteY26" fmla="*/ 6330902 h 6703211"/>
+              <a:gd name="connsiteX0" fmla="*/ 652421 w 4264883"/>
+              <a:gd name="connsiteY0" fmla="*/ 6330902 h 6703211"/>
+              <a:gd name="connsiteX1" fmla="*/ 494160 w 4264883"/>
+              <a:gd name="connsiteY1" fmla="*/ 5434087 h 6703211"/>
+              <a:gd name="connsiteX2" fmla="*/ 388652 w 4264883"/>
+              <a:gd name="connsiteY2" fmla="*/ 4115241 h 6703211"/>
+              <a:gd name="connsiteX3" fmla="*/ 398063 w 4264883"/>
+              <a:gd name="connsiteY3" fmla="*/ 3104745 h 6703211"/>
+              <a:gd name="connsiteX4" fmla="*/ 177637 w 4264883"/>
+              <a:gd name="connsiteY4" fmla="*/ 2356779 h 6703211"/>
+              <a:gd name="connsiteX5" fmla="*/ 1791 w 4264883"/>
+              <a:gd name="connsiteY5" fmla="*/ 1248949 h 6703211"/>
+              <a:gd name="connsiteX6" fmla="*/ 142468 w 4264883"/>
+              <a:gd name="connsiteY6" fmla="*/ 299379 h 6703211"/>
+              <a:gd name="connsiteX7" fmla="*/ 881021 w 4264883"/>
+              <a:gd name="connsiteY7" fmla="*/ 441 h 6703211"/>
+              <a:gd name="connsiteX8" fmla="*/ 2147114 w 4264883"/>
+              <a:gd name="connsiteY8" fmla="*/ 229041 h 6703211"/>
+              <a:gd name="connsiteX9" fmla="*/ 2850498 w 4264883"/>
+              <a:gd name="connsiteY9" fmla="*/ 88364 h 6703211"/>
+              <a:gd name="connsiteX10" fmla="*/ 3465960 w 4264883"/>
+              <a:gd name="connsiteY10" fmla="*/ 18025 h 6703211"/>
+              <a:gd name="connsiteX11" fmla="*/ 3977152 w 4264883"/>
+              <a:gd name="connsiteY11" fmla="*/ 184460 h 6703211"/>
+              <a:gd name="connsiteX12" fmla="*/ 4257268 w 4264883"/>
+              <a:gd name="connsiteY12" fmla="*/ 967595 h 6703211"/>
+              <a:gd name="connsiteX13" fmla="*/ 4151760 w 4264883"/>
+              <a:gd name="connsiteY13" fmla="*/ 2128179 h 6703211"/>
+              <a:gd name="connsiteX14" fmla="*/ 3800068 w 4264883"/>
+              <a:gd name="connsiteY14" fmla="*/ 3085922 h 6703211"/>
+              <a:gd name="connsiteX15" fmla="*/ 3800068 w 4264883"/>
+              <a:gd name="connsiteY15" fmla="*/ 3886641 h 6703211"/>
+              <a:gd name="connsiteX16" fmla="*/ 3712144 w 4264883"/>
+              <a:gd name="connsiteY16" fmla="*/ 5187902 h 6703211"/>
+              <a:gd name="connsiteX17" fmla="*/ 3348812 w 4264883"/>
+              <a:gd name="connsiteY17" fmla="*/ 6679128 h 6703211"/>
+              <a:gd name="connsiteX18" fmla="*/ 2780160 w 4264883"/>
+              <a:gd name="connsiteY18" fmla="*/ 5469256 h 6703211"/>
+              <a:gd name="connsiteX19" fmla="*/ 2530507 w 4264883"/>
+              <a:gd name="connsiteY19" fmla="*/ 4272264 h 6703211"/>
+              <a:gd name="connsiteX20" fmla="*/ 2233798 w 4264883"/>
+              <a:gd name="connsiteY20" fmla="*/ 3891347 h 6703211"/>
+              <a:gd name="connsiteX21" fmla="*/ 1857339 w 4264883"/>
+              <a:gd name="connsiteY21" fmla="*/ 3884411 h 6703211"/>
+              <a:gd name="connsiteX22" fmla="*/ 1512829 w 4264883"/>
+              <a:gd name="connsiteY22" fmla="*/ 4211337 h 6703211"/>
+              <a:gd name="connsiteX23" fmla="*/ 1338221 w 4264883"/>
+              <a:gd name="connsiteY23" fmla="*/ 5135149 h 6703211"/>
+              <a:gd name="connsiteX24" fmla="*/ 1127206 w 4264883"/>
+              <a:gd name="connsiteY24" fmla="*/ 6137472 h 6703211"/>
+              <a:gd name="connsiteX25" fmla="*/ 845852 w 4264883"/>
+              <a:gd name="connsiteY25" fmla="*/ 6700179 h 6703211"/>
+              <a:gd name="connsiteX26" fmla="*/ 652421 w 4264883"/>
+              <a:gd name="connsiteY26" fmla="*/ 6330902 h 6703211"/>
+              <a:gd name="connsiteX0" fmla="*/ 652421 w 4261876"/>
+              <a:gd name="connsiteY0" fmla="*/ 6330902 h 6703211"/>
+              <a:gd name="connsiteX1" fmla="*/ 494160 w 4261876"/>
+              <a:gd name="connsiteY1" fmla="*/ 5434087 h 6703211"/>
+              <a:gd name="connsiteX2" fmla="*/ 388652 w 4261876"/>
+              <a:gd name="connsiteY2" fmla="*/ 4115241 h 6703211"/>
+              <a:gd name="connsiteX3" fmla="*/ 398063 w 4261876"/>
+              <a:gd name="connsiteY3" fmla="*/ 3104745 h 6703211"/>
+              <a:gd name="connsiteX4" fmla="*/ 177637 w 4261876"/>
+              <a:gd name="connsiteY4" fmla="*/ 2356779 h 6703211"/>
+              <a:gd name="connsiteX5" fmla="*/ 1791 w 4261876"/>
+              <a:gd name="connsiteY5" fmla="*/ 1248949 h 6703211"/>
+              <a:gd name="connsiteX6" fmla="*/ 142468 w 4261876"/>
+              <a:gd name="connsiteY6" fmla="*/ 299379 h 6703211"/>
+              <a:gd name="connsiteX7" fmla="*/ 881021 w 4261876"/>
+              <a:gd name="connsiteY7" fmla="*/ 441 h 6703211"/>
+              <a:gd name="connsiteX8" fmla="*/ 2147114 w 4261876"/>
+              <a:gd name="connsiteY8" fmla="*/ 229041 h 6703211"/>
+              <a:gd name="connsiteX9" fmla="*/ 2850498 w 4261876"/>
+              <a:gd name="connsiteY9" fmla="*/ 88364 h 6703211"/>
+              <a:gd name="connsiteX10" fmla="*/ 3465960 w 4261876"/>
+              <a:gd name="connsiteY10" fmla="*/ 18025 h 6703211"/>
+              <a:gd name="connsiteX11" fmla="*/ 3977152 w 4261876"/>
+              <a:gd name="connsiteY11" fmla="*/ 184460 h 6703211"/>
+              <a:gd name="connsiteX12" fmla="*/ 4257268 w 4261876"/>
+              <a:gd name="connsiteY12" fmla="*/ 967595 h 6703211"/>
+              <a:gd name="connsiteX13" fmla="*/ 4126002 w 4261876"/>
+              <a:gd name="connsiteY13" fmla="*/ 2269846 h 6703211"/>
+              <a:gd name="connsiteX14" fmla="*/ 3800068 w 4261876"/>
+              <a:gd name="connsiteY14" fmla="*/ 3085922 h 6703211"/>
+              <a:gd name="connsiteX15" fmla="*/ 3800068 w 4261876"/>
+              <a:gd name="connsiteY15" fmla="*/ 3886641 h 6703211"/>
+              <a:gd name="connsiteX16" fmla="*/ 3712144 w 4261876"/>
+              <a:gd name="connsiteY16" fmla="*/ 5187902 h 6703211"/>
+              <a:gd name="connsiteX17" fmla="*/ 3348812 w 4261876"/>
+              <a:gd name="connsiteY17" fmla="*/ 6679128 h 6703211"/>
+              <a:gd name="connsiteX18" fmla="*/ 2780160 w 4261876"/>
+              <a:gd name="connsiteY18" fmla="*/ 5469256 h 6703211"/>
+              <a:gd name="connsiteX19" fmla="*/ 2530507 w 4261876"/>
+              <a:gd name="connsiteY19" fmla="*/ 4272264 h 6703211"/>
+              <a:gd name="connsiteX20" fmla="*/ 2233798 w 4261876"/>
+              <a:gd name="connsiteY20" fmla="*/ 3891347 h 6703211"/>
+              <a:gd name="connsiteX21" fmla="*/ 1857339 w 4261876"/>
+              <a:gd name="connsiteY21" fmla="*/ 3884411 h 6703211"/>
+              <a:gd name="connsiteX22" fmla="*/ 1512829 w 4261876"/>
+              <a:gd name="connsiteY22" fmla="*/ 4211337 h 6703211"/>
+              <a:gd name="connsiteX23" fmla="*/ 1338221 w 4261876"/>
+              <a:gd name="connsiteY23" fmla="*/ 5135149 h 6703211"/>
+              <a:gd name="connsiteX24" fmla="*/ 1127206 w 4261876"/>
+              <a:gd name="connsiteY24" fmla="*/ 6137472 h 6703211"/>
+              <a:gd name="connsiteX25" fmla="*/ 845852 w 4261876"/>
+              <a:gd name="connsiteY25" fmla="*/ 6700179 h 6703211"/>
+              <a:gd name="connsiteX26" fmla="*/ 652421 w 4261876"/>
+              <a:gd name="connsiteY26" fmla="*/ 6330902 h 6703211"/>
+              <a:gd name="connsiteX0" fmla="*/ 652421 w 4261876"/>
+              <a:gd name="connsiteY0" fmla="*/ 6330895 h 6703204"/>
+              <a:gd name="connsiteX1" fmla="*/ 494160 w 4261876"/>
+              <a:gd name="connsiteY1" fmla="*/ 5434080 h 6703204"/>
+              <a:gd name="connsiteX2" fmla="*/ 388652 w 4261876"/>
+              <a:gd name="connsiteY2" fmla="*/ 4115234 h 6703204"/>
+              <a:gd name="connsiteX3" fmla="*/ 398063 w 4261876"/>
+              <a:gd name="connsiteY3" fmla="*/ 3104738 h 6703204"/>
+              <a:gd name="connsiteX4" fmla="*/ 177637 w 4261876"/>
+              <a:gd name="connsiteY4" fmla="*/ 2356772 h 6703204"/>
+              <a:gd name="connsiteX5" fmla="*/ 1791 w 4261876"/>
+              <a:gd name="connsiteY5" fmla="*/ 1248942 h 6703204"/>
+              <a:gd name="connsiteX6" fmla="*/ 142468 w 4261876"/>
+              <a:gd name="connsiteY6" fmla="*/ 299372 h 6703204"/>
+              <a:gd name="connsiteX7" fmla="*/ 881021 w 4261876"/>
+              <a:gd name="connsiteY7" fmla="*/ 434 h 6703204"/>
+              <a:gd name="connsiteX8" fmla="*/ 2147114 w 4261876"/>
+              <a:gd name="connsiteY8" fmla="*/ 229034 h 6703204"/>
+              <a:gd name="connsiteX9" fmla="*/ 2811861 w 4261876"/>
+              <a:gd name="connsiteY9" fmla="*/ 62599 h 6703204"/>
+              <a:gd name="connsiteX10" fmla="*/ 3465960 w 4261876"/>
+              <a:gd name="connsiteY10" fmla="*/ 18018 h 6703204"/>
+              <a:gd name="connsiteX11" fmla="*/ 3977152 w 4261876"/>
+              <a:gd name="connsiteY11" fmla="*/ 184453 h 6703204"/>
+              <a:gd name="connsiteX12" fmla="*/ 4257268 w 4261876"/>
+              <a:gd name="connsiteY12" fmla="*/ 967588 h 6703204"/>
+              <a:gd name="connsiteX13" fmla="*/ 4126002 w 4261876"/>
+              <a:gd name="connsiteY13" fmla="*/ 2269839 h 6703204"/>
+              <a:gd name="connsiteX14" fmla="*/ 3800068 w 4261876"/>
+              <a:gd name="connsiteY14" fmla="*/ 3085915 h 6703204"/>
+              <a:gd name="connsiteX15" fmla="*/ 3800068 w 4261876"/>
+              <a:gd name="connsiteY15" fmla="*/ 3886634 h 6703204"/>
+              <a:gd name="connsiteX16" fmla="*/ 3712144 w 4261876"/>
+              <a:gd name="connsiteY16" fmla="*/ 5187895 h 6703204"/>
+              <a:gd name="connsiteX17" fmla="*/ 3348812 w 4261876"/>
+              <a:gd name="connsiteY17" fmla="*/ 6679121 h 6703204"/>
+              <a:gd name="connsiteX18" fmla="*/ 2780160 w 4261876"/>
+              <a:gd name="connsiteY18" fmla="*/ 5469249 h 6703204"/>
+              <a:gd name="connsiteX19" fmla="*/ 2530507 w 4261876"/>
+              <a:gd name="connsiteY19" fmla="*/ 4272257 h 6703204"/>
+              <a:gd name="connsiteX20" fmla="*/ 2233798 w 4261876"/>
+              <a:gd name="connsiteY20" fmla="*/ 3891340 h 6703204"/>
+              <a:gd name="connsiteX21" fmla="*/ 1857339 w 4261876"/>
+              <a:gd name="connsiteY21" fmla="*/ 3884404 h 6703204"/>
+              <a:gd name="connsiteX22" fmla="*/ 1512829 w 4261876"/>
+              <a:gd name="connsiteY22" fmla="*/ 4211330 h 6703204"/>
+              <a:gd name="connsiteX23" fmla="*/ 1338221 w 4261876"/>
+              <a:gd name="connsiteY23" fmla="*/ 5135142 h 6703204"/>
+              <a:gd name="connsiteX24" fmla="*/ 1127206 w 4261876"/>
+              <a:gd name="connsiteY24" fmla="*/ 6137465 h 6703204"/>
+              <a:gd name="connsiteX25" fmla="*/ 845852 w 4261876"/>
+              <a:gd name="connsiteY25" fmla="*/ 6700172 h 6703204"/>
+              <a:gd name="connsiteX26" fmla="*/ 652421 w 4261876"/>
+              <a:gd name="connsiteY26" fmla="*/ 6330895 h 6703204"/>
+              <a:gd name="connsiteX0" fmla="*/ 652421 w 4261876"/>
+              <a:gd name="connsiteY0" fmla="*/ 6331638 h 6703947"/>
+              <a:gd name="connsiteX1" fmla="*/ 494160 w 4261876"/>
+              <a:gd name="connsiteY1" fmla="*/ 5434823 h 6703947"/>
+              <a:gd name="connsiteX2" fmla="*/ 388652 w 4261876"/>
+              <a:gd name="connsiteY2" fmla="*/ 4115977 h 6703947"/>
+              <a:gd name="connsiteX3" fmla="*/ 398063 w 4261876"/>
+              <a:gd name="connsiteY3" fmla="*/ 3105481 h 6703947"/>
+              <a:gd name="connsiteX4" fmla="*/ 177637 w 4261876"/>
+              <a:gd name="connsiteY4" fmla="*/ 2357515 h 6703947"/>
+              <a:gd name="connsiteX5" fmla="*/ 1791 w 4261876"/>
+              <a:gd name="connsiteY5" fmla="*/ 1249685 h 6703947"/>
+              <a:gd name="connsiteX6" fmla="*/ 142468 w 4261876"/>
+              <a:gd name="connsiteY6" fmla="*/ 300115 h 6703947"/>
+              <a:gd name="connsiteX7" fmla="*/ 881021 w 4261876"/>
+              <a:gd name="connsiteY7" fmla="*/ 1177 h 6703947"/>
+              <a:gd name="connsiteX8" fmla="*/ 2121357 w 4261876"/>
+              <a:gd name="connsiteY8" fmla="*/ 191140 h 6703947"/>
+              <a:gd name="connsiteX9" fmla="*/ 2811861 w 4261876"/>
+              <a:gd name="connsiteY9" fmla="*/ 63342 h 6703947"/>
+              <a:gd name="connsiteX10" fmla="*/ 3465960 w 4261876"/>
+              <a:gd name="connsiteY10" fmla="*/ 18761 h 6703947"/>
+              <a:gd name="connsiteX11" fmla="*/ 3977152 w 4261876"/>
+              <a:gd name="connsiteY11" fmla="*/ 185196 h 6703947"/>
+              <a:gd name="connsiteX12" fmla="*/ 4257268 w 4261876"/>
+              <a:gd name="connsiteY12" fmla="*/ 968331 h 6703947"/>
+              <a:gd name="connsiteX13" fmla="*/ 4126002 w 4261876"/>
+              <a:gd name="connsiteY13" fmla="*/ 2270582 h 6703947"/>
+              <a:gd name="connsiteX14" fmla="*/ 3800068 w 4261876"/>
+              <a:gd name="connsiteY14" fmla="*/ 3086658 h 6703947"/>
+              <a:gd name="connsiteX15" fmla="*/ 3800068 w 4261876"/>
+              <a:gd name="connsiteY15" fmla="*/ 3887377 h 6703947"/>
+              <a:gd name="connsiteX16" fmla="*/ 3712144 w 4261876"/>
+              <a:gd name="connsiteY16" fmla="*/ 5188638 h 6703947"/>
+              <a:gd name="connsiteX17" fmla="*/ 3348812 w 4261876"/>
+              <a:gd name="connsiteY17" fmla="*/ 6679864 h 6703947"/>
+              <a:gd name="connsiteX18" fmla="*/ 2780160 w 4261876"/>
+              <a:gd name="connsiteY18" fmla="*/ 5469992 h 6703947"/>
+              <a:gd name="connsiteX19" fmla="*/ 2530507 w 4261876"/>
+              <a:gd name="connsiteY19" fmla="*/ 4273000 h 6703947"/>
+              <a:gd name="connsiteX20" fmla="*/ 2233798 w 4261876"/>
+              <a:gd name="connsiteY20" fmla="*/ 3892083 h 6703947"/>
+              <a:gd name="connsiteX21" fmla="*/ 1857339 w 4261876"/>
+              <a:gd name="connsiteY21" fmla="*/ 3885147 h 6703947"/>
+              <a:gd name="connsiteX22" fmla="*/ 1512829 w 4261876"/>
+              <a:gd name="connsiteY22" fmla="*/ 4212073 h 6703947"/>
+              <a:gd name="connsiteX23" fmla="*/ 1338221 w 4261876"/>
+              <a:gd name="connsiteY23" fmla="*/ 5135885 h 6703947"/>
+              <a:gd name="connsiteX24" fmla="*/ 1127206 w 4261876"/>
+              <a:gd name="connsiteY24" fmla="*/ 6138208 h 6703947"/>
+              <a:gd name="connsiteX25" fmla="*/ 845852 w 4261876"/>
+              <a:gd name="connsiteY25" fmla="*/ 6700915 h 6703947"/>
+              <a:gd name="connsiteX26" fmla="*/ 652421 w 4261876"/>
+              <a:gd name="connsiteY26" fmla="*/ 6331638 h 6703947"/>
+              <a:gd name="connsiteX0" fmla="*/ 652421 w 4257613"/>
+              <a:gd name="connsiteY0" fmla="*/ 6331638 h 6703947"/>
+              <a:gd name="connsiteX1" fmla="*/ 494160 w 4257613"/>
+              <a:gd name="connsiteY1" fmla="*/ 5434823 h 6703947"/>
+              <a:gd name="connsiteX2" fmla="*/ 388652 w 4257613"/>
+              <a:gd name="connsiteY2" fmla="*/ 4115977 h 6703947"/>
+              <a:gd name="connsiteX3" fmla="*/ 398063 w 4257613"/>
+              <a:gd name="connsiteY3" fmla="*/ 3105481 h 6703947"/>
+              <a:gd name="connsiteX4" fmla="*/ 177637 w 4257613"/>
+              <a:gd name="connsiteY4" fmla="*/ 2357515 h 6703947"/>
+              <a:gd name="connsiteX5" fmla="*/ 1791 w 4257613"/>
+              <a:gd name="connsiteY5" fmla="*/ 1249685 h 6703947"/>
+              <a:gd name="connsiteX6" fmla="*/ 142468 w 4257613"/>
+              <a:gd name="connsiteY6" fmla="*/ 300115 h 6703947"/>
+              <a:gd name="connsiteX7" fmla="*/ 881021 w 4257613"/>
+              <a:gd name="connsiteY7" fmla="*/ 1177 h 6703947"/>
+              <a:gd name="connsiteX8" fmla="*/ 2121357 w 4257613"/>
+              <a:gd name="connsiteY8" fmla="*/ 191140 h 6703947"/>
+              <a:gd name="connsiteX9" fmla="*/ 2811861 w 4257613"/>
+              <a:gd name="connsiteY9" fmla="*/ 63342 h 6703947"/>
+              <a:gd name="connsiteX10" fmla="*/ 3465960 w 4257613"/>
+              <a:gd name="connsiteY10" fmla="*/ 18761 h 6703947"/>
+              <a:gd name="connsiteX11" fmla="*/ 4093061 w 4257613"/>
+              <a:gd name="connsiteY11" fmla="*/ 236711 h 6703947"/>
+              <a:gd name="connsiteX12" fmla="*/ 4257268 w 4257613"/>
+              <a:gd name="connsiteY12" fmla="*/ 968331 h 6703947"/>
+              <a:gd name="connsiteX13" fmla="*/ 4126002 w 4257613"/>
+              <a:gd name="connsiteY13" fmla="*/ 2270582 h 6703947"/>
+              <a:gd name="connsiteX14" fmla="*/ 3800068 w 4257613"/>
+              <a:gd name="connsiteY14" fmla="*/ 3086658 h 6703947"/>
+              <a:gd name="connsiteX15" fmla="*/ 3800068 w 4257613"/>
+              <a:gd name="connsiteY15" fmla="*/ 3887377 h 6703947"/>
+              <a:gd name="connsiteX16" fmla="*/ 3712144 w 4257613"/>
+              <a:gd name="connsiteY16" fmla="*/ 5188638 h 6703947"/>
+              <a:gd name="connsiteX17" fmla="*/ 3348812 w 4257613"/>
+              <a:gd name="connsiteY17" fmla="*/ 6679864 h 6703947"/>
+              <a:gd name="connsiteX18" fmla="*/ 2780160 w 4257613"/>
+              <a:gd name="connsiteY18" fmla="*/ 5469992 h 6703947"/>
+              <a:gd name="connsiteX19" fmla="*/ 2530507 w 4257613"/>
+              <a:gd name="connsiteY19" fmla="*/ 4273000 h 6703947"/>
+              <a:gd name="connsiteX20" fmla="*/ 2233798 w 4257613"/>
+              <a:gd name="connsiteY20" fmla="*/ 3892083 h 6703947"/>
+              <a:gd name="connsiteX21" fmla="*/ 1857339 w 4257613"/>
+              <a:gd name="connsiteY21" fmla="*/ 3885147 h 6703947"/>
+              <a:gd name="connsiteX22" fmla="*/ 1512829 w 4257613"/>
+              <a:gd name="connsiteY22" fmla="*/ 4212073 h 6703947"/>
+              <a:gd name="connsiteX23" fmla="*/ 1338221 w 4257613"/>
+              <a:gd name="connsiteY23" fmla="*/ 5135885 h 6703947"/>
+              <a:gd name="connsiteX24" fmla="*/ 1127206 w 4257613"/>
+              <a:gd name="connsiteY24" fmla="*/ 6138208 h 6703947"/>
+              <a:gd name="connsiteX25" fmla="*/ 845852 w 4257613"/>
+              <a:gd name="connsiteY25" fmla="*/ 6700915 h 6703947"/>
+              <a:gd name="connsiteX26" fmla="*/ 652421 w 4257613"/>
+              <a:gd name="connsiteY26" fmla="*/ 6331638 h 6703947"/>
+              <a:gd name="connsiteX0" fmla="*/ 652421 w 4258651"/>
+              <a:gd name="connsiteY0" fmla="*/ 6331638 h 6703947"/>
+              <a:gd name="connsiteX1" fmla="*/ 494160 w 4258651"/>
+              <a:gd name="connsiteY1" fmla="*/ 5434823 h 6703947"/>
+              <a:gd name="connsiteX2" fmla="*/ 388652 w 4258651"/>
+              <a:gd name="connsiteY2" fmla="*/ 4115977 h 6703947"/>
+              <a:gd name="connsiteX3" fmla="*/ 398063 w 4258651"/>
+              <a:gd name="connsiteY3" fmla="*/ 3105481 h 6703947"/>
+              <a:gd name="connsiteX4" fmla="*/ 177637 w 4258651"/>
+              <a:gd name="connsiteY4" fmla="*/ 2357515 h 6703947"/>
+              <a:gd name="connsiteX5" fmla="*/ 1791 w 4258651"/>
+              <a:gd name="connsiteY5" fmla="*/ 1249685 h 6703947"/>
+              <a:gd name="connsiteX6" fmla="*/ 142468 w 4258651"/>
+              <a:gd name="connsiteY6" fmla="*/ 300115 h 6703947"/>
+              <a:gd name="connsiteX7" fmla="*/ 881021 w 4258651"/>
+              <a:gd name="connsiteY7" fmla="*/ 1177 h 6703947"/>
+              <a:gd name="connsiteX8" fmla="*/ 2121357 w 4258651"/>
+              <a:gd name="connsiteY8" fmla="*/ 191140 h 6703947"/>
+              <a:gd name="connsiteX9" fmla="*/ 2811861 w 4258651"/>
+              <a:gd name="connsiteY9" fmla="*/ 63342 h 6703947"/>
+              <a:gd name="connsiteX10" fmla="*/ 3465960 w 4258651"/>
+              <a:gd name="connsiteY10" fmla="*/ 18761 h 6703947"/>
+              <a:gd name="connsiteX11" fmla="*/ 4054425 w 4258651"/>
+              <a:gd name="connsiteY11" fmla="*/ 236711 h 6703947"/>
+              <a:gd name="connsiteX12" fmla="*/ 4257268 w 4258651"/>
+              <a:gd name="connsiteY12" fmla="*/ 968331 h 6703947"/>
+              <a:gd name="connsiteX13" fmla="*/ 4126002 w 4258651"/>
+              <a:gd name="connsiteY13" fmla="*/ 2270582 h 6703947"/>
+              <a:gd name="connsiteX14" fmla="*/ 3800068 w 4258651"/>
+              <a:gd name="connsiteY14" fmla="*/ 3086658 h 6703947"/>
+              <a:gd name="connsiteX15" fmla="*/ 3800068 w 4258651"/>
+              <a:gd name="connsiteY15" fmla="*/ 3887377 h 6703947"/>
+              <a:gd name="connsiteX16" fmla="*/ 3712144 w 4258651"/>
+              <a:gd name="connsiteY16" fmla="*/ 5188638 h 6703947"/>
+              <a:gd name="connsiteX17" fmla="*/ 3348812 w 4258651"/>
+              <a:gd name="connsiteY17" fmla="*/ 6679864 h 6703947"/>
+              <a:gd name="connsiteX18" fmla="*/ 2780160 w 4258651"/>
+              <a:gd name="connsiteY18" fmla="*/ 5469992 h 6703947"/>
+              <a:gd name="connsiteX19" fmla="*/ 2530507 w 4258651"/>
+              <a:gd name="connsiteY19" fmla="*/ 4273000 h 6703947"/>
+              <a:gd name="connsiteX20" fmla="*/ 2233798 w 4258651"/>
+              <a:gd name="connsiteY20" fmla="*/ 3892083 h 6703947"/>
+              <a:gd name="connsiteX21" fmla="*/ 1857339 w 4258651"/>
+              <a:gd name="connsiteY21" fmla="*/ 3885147 h 6703947"/>
+              <a:gd name="connsiteX22" fmla="*/ 1512829 w 4258651"/>
+              <a:gd name="connsiteY22" fmla="*/ 4212073 h 6703947"/>
+              <a:gd name="connsiteX23" fmla="*/ 1338221 w 4258651"/>
+              <a:gd name="connsiteY23" fmla="*/ 5135885 h 6703947"/>
+              <a:gd name="connsiteX24" fmla="*/ 1127206 w 4258651"/>
+              <a:gd name="connsiteY24" fmla="*/ 6138208 h 6703947"/>
+              <a:gd name="connsiteX25" fmla="*/ 845852 w 4258651"/>
+              <a:gd name="connsiteY25" fmla="*/ 6700915 h 6703947"/>
+              <a:gd name="connsiteX26" fmla="*/ 652421 w 4258651"/>
+              <a:gd name="connsiteY26" fmla="*/ 6331638 h 6703947"/>
+              <a:gd name="connsiteX0" fmla="*/ 652421 w 4258651"/>
+              <a:gd name="connsiteY0" fmla="*/ 6331638 h 6703947"/>
+              <a:gd name="connsiteX1" fmla="*/ 494160 w 4258651"/>
+              <a:gd name="connsiteY1" fmla="*/ 5434823 h 6703947"/>
+              <a:gd name="connsiteX2" fmla="*/ 388652 w 4258651"/>
+              <a:gd name="connsiteY2" fmla="*/ 4115977 h 6703947"/>
+              <a:gd name="connsiteX3" fmla="*/ 398063 w 4258651"/>
+              <a:gd name="connsiteY3" fmla="*/ 3105481 h 6703947"/>
+              <a:gd name="connsiteX4" fmla="*/ 177637 w 4258651"/>
+              <a:gd name="connsiteY4" fmla="*/ 2357515 h 6703947"/>
+              <a:gd name="connsiteX5" fmla="*/ 1791 w 4258651"/>
+              <a:gd name="connsiteY5" fmla="*/ 1249685 h 6703947"/>
+              <a:gd name="connsiteX6" fmla="*/ 142468 w 4258651"/>
+              <a:gd name="connsiteY6" fmla="*/ 300115 h 6703947"/>
+              <a:gd name="connsiteX7" fmla="*/ 881021 w 4258651"/>
+              <a:gd name="connsiteY7" fmla="*/ 1177 h 6703947"/>
+              <a:gd name="connsiteX8" fmla="*/ 2121357 w 4258651"/>
+              <a:gd name="connsiteY8" fmla="*/ 191140 h 6703947"/>
+              <a:gd name="connsiteX9" fmla="*/ 2811861 w 4258651"/>
+              <a:gd name="connsiteY9" fmla="*/ 63342 h 6703947"/>
+              <a:gd name="connsiteX10" fmla="*/ 3465960 w 4258651"/>
+              <a:gd name="connsiteY10" fmla="*/ 18761 h 6703947"/>
+              <a:gd name="connsiteX11" fmla="*/ 4054425 w 4258651"/>
+              <a:gd name="connsiteY11" fmla="*/ 236711 h 6703947"/>
+              <a:gd name="connsiteX12" fmla="*/ 4257268 w 4258651"/>
+              <a:gd name="connsiteY12" fmla="*/ 968331 h 6703947"/>
+              <a:gd name="connsiteX13" fmla="*/ 4126002 w 4258651"/>
+              <a:gd name="connsiteY13" fmla="*/ 2270582 h 6703947"/>
+              <a:gd name="connsiteX14" fmla="*/ 3800068 w 4258651"/>
+              <a:gd name="connsiteY14" fmla="*/ 3086658 h 6703947"/>
+              <a:gd name="connsiteX15" fmla="*/ 3800068 w 4258651"/>
+              <a:gd name="connsiteY15" fmla="*/ 3887377 h 6703947"/>
+              <a:gd name="connsiteX16" fmla="*/ 3712144 w 4258651"/>
+              <a:gd name="connsiteY16" fmla="*/ 5188638 h 6703947"/>
+              <a:gd name="connsiteX17" fmla="*/ 3348812 w 4258651"/>
+              <a:gd name="connsiteY17" fmla="*/ 6679864 h 6703947"/>
+              <a:gd name="connsiteX18" fmla="*/ 2780160 w 4258651"/>
+              <a:gd name="connsiteY18" fmla="*/ 5469992 h 6703947"/>
+              <a:gd name="connsiteX19" fmla="*/ 2530507 w 4258651"/>
+              <a:gd name="connsiteY19" fmla="*/ 4273000 h 6703947"/>
+              <a:gd name="connsiteX20" fmla="*/ 2272435 w 4258651"/>
+              <a:gd name="connsiteY20" fmla="*/ 3892083 h 6703947"/>
+              <a:gd name="connsiteX21" fmla="*/ 1857339 w 4258651"/>
+              <a:gd name="connsiteY21" fmla="*/ 3885147 h 6703947"/>
+              <a:gd name="connsiteX22" fmla="*/ 1512829 w 4258651"/>
+              <a:gd name="connsiteY22" fmla="*/ 4212073 h 6703947"/>
+              <a:gd name="connsiteX23" fmla="*/ 1338221 w 4258651"/>
+              <a:gd name="connsiteY23" fmla="*/ 5135885 h 6703947"/>
+              <a:gd name="connsiteX24" fmla="*/ 1127206 w 4258651"/>
+              <a:gd name="connsiteY24" fmla="*/ 6138208 h 6703947"/>
+              <a:gd name="connsiteX25" fmla="*/ 845852 w 4258651"/>
+              <a:gd name="connsiteY25" fmla="*/ 6700915 h 6703947"/>
+              <a:gd name="connsiteX26" fmla="*/ 652421 w 4258651"/>
+              <a:gd name="connsiteY26" fmla="*/ 6331638 h 6703947"/>
+              <a:gd name="connsiteX0" fmla="*/ 652421 w 4258651"/>
+              <a:gd name="connsiteY0" fmla="*/ 6331638 h 6703947"/>
+              <a:gd name="connsiteX1" fmla="*/ 494160 w 4258651"/>
+              <a:gd name="connsiteY1" fmla="*/ 5434823 h 6703947"/>
+              <a:gd name="connsiteX2" fmla="*/ 388652 w 4258651"/>
+              <a:gd name="connsiteY2" fmla="*/ 4115977 h 6703947"/>
+              <a:gd name="connsiteX3" fmla="*/ 398063 w 4258651"/>
+              <a:gd name="connsiteY3" fmla="*/ 3105481 h 6703947"/>
+              <a:gd name="connsiteX4" fmla="*/ 177637 w 4258651"/>
+              <a:gd name="connsiteY4" fmla="*/ 2357515 h 6703947"/>
+              <a:gd name="connsiteX5" fmla="*/ 1791 w 4258651"/>
+              <a:gd name="connsiteY5" fmla="*/ 1249685 h 6703947"/>
+              <a:gd name="connsiteX6" fmla="*/ 142468 w 4258651"/>
+              <a:gd name="connsiteY6" fmla="*/ 300115 h 6703947"/>
+              <a:gd name="connsiteX7" fmla="*/ 881021 w 4258651"/>
+              <a:gd name="connsiteY7" fmla="*/ 1177 h 6703947"/>
+              <a:gd name="connsiteX8" fmla="*/ 2121357 w 4258651"/>
+              <a:gd name="connsiteY8" fmla="*/ 191140 h 6703947"/>
+              <a:gd name="connsiteX9" fmla="*/ 2811861 w 4258651"/>
+              <a:gd name="connsiteY9" fmla="*/ 63342 h 6703947"/>
+              <a:gd name="connsiteX10" fmla="*/ 3465960 w 4258651"/>
+              <a:gd name="connsiteY10" fmla="*/ 18761 h 6703947"/>
+              <a:gd name="connsiteX11" fmla="*/ 4054425 w 4258651"/>
+              <a:gd name="connsiteY11" fmla="*/ 236711 h 6703947"/>
+              <a:gd name="connsiteX12" fmla="*/ 4257268 w 4258651"/>
+              <a:gd name="connsiteY12" fmla="*/ 968331 h 6703947"/>
+              <a:gd name="connsiteX13" fmla="*/ 4126002 w 4258651"/>
+              <a:gd name="connsiteY13" fmla="*/ 2270582 h 6703947"/>
+              <a:gd name="connsiteX14" fmla="*/ 3800068 w 4258651"/>
+              <a:gd name="connsiteY14" fmla="*/ 3086658 h 6703947"/>
+              <a:gd name="connsiteX15" fmla="*/ 3800068 w 4258651"/>
+              <a:gd name="connsiteY15" fmla="*/ 3887377 h 6703947"/>
+              <a:gd name="connsiteX16" fmla="*/ 3712144 w 4258651"/>
+              <a:gd name="connsiteY16" fmla="*/ 5188638 h 6703947"/>
+              <a:gd name="connsiteX17" fmla="*/ 3348812 w 4258651"/>
+              <a:gd name="connsiteY17" fmla="*/ 6679864 h 6703947"/>
+              <a:gd name="connsiteX18" fmla="*/ 2780160 w 4258651"/>
+              <a:gd name="connsiteY18" fmla="*/ 5469992 h 6703947"/>
+              <a:gd name="connsiteX19" fmla="*/ 2530507 w 4258651"/>
+              <a:gd name="connsiteY19" fmla="*/ 4273000 h 6703947"/>
+              <a:gd name="connsiteX20" fmla="*/ 2272435 w 4258651"/>
+              <a:gd name="connsiteY20" fmla="*/ 3892083 h 6703947"/>
+              <a:gd name="connsiteX21" fmla="*/ 1857339 w 4258651"/>
+              <a:gd name="connsiteY21" fmla="*/ 3885147 h 6703947"/>
+              <a:gd name="connsiteX22" fmla="*/ 1512829 w 4258651"/>
+              <a:gd name="connsiteY22" fmla="*/ 4212073 h 6703947"/>
+              <a:gd name="connsiteX23" fmla="*/ 1338221 w 4258651"/>
+              <a:gd name="connsiteY23" fmla="*/ 5135885 h 6703947"/>
+              <a:gd name="connsiteX24" fmla="*/ 1127206 w 4258651"/>
+              <a:gd name="connsiteY24" fmla="*/ 6138208 h 6703947"/>
+              <a:gd name="connsiteX25" fmla="*/ 845852 w 4258651"/>
+              <a:gd name="connsiteY25" fmla="*/ 6700915 h 6703947"/>
+              <a:gd name="connsiteX26" fmla="*/ 652421 w 4258651"/>
+              <a:gd name="connsiteY26" fmla="*/ 6331638 h 6703947"/>
+              <a:gd name="connsiteX0" fmla="*/ 652421 w 4258651"/>
+              <a:gd name="connsiteY0" fmla="*/ 6331638 h 6703947"/>
+              <a:gd name="connsiteX1" fmla="*/ 494160 w 4258651"/>
+              <a:gd name="connsiteY1" fmla="*/ 5434823 h 6703947"/>
+              <a:gd name="connsiteX2" fmla="*/ 388652 w 4258651"/>
+              <a:gd name="connsiteY2" fmla="*/ 4115977 h 6703947"/>
+              <a:gd name="connsiteX3" fmla="*/ 398063 w 4258651"/>
+              <a:gd name="connsiteY3" fmla="*/ 3105481 h 6703947"/>
+              <a:gd name="connsiteX4" fmla="*/ 177637 w 4258651"/>
+              <a:gd name="connsiteY4" fmla="*/ 2357515 h 6703947"/>
+              <a:gd name="connsiteX5" fmla="*/ 1791 w 4258651"/>
+              <a:gd name="connsiteY5" fmla="*/ 1249685 h 6703947"/>
+              <a:gd name="connsiteX6" fmla="*/ 142468 w 4258651"/>
+              <a:gd name="connsiteY6" fmla="*/ 300115 h 6703947"/>
+              <a:gd name="connsiteX7" fmla="*/ 881021 w 4258651"/>
+              <a:gd name="connsiteY7" fmla="*/ 1177 h 6703947"/>
+              <a:gd name="connsiteX8" fmla="*/ 2121357 w 4258651"/>
+              <a:gd name="connsiteY8" fmla="*/ 191140 h 6703947"/>
+              <a:gd name="connsiteX9" fmla="*/ 2811861 w 4258651"/>
+              <a:gd name="connsiteY9" fmla="*/ 63342 h 6703947"/>
+              <a:gd name="connsiteX10" fmla="*/ 3465960 w 4258651"/>
+              <a:gd name="connsiteY10" fmla="*/ 18761 h 6703947"/>
+              <a:gd name="connsiteX11" fmla="*/ 4054425 w 4258651"/>
+              <a:gd name="connsiteY11" fmla="*/ 236711 h 6703947"/>
+              <a:gd name="connsiteX12" fmla="*/ 4257268 w 4258651"/>
+              <a:gd name="connsiteY12" fmla="*/ 968331 h 6703947"/>
+              <a:gd name="connsiteX13" fmla="*/ 4126002 w 4258651"/>
+              <a:gd name="connsiteY13" fmla="*/ 2270582 h 6703947"/>
+              <a:gd name="connsiteX14" fmla="*/ 3800068 w 4258651"/>
+              <a:gd name="connsiteY14" fmla="*/ 3086658 h 6703947"/>
+              <a:gd name="connsiteX15" fmla="*/ 3800068 w 4258651"/>
+              <a:gd name="connsiteY15" fmla="*/ 3887377 h 6703947"/>
+              <a:gd name="connsiteX16" fmla="*/ 3712144 w 4258651"/>
+              <a:gd name="connsiteY16" fmla="*/ 5188638 h 6703947"/>
+              <a:gd name="connsiteX17" fmla="*/ 3348812 w 4258651"/>
+              <a:gd name="connsiteY17" fmla="*/ 6679864 h 6703947"/>
+              <a:gd name="connsiteX18" fmla="*/ 2780160 w 4258651"/>
+              <a:gd name="connsiteY18" fmla="*/ 5469992 h 6703947"/>
+              <a:gd name="connsiteX19" fmla="*/ 2530507 w 4258651"/>
+              <a:gd name="connsiteY19" fmla="*/ 4273000 h 6703947"/>
+              <a:gd name="connsiteX20" fmla="*/ 2272435 w 4258651"/>
+              <a:gd name="connsiteY20" fmla="*/ 3892083 h 6703947"/>
+              <a:gd name="connsiteX21" fmla="*/ 1857339 w 4258651"/>
+              <a:gd name="connsiteY21" fmla="*/ 3885147 h 6703947"/>
+              <a:gd name="connsiteX22" fmla="*/ 1512829 w 4258651"/>
+              <a:gd name="connsiteY22" fmla="*/ 4212073 h 6703947"/>
+              <a:gd name="connsiteX23" fmla="*/ 1338221 w 4258651"/>
+              <a:gd name="connsiteY23" fmla="*/ 5135885 h 6703947"/>
+              <a:gd name="connsiteX24" fmla="*/ 1127206 w 4258651"/>
+              <a:gd name="connsiteY24" fmla="*/ 6138208 h 6703947"/>
+              <a:gd name="connsiteX25" fmla="*/ 845852 w 4258651"/>
+              <a:gd name="connsiteY25" fmla="*/ 6700915 h 6703947"/>
+              <a:gd name="connsiteX26" fmla="*/ 652421 w 4258651"/>
+              <a:gd name="connsiteY26" fmla="*/ 6331638 h 6703947"/>
+              <a:gd name="connsiteX0" fmla="*/ 652421 w 4258651"/>
+              <a:gd name="connsiteY0" fmla="*/ 6331638 h 6703947"/>
+              <a:gd name="connsiteX1" fmla="*/ 494160 w 4258651"/>
+              <a:gd name="connsiteY1" fmla="*/ 5434823 h 6703947"/>
+              <a:gd name="connsiteX2" fmla="*/ 388652 w 4258651"/>
+              <a:gd name="connsiteY2" fmla="*/ 4115977 h 6703947"/>
+              <a:gd name="connsiteX3" fmla="*/ 398063 w 4258651"/>
+              <a:gd name="connsiteY3" fmla="*/ 3105481 h 6703947"/>
+              <a:gd name="connsiteX4" fmla="*/ 177637 w 4258651"/>
+              <a:gd name="connsiteY4" fmla="*/ 2357515 h 6703947"/>
+              <a:gd name="connsiteX5" fmla="*/ 1791 w 4258651"/>
+              <a:gd name="connsiteY5" fmla="*/ 1249685 h 6703947"/>
+              <a:gd name="connsiteX6" fmla="*/ 142468 w 4258651"/>
+              <a:gd name="connsiteY6" fmla="*/ 300115 h 6703947"/>
+              <a:gd name="connsiteX7" fmla="*/ 881021 w 4258651"/>
+              <a:gd name="connsiteY7" fmla="*/ 1177 h 6703947"/>
+              <a:gd name="connsiteX8" fmla="*/ 2121357 w 4258651"/>
+              <a:gd name="connsiteY8" fmla="*/ 191140 h 6703947"/>
+              <a:gd name="connsiteX9" fmla="*/ 2811861 w 4258651"/>
+              <a:gd name="connsiteY9" fmla="*/ 63342 h 6703947"/>
+              <a:gd name="connsiteX10" fmla="*/ 3465960 w 4258651"/>
+              <a:gd name="connsiteY10" fmla="*/ 18761 h 6703947"/>
+              <a:gd name="connsiteX11" fmla="*/ 4054425 w 4258651"/>
+              <a:gd name="connsiteY11" fmla="*/ 236711 h 6703947"/>
+              <a:gd name="connsiteX12" fmla="*/ 4257268 w 4258651"/>
+              <a:gd name="connsiteY12" fmla="*/ 968331 h 6703947"/>
+              <a:gd name="connsiteX13" fmla="*/ 4126002 w 4258651"/>
+              <a:gd name="connsiteY13" fmla="*/ 2270582 h 6703947"/>
+              <a:gd name="connsiteX14" fmla="*/ 3800068 w 4258651"/>
+              <a:gd name="connsiteY14" fmla="*/ 3086658 h 6703947"/>
+              <a:gd name="connsiteX15" fmla="*/ 3800068 w 4258651"/>
+              <a:gd name="connsiteY15" fmla="*/ 3887377 h 6703947"/>
+              <a:gd name="connsiteX16" fmla="*/ 3712144 w 4258651"/>
+              <a:gd name="connsiteY16" fmla="*/ 5188638 h 6703947"/>
+              <a:gd name="connsiteX17" fmla="*/ 3348812 w 4258651"/>
+              <a:gd name="connsiteY17" fmla="*/ 6679864 h 6703947"/>
+              <a:gd name="connsiteX18" fmla="*/ 2780160 w 4258651"/>
+              <a:gd name="connsiteY18" fmla="*/ 5469992 h 6703947"/>
+              <a:gd name="connsiteX19" fmla="*/ 2530507 w 4258651"/>
+              <a:gd name="connsiteY19" fmla="*/ 4273000 h 6703947"/>
+              <a:gd name="connsiteX20" fmla="*/ 2272435 w 4258651"/>
+              <a:gd name="connsiteY20" fmla="*/ 3892083 h 6703947"/>
+              <a:gd name="connsiteX21" fmla="*/ 1857339 w 4258651"/>
+              <a:gd name="connsiteY21" fmla="*/ 3885147 h 6703947"/>
+              <a:gd name="connsiteX22" fmla="*/ 1512829 w 4258651"/>
+              <a:gd name="connsiteY22" fmla="*/ 4212073 h 6703947"/>
+              <a:gd name="connsiteX23" fmla="*/ 1338221 w 4258651"/>
+              <a:gd name="connsiteY23" fmla="*/ 5135885 h 6703947"/>
+              <a:gd name="connsiteX24" fmla="*/ 1127206 w 4258651"/>
+              <a:gd name="connsiteY24" fmla="*/ 6138208 h 6703947"/>
+              <a:gd name="connsiteX25" fmla="*/ 845852 w 4258651"/>
+              <a:gd name="connsiteY25" fmla="*/ 6700915 h 6703947"/>
+              <a:gd name="connsiteX26" fmla="*/ 652421 w 4258651"/>
+              <a:gd name="connsiteY26" fmla="*/ 6331638 h 6703947"/>
+              <a:gd name="connsiteX0" fmla="*/ 652421 w 4258651"/>
+              <a:gd name="connsiteY0" fmla="*/ 6331638 h 6703947"/>
+              <a:gd name="connsiteX1" fmla="*/ 494160 w 4258651"/>
+              <a:gd name="connsiteY1" fmla="*/ 5434823 h 6703947"/>
+              <a:gd name="connsiteX2" fmla="*/ 388652 w 4258651"/>
+              <a:gd name="connsiteY2" fmla="*/ 4115977 h 6703947"/>
+              <a:gd name="connsiteX3" fmla="*/ 398063 w 4258651"/>
+              <a:gd name="connsiteY3" fmla="*/ 3105481 h 6703947"/>
+              <a:gd name="connsiteX4" fmla="*/ 177637 w 4258651"/>
+              <a:gd name="connsiteY4" fmla="*/ 2357515 h 6703947"/>
+              <a:gd name="connsiteX5" fmla="*/ 1791 w 4258651"/>
+              <a:gd name="connsiteY5" fmla="*/ 1249685 h 6703947"/>
+              <a:gd name="connsiteX6" fmla="*/ 142468 w 4258651"/>
+              <a:gd name="connsiteY6" fmla="*/ 300115 h 6703947"/>
+              <a:gd name="connsiteX7" fmla="*/ 881021 w 4258651"/>
+              <a:gd name="connsiteY7" fmla="*/ 1177 h 6703947"/>
+              <a:gd name="connsiteX8" fmla="*/ 2121357 w 4258651"/>
+              <a:gd name="connsiteY8" fmla="*/ 191140 h 6703947"/>
+              <a:gd name="connsiteX9" fmla="*/ 2811861 w 4258651"/>
+              <a:gd name="connsiteY9" fmla="*/ 63342 h 6703947"/>
+              <a:gd name="connsiteX10" fmla="*/ 3465960 w 4258651"/>
+              <a:gd name="connsiteY10" fmla="*/ 18761 h 6703947"/>
+              <a:gd name="connsiteX11" fmla="*/ 4054425 w 4258651"/>
+              <a:gd name="connsiteY11" fmla="*/ 236711 h 6703947"/>
+              <a:gd name="connsiteX12" fmla="*/ 4257268 w 4258651"/>
+              <a:gd name="connsiteY12" fmla="*/ 968331 h 6703947"/>
+              <a:gd name="connsiteX13" fmla="*/ 4126002 w 4258651"/>
+              <a:gd name="connsiteY13" fmla="*/ 2270582 h 6703947"/>
+              <a:gd name="connsiteX14" fmla="*/ 3800068 w 4258651"/>
+              <a:gd name="connsiteY14" fmla="*/ 3086658 h 6703947"/>
+              <a:gd name="connsiteX15" fmla="*/ 3800068 w 4258651"/>
+              <a:gd name="connsiteY15" fmla="*/ 3887377 h 6703947"/>
+              <a:gd name="connsiteX16" fmla="*/ 3712144 w 4258651"/>
+              <a:gd name="connsiteY16" fmla="*/ 5188638 h 6703947"/>
+              <a:gd name="connsiteX17" fmla="*/ 3348812 w 4258651"/>
+              <a:gd name="connsiteY17" fmla="*/ 6679864 h 6703947"/>
+              <a:gd name="connsiteX18" fmla="*/ 2780160 w 4258651"/>
+              <a:gd name="connsiteY18" fmla="*/ 5469992 h 6703947"/>
+              <a:gd name="connsiteX19" fmla="*/ 2530507 w 4258651"/>
+              <a:gd name="connsiteY19" fmla="*/ 4273000 h 6703947"/>
+              <a:gd name="connsiteX20" fmla="*/ 2272435 w 4258651"/>
+              <a:gd name="connsiteY20" fmla="*/ 3892083 h 6703947"/>
+              <a:gd name="connsiteX21" fmla="*/ 1857339 w 4258651"/>
+              <a:gd name="connsiteY21" fmla="*/ 3885147 h 6703947"/>
+              <a:gd name="connsiteX22" fmla="*/ 1512829 w 4258651"/>
+              <a:gd name="connsiteY22" fmla="*/ 4212073 h 6703947"/>
+              <a:gd name="connsiteX23" fmla="*/ 1338221 w 4258651"/>
+              <a:gd name="connsiteY23" fmla="*/ 5135885 h 6703947"/>
+              <a:gd name="connsiteX24" fmla="*/ 1127206 w 4258651"/>
+              <a:gd name="connsiteY24" fmla="*/ 6138208 h 6703947"/>
+              <a:gd name="connsiteX25" fmla="*/ 845852 w 4258651"/>
+              <a:gd name="connsiteY25" fmla="*/ 6700915 h 6703947"/>
+              <a:gd name="connsiteX26" fmla="*/ 652421 w 4258651"/>
+              <a:gd name="connsiteY26" fmla="*/ 6331638 h 6703947"/>
+              <a:gd name="connsiteX0" fmla="*/ 652421 w 4258651"/>
+              <a:gd name="connsiteY0" fmla="*/ 6331638 h 6703947"/>
+              <a:gd name="connsiteX1" fmla="*/ 494160 w 4258651"/>
+              <a:gd name="connsiteY1" fmla="*/ 5434823 h 6703947"/>
+              <a:gd name="connsiteX2" fmla="*/ 388652 w 4258651"/>
+              <a:gd name="connsiteY2" fmla="*/ 4115977 h 6703947"/>
+              <a:gd name="connsiteX3" fmla="*/ 398063 w 4258651"/>
+              <a:gd name="connsiteY3" fmla="*/ 3105481 h 6703947"/>
+              <a:gd name="connsiteX4" fmla="*/ 177637 w 4258651"/>
+              <a:gd name="connsiteY4" fmla="*/ 2357515 h 6703947"/>
+              <a:gd name="connsiteX5" fmla="*/ 1791 w 4258651"/>
+              <a:gd name="connsiteY5" fmla="*/ 1249685 h 6703947"/>
+              <a:gd name="connsiteX6" fmla="*/ 142468 w 4258651"/>
+              <a:gd name="connsiteY6" fmla="*/ 300115 h 6703947"/>
+              <a:gd name="connsiteX7" fmla="*/ 881021 w 4258651"/>
+              <a:gd name="connsiteY7" fmla="*/ 1177 h 6703947"/>
+              <a:gd name="connsiteX8" fmla="*/ 2121357 w 4258651"/>
+              <a:gd name="connsiteY8" fmla="*/ 191140 h 6703947"/>
+              <a:gd name="connsiteX9" fmla="*/ 2811861 w 4258651"/>
+              <a:gd name="connsiteY9" fmla="*/ 63342 h 6703947"/>
+              <a:gd name="connsiteX10" fmla="*/ 3465960 w 4258651"/>
+              <a:gd name="connsiteY10" fmla="*/ 18761 h 6703947"/>
+              <a:gd name="connsiteX11" fmla="*/ 4054425 w 4258651"/>
+              <a:gd name="connsiteY11" fmla="*/ 236711 h 6703947"/>
+              <a:gd name="connsiteX12" fmla="*/ 4257268 w 4258651"/>
+              <a:gd name="connsiteY12" fmla="*/ 968331 h 6703947"/>
+              <a:gd name="connsiteX13" fmla="*/ 4126002 w 4258651"/>
+              <a:gd name="connsiteY13" fmla="*/ 2270582 h 6703947"/>
+              <a:gd name="connsiteX14" fmla="*/ 3800068 w 4258651"/>
+              <a:gd name="connsiteY14" fmla="*/ 3086658 h 6703947"/>
+              <a:gd name="connsiteX15" fmla="*/ 3800068 w 4258651"/>
+              <a:gd name="connsiteY15" fmla="*/ 3887377 h 6703947"/>
+              <a:gd name="connsiteX16" fmla="*/ 3712144 w 4258651"/>
+              <a:gd name="connsiteY16" fmla="*/ 5188638 h 6703947"/>
+              <a:gd name="connsiteX17" fmla="*/ 3348812 w 4258651"/>
+              <a:gd name="connsiteY17" fmla="*/ 6679864 h 6703947"/>
+              <a:gd name="connsiteX18" fmla="*/ 2780160 w 4258651"/>
+              <a:gd name="connsiteY18" fmla="*/ 5469992 h 6703947"/>
+              <a:gd name="connsiteX19" fmla="*/ 2530507 w 4258651"/>
+              <a:gd name="connsiteY19" fmla="*/ 4273000 h 6703947"/>
+              <a:gd name="connsiteX20" fmla="*/ 2272435 w 4258651"/>
+              <a:gd name="connsiteY20" fmla="*/ 3892083 h 6703947"/>
+              <a:gd name="connsiteX21" fmla="*/ 1857339 w 4258651"/>
+              <a:gd name="connsiteY21" fmla="*/ 3885147 h 6703947"/>
+              <a:gd name="connsiteX22" fmla="*/ 1512829 w 4258651"/>
+              <a:gd name="connsiteY22" fmla="*/ 4212073 h 6703947"/>
+              <a:gd name="connsiteX23" fmla="*/ 1338221 w 4258651"/>
+              <a:gd name="connsiteY23" fmla="*/ 5135885 h 6703947"/>
+              <a:gd name="connsiteX24" fmla="*/ 1127206 w 4258651"/>
+              <a:gd name="connsiteY24" fmla="*/ 6138208 h 6703947"/>
+              <a:gd name="connsiteX25" fmla="*/ 845852 w 4258651"/>
+              <a:gd name="connsiteY25" fmla="*/ 6700915 h 6703947"/>
+              <a:gd name="connsiteX26" fmla="*/ 652421 w 4258651"/>
+              <a:gd name="connsiteY26" fmla="*/ 6331638 h 6703947"/>
+            </a:gdLst>
+            <a:ahLst/>
+            <a:cxnLst>
+              <a:cxn ang="0">
+                <a:pos x="connsiteX0" y="connsiteY0"/>
+              </a:cxn>
+              <a:cxn ang="0">
+                <a:pos x="connsiteX1" y="connsiteY1"/>
+              </a:cxn>
+              <a:cxn ang="0">
+                <a:pos x="connsiteX2" y="connsiteY2"/>
+              </a:cxn>
+              <a:cxn ang="0">
+                <a:pos x="connsiteX3" y="connsiteY3"/>
+              </a:cxn>
+              <a:cxn ang="0">
+                <a:pos x="connsiteX4" y="connsiteY4"/>
+              </a:cxn>
+              <a:cxn ang="0">
+                <a:pos x="connsiteX5" y="connsiteY5"/>
+              </a:cxn>
+              <a:cxn ang="0">
+                <a:pos x="connsiteX6" y="connsiteY6"/>
+              </a:cxn>
+              <a:cxn ang="0">
+                <a:pos x="connsiteX7" y="connsiteY7"/>
+              </a:cxn>
+              <a:cxn ang="0">
+                <a:pos x="connsiteX8" y="connsiteY8"/>
+              </a:cxn>
+              <a:cxn ang="0">
+                <a:pos x="connsiteX9" y="connsiteY9"/>
+              </a:cxn>
+              <a:cxn ang="0">
+                <a:pos x="connsiteX10" y="connsiteY10"/>
+              </a:cxn>
+              <a:cxn ang="0">
+                <a:pos x="connsiteX11" y="connsiteY11"/>
+              </a:cxn>
+              <a:cxn ang="0">
+                <a:pos x="connsiteX12" y="connsiteY12"/>
+              </a:cxn>
+              <a:cxn ang="0">
+                <a:pos x="connsiteX13" y="connsiteY13"/>
+              </a:cxn>
+              <a:cxn ang="0">
+                <a:pos x="connsiteX14" y="connsiteY14"/>
+              </a:cxn>
+              <a:cxn ang="0">
+                <a:pos x="connsiteX15" y="connsiteY15"/>
+              </a:cxn>
+              <a:cxn ang="0">
+                <a:pos x="connsiteX16" y="connsiteY16"/>
+              </a:cxn>
+              <a:cxn ang="0">
+                <a:pos x="connsiteX17" y="connsiteY17"/>
+              </a:cxn>
+              <a:cxn ang="0">
+                <a:pos x="connsiteX18" y="connsiteY18"/>
+              </a:cxn>
+              <a:cxn ang="0">
+                <a:pos x="connsiteX19" y="connsiteY19"/>
+              </a:cxn>
+              <a:cxn ang="0">
+                <a:pos x="connsiteX20" y="connsiteY20"/>
+              </a:cxn>
+              <a:cxn ang="0">
+                <a:pos x="connsiteX21" y="connsiteY21"/>
+              </a:cxn>
+              <a:cxn ang="0">
+                <a:pos x="connsiteX22" y="connsiteY22"/>
+              </a:cxn>
+              <a:cxn ang="0">
+                <a:pos x="connsiteX23" y="connsiteY23"/>
+              </a:cxn>
+              <a:cxn ang="0">
+                <a:pos x="connsiteX24" y="connsiteY24"/>
+              </a:cxn>
+              <a:cxn ang="0">
+                <a:pos x="connsiteX25" y="connsiteY25"/>
+              </a:cxn>
+              <a:cxn ang="0">
+                <a:pos x="connsiteX26" y="connsiteY26"/>
+              </a:cxn>
+            </a:cxnLst>
+            <a:rect l="l" t="t" r="r" b="b"/>
+            <a:pathLst>
+              <a:path w="4258651" h="6703947">
+                <a:moveTo>
+                  <a:pt x="652421" y="6331638"/>
+                </a:moveTo>
+                <a:cubicBezTo>
+                  <a:pt x="593806" y="6120623"/>
+                  <a:pt x="538121" y="5804100"/>
+                  <a:pt x="494160" y="5434823"/>
+                </a:cubicBezTo>
+                <a:cubicBezTo>
+                  <a:pt x="450198" y="5065546"/>
+                  <a:pt x="404668" y="4504201"/>
+                  <a:pt x="388652" y="4115977"/>
+                </a:cubicBezTo>
+                <a:cubicBezTo>
+                  <a:pt x="372636" y="3727753"/>
+                  <a:pt x="433232" y="3398558"/>
+                  <a:pt x="398063" y="3105481"/>
+                </a:cubicBezTo>
+                <a:cubicBezTo>
+                  <a:pt x="362894" y="2812404"/>
+                  <a:pt x="243682" y="2666814"/>
+                  <a:pt x="177637" y="2357515"/>
+                </a:cubicBezTo>
+                <a:cubicBezTo>
+                  <a:pt x="111592" y="2048216"/>
+                  <a:pt x="7652" y="1592585"/>
+                  <a:pt x="1791" y="1249685"/>
+                </a:cubicBezTo>
+                <a:cubicBezTo>
+                  <a:pt x="-4071" y="906785"/>
+                  <a:pt x="-4070" y="508200"/>
+                  <a:pt x="142468" y="300115"/>
+                </a:cubicBezTo>
+                <a:cubicBezTo>
+                  <a:pt x="289006" y="92030"/>
+                  <a:pt x="551206" y="19340"/>
+                  <a:pt x="881021" y="1177"/>
+                </a:cubicBezTo>
+                <a:cubicBezTo>
+                  <a:pt x="1210836" y="-16986"/>
+                  <a:pt x="1799550" y="180779"/>
+                  <a:pt x="2121357" y="191140"/>
+                </a:cubicBezTo>
+                <a:cubicBezTo>
+                  <a:pt x="2443164" y="201501"/>
+                  <a:pt x="2574882" y="111391"/>
+                  <a:pt x="2811861" y="63342"/>
+                </a:cubicBezTo>
+                <a:cubicBezTo>
+                  <a:pt x="3048840" y="15293"/>
+                  <a:pt x="3323260" y="2745"/>
+                  <a:pt x="3465960" y="18761"/>
+                </a:cubicBezTo>
+                <a:cubicBezTo>
+                  <a:pt x="3608660" y="34777"/>
+                  <a:pt x="3922540" y="78449"/>
+                  <a:pt x="4054425" y="236711"/>
+                </a:cubicBezTo>
+                <a:cubicBezTo>
+                  <a:pt x="4186310" y="394973"/>
+                  <a:pt x="4245339" y="629353"/>
+                  <a:pt x="4257268" y="968331"/>
+                </a:cubicBezTo>
+                <a:cubicBezTo>
+                  <a:pt x="4269197" y="1307309"/>
+                  <a:pt x="4202202" y="1917528"/>
+                  <a:pt x="4126002" y="2270582"/>
+                </a:cubicBezTo>
+                <a:cubicBezTo>
+                  <a:pt x="4049802" y="2623636"/>
+                  <a:pt x="3854390" y="2817192"/>
+                  <a:pt x="3800068" y="3086658"/>
+                </a:cubicBezTo>
+                <a:cubicBezTo>
+                  <a:pt x="3745746" y="3356124"/>
+                  <a:pt x="3814722" y="3537047"/>
+                  <a:pt x="3800068" y="3887377"/>
+                </a:cubicBezTo>
+                <a:cubicBezTo>
+                  <a:pt x="3785414" y="4237707"/>
+                  <a:pt x="3787353" y="4723223"/>
+                  <a:pt x="3712144" y="5188638"/>
+                </a:cubicBezTo>
+                <a:cubicBezTo>
+                  <a:pt x="3636935" y="5654053"/>
+                  <a:pt x="3504143" y="6632972"/>
+                  <a:pt x="3348812" y="6679864"/>
+                </a:cubicBezTo>
+                <a:cubicBezTo>
+                  <a:pt x="3193481" y="6726756"/>
+                  <a:pt x="2903665" y="5884015"/>
+                  <a:pt x="2780160" y="5469992"/>
+                </a:cubicBezTo>
+                <a:cubicBezTo>
+                  <a:pt x="2656655" y="5055969"/>
+                  <a:pt x="2615128" y="4535985"/>
+                  <a:pt x="2530507" y="4273000"/>
+                </a:cubicBezTo>
+                <a:cubicBezTo>
+                  <a:pt x="2445886" y="4010015"/>
+                  <a:pt x="2358871" y="3930968"/>
+                  <a:pt x="2272435" y="3892083"/>
+                </a:cubicBezTo>
+                <a:cubicBezTo>
+                  <a:pt x="2185999" y="3853198"/>
+                  <a:pt x="1983940" y="3831815"/>
+                  <a:pt x="1857339" y="3885147"/>
+                </a:cubicBezTo>
+                <a:cubicBezTo>
+                  <a:pt x="1730738" y="3938479"/>
+                  <a:pt x="1599349" y="4003617"/>
+                  <a:pt x="1512829" y="4212073"/>
+                </a:cubicBezTo>
+                <a:cubicBezTo>
+                  <a:pt x="1426309" y="4420529"/>
+                  <a:pt x="1402491" y="4814863"/>
+                  <a:pt x="1338221" y="5135885"/>
+                </a:cubicBezTo>
+                <a:cubicBezTo>
+                  <a:pt x="1273951" y="5456907"/>
+                  <a:pt x="1209267" y="5877370"/>
+                  <a:pt x="1127206" y="6138208"/>
+                </a:cubicBezTo>
+                <a:cubicBezTo>
+                  <a:pt x="1045145" y="6399046"/>
+                  <a:pt x="922052" y="6671607"/>
+                  <a:pt x="845852" y="6700915"/>
+                </a:cubicBezTo>
+                <a:cubicBezTo>
+                  <a:pt x="769652" y="6730223"/>
+                  <a:pt x="711036" y="6542653"/>
+                  <a:pt x="652421" y="6331638"/>
+                </a:cubicBezTo>
+                <a:close/>
+              </a:path>
+            </a:pathLst>
+          </a:custGeom>
+          <a:solidFill>
+            <a:schemeClr val="bg1">
+              <a:lumMod val="85000"/>
+            </a:schemeClr>
+          </a:solidFill>
+          <a:ln>
+            <a:noFill/>
+          </a:ln>
+        </p:spPr>
+        <p:style>
+          <a:lnRef idx="2">
+            <a:schemeClr val="accent1">
+              <a:shade val="50000"/>
+            </a:schemeClr>
+          </a:lnRef>
+          <a:fillRef idx="1">
+            <a:schemeClr val="accent1"/>
+          </a:fillRef>
+          <a:effectRef idx="0">
+            <a:schemeClr val="accent1"/>
+          </a:effectRef>
+          <a:fontRef idx="minor">
+            <a:schemeClr val="lt1"/>
+          </a:fontRef>
+        </p:style>
+        <p:txBody>
+          <a:bodyPr rtlCol="0" anchor="ctr"/>
+          <a:lstStyle/>
+          <a:p>
+            <a:pPr algn="ctr"/>
+            <a:endParaRPr lang="en-US" sz="1350"/>
+          </a:p>
+        </p:txBody>
+      </p:sp>
+      <p:sp>
+        <p:nvSpPr>
+          <p:cNvPr id="7" name="TextBox 6"/>
+          <p:cNvSpPr txBox="1"/>
+          <p:nvPr/>
+        </p:nvSpPr>
+        <p:spPr>
+          <a:xfrm>
+            <a:off x="1857154" y="6189757"/>
+            <a:ext cx="5429692" cy="1920526"/>
+          </a:xfrm>
+          <a:prstGeom prst="rect">
+            <a:avLst/>
+          </a:prstGeom>
+          <a:noFill/>
+          <a:ln>
+            <a:noFill/>
+          </a:ln>
+        </p:spPr>
+        <p:txBody>
+          <a:bodyPr wrap="none" rtlCol="0" anchor="ctr" anchorCtr="0">
+            <a:spAutoFit/>
+          </a:bodyPr>
+          <a:lstStyle/>
+          <a:p>
+            <a:pPr algn="ctr">
+              <a:lnSpc>
+                <a:spcPct val="90000"/>
+              </a:lnSpc>
+            </a:pPr>
+            <a:r>
+              <a:rPr lang="en-US" sz="6600" dirty="0" smtClean="0">
+                <a:solidFill>
+                  <a:srgbClr val="CDCDCD"/>
+                </a:solidFill>
+                <a:latin typeface="Roboto Light" charset="0"/>
+                <a:ea typeface="Roboto Light" charset="0"/>
+                <a:cs typeface="Roboto Light" charset="0"/>
+              </a:rPr>
+              <a:t>DELTA DELTA</a:t>
+            </a:r>
+          </a:p>
+          <a:p>
+            <a:pPr algn="ctr">
+              <a:lnSpc>
+                <a:spcPct val="90000"/>
+              </a:lnSpc>
+            </a:pPr>
+            <a:r>
+              <a:rPr lang="en-US" sz="6600" dirty="0" smtClean="0">
+                <a:solidFill>
+                  <a:srgbClr val="CDCDCD"/>
+                </a:solidFill>
+                <a:latin typeface="Roboto Light" charset="0"/>
+                <a:ea typeface="Roboto Light" charset="0"/>
+                <a:cs typeface="Roboto Light" charset="0"/>
+              </a:rPr>
+              <a:t>SIGMA</a:t>
+            </a:r>
+            <a:endParaRPr lang="en-US" sz="6600" dirty="0">
+              <a:solidFill>
+                <a:srgbClr val="CDCDCD"/>
+              </a:solidFill>
+              <a:latin typeface="Roboto Light" charset="0"/>
+              <a:ea typeface="Roboto Light" charset="0"/>
+              <a:cs typeface="Roboto Light" charset="0"/>
+            </a:endParaRPr>
+          </a:p>
+        </p:txBody>
+      </p:sp>
+    </p:spTree>
+    <p:extLst>
+      <p:ext uri="{BB962C8B-B14F-4D97-AF65-F5344CB8AC3E}">
+        <p14:creationId xmlns:p14="http://schemas.microsoft.com/office/powerpoint/2010/main" val="1015169755"/>
+      </p:ext>
+    </p:extLst>
+  </p:cSld>
+  <p:clrMapOvr>
+    <a:masterClrMapping/>
+  </p:clrMapOvr>
+  <p:timing>
+    <p:tnLst>
+      <p:par>
+        <p:cTn id="1" dur="indefinite" restart="never" nodeType="tmRoot"/>
+      </p:par>
+    </p:tnLst>
+  </p:timing>
+</p:sld>
+</file>
+
 <file path=ppt/theme/theme1.xml><?xml version="1.0" encoding="utf-8"?>
 <a:theme xmlns:a="http://schemas.openxmlformats.org/drawingml/2006/main" name="Office Theme">
   <a:themeElements>

</xml_diff>